<commit_message>
Updated Documents snyk and trivy and prepraing differential docx betwn Trivy vs Snyk
</commit_message>
<xml_diff>
--- a/SonarQube.pptx
+++ b/SonarQube.pptx
@@ -6,7 +6,7 @@
     <p:sldMasterId id="2147483660" r:id="rId5"/>
   </p:sldMasterIdLst>
   <p:notesMasterIdLst>
-    <p:notesMasterId r:id="rId19"/>
+    <p:notesMasterId r:id="rId20"/>
   </p:notesMasterIdLst>
   <p:sldIdLst>
     <p:sldId id="281" r:id="rId6"/>
@@ -15,13 +15,14 @@
     <p:sldId id="301" r:id="rId9"/>
     <p:sldId id="298" r:id="rId10"/>
     <p:sldId id="296" r:id="rId11"/>
-    <p:sldId id="300" r:id="rId12"/>
-    <p:sldId id="289" r:id="rId13"/>
-    <p:sldId id="292" r:id="rId14"/>
-    <p:sldId id="291" r:id="rId15"/>
-    <p:sldId id="302" r:id="rId16"/>
-    <p:sldId id="294" r:id="rId17"/>
-    <p:sldId id="282" r:id="rId18"/>
+    <p:sldId id="303" r:id="rId12"/>
+    <p:sldId id="300" r:id="rId13"/>
+    <p:sldId id="289" r:id="rId14"/>
+    <p:sldId id="292" r:id="rId15"/>
+    <p:sldId id="291" r:id="rId16"/>
+    <p:sldId id="302" r:id="rId17"/>
+    <p:sldId id="294" r:id="rId18"/>
+    <p:sldId id="282" r:id="rId19"/>
   </p:sldIdLst>
   <p:sldSz cx="10058400" cy="5659438"/>
   <p:notesSz cx="9144000" cy="6858000"/>
@@ -232,7 +233,7 @@
           <a:p>
             <a:fld id="{F3B47075-42FC-4992-BFD6-71B1872E4AB2}" type="datetimeFigureOut">
               <a:rPr lang="en-US" smtClean="0"/>
-              <a:t>2/23/2023</a:t>
+              <a:t>11/26/2023</a:t>
             </a:fld>
             <a:endParaRPr lang="en-US"/>
           </a:p>
@@ -296,38 +297,37 @@
           <a:p>
             <a:pPr lvl="0"/>
             <a:r>
-              <a:rPr lang="en-US" smtClean="0"/>
+              <a:rPr lang="en-US"/>
               <a:t>Edit Master text styles</a:t>
             </a:r>
           </a:p>
           <a:p>
             <a:pPr lvl="1"/>
             <a:r>
-              <a:rPr lang="en-US" smtClean="0"/>
+              <a:rPr lang="en-US"/>
               <a:t>Second level</a:t>
             </a:r>
           </a:p>
           <a:p>
             <a:pPr lvl="2"/>
             <a:r>
-              <a:rPr lang="en-US" smtClean="0"/>
+              <a:rPr lang="en-US"/>
               <a:t>Third level</a:t>
             </a:r>
           </a:p>
           <a:p>
             <a:pPr lvl="3"/>
             <a:r>
-              <a:rPr lang="en-US" smtClean="0"/>
+              <a:rPr lang="en-US"/>
               <a:t>Fourth level</a:t>
             </a:r>
           </a:p>
           <a:p>
             <a:pPr lvl="4"/>
             <a:r>
-              <a:rPr lang="en-US" smtClean="0"/>
+              <a:rPr lang="en-US"/>
               <a:t>Fifth level</a:t>
             </a:r>
-            <a:endParaRPr lang="en-US"/>
           </a:p>
         </p:txBody>
       </p:sp>
@@ -776,7 +776,7 @@
           <a:p>
             <a:pPr algn="r"/>
             <a:r>
-              <a:rPr lang="en-US" sz="2200" dirty="0" smtClean="0">
+              <a:rPr lang="en-US" sz="2200" dirty="0">
                 <a:solidFill>
                   <a:schemeClr val="bg1"/>
                 </a:solidFill>
@@ -787,7 +787,7 @@
               <a:t>Welcome to</a:t>
             </a:r>
             <a:br>
-              <a:rPr lang="en-US" sz="2200" dirty="0" smtClean="0">
+              <a:rPr lang="en-US" sz="2200" dirty="0">
                 <a:solidFill>
                   <a:schemeClr val="bg1"/>
                 </a:solidFill>
@@ -797,7 +797,7 @@
               </a:rPr>
             </a:br>
             <a:r>
-              <a:rPr lang="en-US" sz="2200" dirty="0" err="1" smtClean="0">
+              <a:rPr lang="en-US" sz="2200" dirty="0" err="1">
                 <a:solidFill>
                   <a:schemeClr val="bg1"/>
                 </a:solidFill>
@@ -867,35 +867,7 @@
                 <a:ea typeface="Segoe UI" panose="020B0502040204020203" pitchFamily="34" charset="0"/>
                 <a:cs typeface="Segoe UI" panose="020B0502040204020203" pitchFamily="34" charset="0"/>
               </a:rPr>
-              <a:t> Copyright © </a:t>
-            </a:r>
-            <a:r>
-              <a:rPr lang="en-US" sz="700" dirty="0" smtClean="0">
-                <a:solidFill>
-                  <a:schemeClr val="tx1">
-                    <a:lumMod val="75000"/>
-                    <a:lumOff val="25000"/>
-                  </a:schemeClr>
-                </a:solidFill>
-                <a:latin typeface="Segoe UI Light" panose="020B0502040204020203" pitchFamily="34" charset="0"/>
-                <a:ea typeface="Segoe UI" panose="020B0502040204020203" pitchFamily="34" charset="0"/>
-                <a:cs typeface="Segoe UI" panose="020B0502040204020203" pitchFamily="34" charset="0"/>
-              </a:rPr>
-              <a:t>2020 </a:t>
-            </a:r>
-            <a:r>
-              <a:rPr lang="en-US" sz="700" dirty="0">
-                <a:solidFill>
-                  <a:schemeClr val="tx1">
-                    <a:lumMod val="75000"/>
-                    <a:lumOff val="25000"/>
-                  </a:schemeClr>
-                </a:solidFill>
-                <a:latin typeface="Segoe UI Light" panose="020B0502040204020203" pitchFamily="34" charset="0"/>
-                <a:ea typeface="Segoe UI" panose="020B0502040204020203" pitchFamily="34" charset="0"/>
-                <a:cs typeface="Segoe UI" panose="020B0502040204020203" pitchFamily="34" charset="0"/>
-              </a:rPr>
-              <a:t>Cybage Software Pvt. Ltd. All Rights Reserved. Cybage Confidential.</a:t>
+              <a:t> Copyright © 2020 Cybage Software Pvt. Ltd. All Rights Reserved. Cybage Confidential.</a:t>
             </a:r>
           </a:p>
         </p:txBody>
@@ -923,7 +895,7 @@
           <a:lstStyle/>
           <a:p>
             <a:r>
-              <a:rPr lang="en-US" sz="900" dirty="0" smtClean="0">
+              <a:rPr lang="en-US" sz="900" dirty="0">
                 <a:solidFill>
                   <a:schemeClr val="tx1">
                     <a:lumMod val="75000"/>
@@ -1116,13 +1088,6 @@
   <p:clrMapOvr>
     <a:masterClrMapping/>
   </p:clrMapOvr>
-  <p:timing>
-    <p:tnLst>
-      <p:par>
-        <p:cTn id="1" dur="indefinite" restart="never" nodeType="tmRoot"/>
-      </p:par>
-    </p:tnLst>
-  </p:timing>
 </p:sldLayout>
 </file>
 
@@ -1167,10 +1132,9 @@
           <a:lstStyle/>
           <a:p>
             <a:r>
-              <a:rPr lang="en-US" smtClean="0"/>
+              <a:rPr lang="en-US"/>
               <a:t>Click to edit Master title style</a:t>
             </a:r>
-            <a:endParaRPr lang="en-US"/>
           </a:p>
         </p:txBody>
       </p:sp>
@@ -1199,38 +1163,37 @@
           <a:p>
             <a:pPr lvl="0"/>
             <a:r>
-              <a:rPr lang="en-US" smtClean="0"/>
+              <a:rPr lang="en-US"/>
               <a:t>Click to edit Master text styles</a:t>
             </a:r>
           </a:p>
           <a:p>
             <a:pPr lvl="1"/>
             <a:r>
-              <a:rPr lang="en-US" smtClean="0"/>
+              <a:rPr lang="en-US"/>
               <a:t>Second level</a:t>
             </a:r>
           </a:p>
           <a:p>
             <a:pPr lvl="2"/>
             <a:r>
-              <a:rPr lang="en-US" smtClean="0"/>
+              <a:rPr lang="en-US"/>
               <a:t>Third level</a:t>
             </a:r>
           </a:p>
           <a:p>
             <a:pPr lvl="3"/>
             <a:r>
-              <a:rPr lang="en-US" smtClean="0"/>
+              <a:rPr lang="en-US"/>
               <a:t>Fourth level</a:t>
             </a:r>
           </a:p>
           <a:p>
             <a:pPr lvl="4"/>
             <a:r>
-              <a:rPr lang="en-US" smtClean="0"/>
+              <a:rPr lang="en-US"/>
               <a:t>Fifth level</a:t>
             </a:r>
-            <a:endParaRPr lang="en-US"/>
           </a:p>
         </p:txBody>
       </p:sp>
@@ -1259,7 +1222,7 @@
           <a:p>
             <a:fld id="{72CC6C99-819B-4E2C-B66B-9C4B0D9D41D3}" type="datetimeFigureOut">
               <a:rPr lang="en-US" smtClean="0"/>
-              <a:t>2/23/2023</a:t>
+              <a:t>11/26/2023</a:t>
             </a:fld>
             <a:endParaRPr lang="en-US"/>
           </a:p>
@@ -1369,10 +1332,9 @@
           <a:lstStyle/>
           <a:p>
             <a:r>
-              <a:rPr lang="en-US" smtClean="0"/>
+              <a:rPr lang="en-US"/>
               <a:t>Click to edit Master title style</a:t>
             </a:r>
-            <a:endParaRPr lang="en-US"/>
           </a:p>
         </p:txBody>
       </p:sp>
@@ -1401,38 +1363,37 @@
           <a:p>
             <a:pPr lvl="0"/>
             <a:r>
-              <a:rPr lang="en-US" smtClean="0"/>
+              <a:rPr lang="en-US"/>
               <a:t>Click to edit Master text styles</a:t>
             </a:r>
           </a:p>
           <a:p>
             <a:pPr lvl="1"/>
             <a:r>
-              <a:rPr lang="en-US" smtClean="0"/>
+              <a:rPr lang="en-US"/>
               <a:t>Second level</a:t>
             </a:r>
           </a:p>
           <a:p>
             <a:pPr lvl="2"/>
             <a:r>
-              <a:rPr lang="en-US" smtClean="0"/>
+              <a:rPr lang="en-US"/>
               <a:t>Third level</a:t>
             </a:r>
           </a:p>
           <a:p>
             <a:pPr lvl="3"/>
             <a:r>
-              <a:rPr lang="en-US" smtClean="0"/>
+              <a:rPr lang="en-US"/>
               <a:t>Fourth level</a:t>
             </a:r>
           </a:p>
           <a:p>
             <a:pPr lvl="4"/>
             <a:r>
-              <a:rPr lang="en-US" smtClean="0"/>
+              <a:rPr lang="en-US"/>
               <a:t>Fifth level</a:t>
             </a:r>
-            <a:endParaRPr lang="en-US"/>
           </a:p>
         </p:txBody>
       </p:sp>
@@ -1461,7 +1422,7 @@
           <a:p>
             <a:fld id="{72CC6C99-819B-4E2C-B66B-9C4B0D9D41D3}" type="datetimeFigureOut">
               <a:rPr lang="en-US" smtClean="0"/>
-              <a:t>2/23/2023</a:t>
+              <a:t>11/26/2023</a:t>
             </a:fld>
             <a:endParaRPr lang="en-US"/>
           </a:p>
@@ -1557,13 +1518,6 @@
   <p:clrMapOvr>
     <a:masterClrMapping/>
   </p:clrMapOvr>
-  <p:timing>
-    <p:tnLst>
-      <p:par>
-        <p:cTn id="1" dur="indefinite" restart="never" nodeType="tmRoot"/>
-      </p:par>
-    </p:tnLst>
-  </p:timing>
 </p:sldLayout>
 </file>
 
@@ -1605,10 +1559,9 @@
           <a:lstStyle/>
           <a:p>
             <a:r>
-              <a:rPr lang="en-US" smtClean="0"/>
+              <a:rPr lang="en-US"/>
               <a:t>Click to edit Master title style</a:t>
             </a:r>
-            <a:endParaRPr lang="en-US"/>
           </a:p>
         </p:txBody>
       </p:sp>
@@ -1724,10 +1677,9 @@
           </a:lstStyle>
           <a:p>
             <a:r>
-              <a:rPr lang="en-US" smtClean="0"/>
+              <a:rPr lang="en-US"/>
               <a:t>Click to edit Master subtitle style</a:t>
             </a:r>
-            <a:endParaRPr lang="en-US"/>
           </a:p>
         </p:txBody>
       </p:sp>
@@ -1748,7 +1700,7 @@
           <a:p>
             <a:fld id="{FE54115B-6CD9-43BC-8D55-E1FCD10AF002}" type="datetimeFigureOut">
               <a:rPr lang="en-US" smtClean="0"/>
-              <a:t>2/23/2023</a:t>
+              <a:t>11/26/2023</a:t>
             </a:fld>
             <a:endParaRPr lang="en-US"/>
           </a:p>
@@ -1842,10 +1794,9 @@
           <a:lstStyle/>
           <a:p>
             <a:r>
-              <a:rPr lang="en-US" smtClean="0"/>
+              <a:rPr lang="en-US"/>
               <a:t>Click to edit Master title style</a:t>
             </a:r>
-            <a:endParaRPr lang="en-US"/>
           </a:p>
         </p:txBody>
       </p:sp>
@@ -1866,38 +1817,37 @@
           <a:p>
             <a:pPr lvl="0"/>
             <a:r>
-              <a:rPr lang="en-US" smtClean="0"/>
+              <a:rPr lang="en-US"/>
               <a:t>Click to edit Master text styles</a:t>
             </a:r>
           </a:p>
           <a:p>
             <a:pPr lvl="1"/>
             <a:r>
-              <a:rPr lang="en-US" smtClean="0"/>
+              <a:rPr lang="en-US"/>
               <a:t>Second level</a:t>
             </a:r>
           </a:p>
           <a:p>
             <a:pPr lvl="2"/>
             <a:r>
-              <a:rPr lang="en-US" smtClean="0"/>
+              <a:rPr lang="en-US"/>
               <a:t>Third level</a:t>
             </a:r>
           </a:p>
           <a:p>
             <a:pPr lvl="3"/>
             <a:r>
-              <a:rPr lang="en-US" smtClean="0"/>
+              <a:rPr lang="en-US"/>
               <a:t>Fourth level</a:t>
             </a:r>
           </a:p>
           <a:p>
             <a:pPr lvl="4"/>
             <a:r>
-              <a:rPr lang="en-US" smtClean="0"/>
+              <a:rPr lang="en-US"/>
               <a:t>Fifth level</a:t>
             </a:r>
-            <a:endParaRPr lang="en-US"/>
           </a:p>
         </p:txBody>
       </p:sp>
@@ -1918,7 +1868,7 @@
           <a:p>
             <a:fld id="{FE54115B-6CD9-43BC-8D55-E1FCD10AF002}" type="datetimeFigureOut">
               <a:rPr lang="en-US" smtClean="0"/>
-              <a:t>2/23/2023</a:t>
+              <a:t>11/26/2023</a:t>
             </a:fld>
             <a:endParaRPr lang="en-US"/>
           </a:p>
@@ -2021,10 +1971,9 @@
           </a:lstStyle>
           <a:p>
             <a:r>
-              <a:rPr lang="en-US" smtClean="0"/>
+              <a:rPr lang="en-US"/>
               <a:t>Click to edit Master title style</a:t>
             </a:r>
-            <a:endParaRPr lang="en-US"/>
           </a:p>
         </p:txBody>
       </p:sp>
@@ -2141,7 +2090,7 @@
           <a:p>
             <a:pPr lvl="0"/>
             <a:r>
-              <a:rPr lang="en-US" smtClean="0"/>
+              <a:rPr lang="en-US"/>
               <a:t>Click to edit Master text styles</a:t>
             </a:r>
           </a:p>
@@ -2164,7 +2113,7 @@
           <a:p>
             <a:fld id="{FE54115B-6CD9-43BC-8D55-E1FCD10AF002}" type="datetimeFigureOut">
               <a:rPr lang="en-US" smtClean="0"/>
-              <a:t>2/23/2023</a:t>
+              <a:t>11/26/2023</a:t>
             </a:fld>
             <a:endParaRPr lang="en-US"/>
           </a:p>
@@ -2258,10 +2207,9 @@
           <a:lstStyle/>
           <a:p>
             <a:r>
-              <a:rPr lang="en-US" smtClean="0"/>
+              <a:rPr lang="en-US"/>
               <a:t>Click to edit Master title style</a:t>
             </a:r>
-            <a:endParaRPr lang="en-US"/>
           </a:p>
         </p:txBody>
       </p:sp>
@@ -2315,38 +2263,37 @@
           <a:p>
             <a:pPr lvl="0"/>
             <a:r>
-              <a:rPr lang="en-US" smtClean="0"/>
+              <a:rPr lang="en-US"/>
               <a:t>Click to edit Master text styles</a:t>
             </a:r>
           </a:p>
           <a:p>
             <a:pPr lvl="1"/>
             <a:r>
-              <a:rPr lang="en-US" smtClean="0"/>
+              <a:rPr lang="en-US"/>
               <a:t>Second level</a:t>
             </a:r>
           </a:p>
           <a:p>
             <a:pPr lvl="2"/>
             <a:r>
-              <a:rPr lang="en-US" smtClean="0"/>
+              <a:rPr lang="en-US"/>
               <a:t>Third level</a:t>
             </a:r>
           </a:p>
           <a:p>
             <a:pPr lvl="3"/>
             <a:r>
-              <a:rPr lang="en-US" smtClean="0"/>
+              <a:rPr lang="en-US"/>
               <a:t>Fourth level</a:t>
             </a:r>
           </a:p>
           <a:p>
             <a:pPr lvl="4"/>
             <a:r>
-              <a:rPr lang="en-US" smtClean="0"/>
+              <a:rPr lang="en-US"/>
               <a:t>Fifth level</a:t>
             </a:r>
-            <a:endParaRPr lang="en-US"/>
           </a:p>
         </p:txBody>
       </p:sp>
@@ -2400,38 +2347,37 @@
           <a:p>
             <a:pPr lvl="0"/>
             <a:r>
-              <a:rPr lang="en-US" smtClean="0"/>
+              <a:rPr lang="en-US"/>
               <a:t>Click to edit Master text styles</a:t>
             </a:r>
           </a:p>
           <a:p>
             <a:pPr lvl="1"/>
             <a:r>
-              <a:rPr lang="en-US" smtClean="0"/>
+              <a:rPr lang="en-US"/>
               <a:t>Second level</a:t>
             </a:r>
           </a:p>
           <a:p>
             <a:pPr lvl="2"/>
             <a:r>
-              <a:rPr lang="en-US" smtClean="0"/>
+              <a:rPr lang="en-US"/>
               <a:t>Third level</a:t>
             </a:r>
           </a:p>
           <a:p>
             <a:pPr lvl="3"/>
             <a:r>
-              <a:rPr lang="en-US" smtClean="0"/>
+              <a:rPr lang="en-US"/>
               <a:t>Fourth level</a:t>
             </a:r>
           </a:p>
           <a:p>
             <a:pPr lvl="4"/>
             <a:r>
-              <a:rPr lang="en-US" smtClean="0"/>
+              <a:rPr lang="en-US"/>
               <a:t>Fifth level</a:t>
             </a:r>
-            <a:endParaRPr lang="en-US"/>
           </a:p>
         </p:txBody>
       </p:sp>
@@ -2452,7 +2398,7 @@
           <a:p>
             <a:fld id="{FE54115B-6CD9-43BC-8D55-E1FCD10AF002}" type="datetimeFigureOut">
               <a:rPr lang="en-US" smtClean="0"/>
-              <a:t>2/23/2023</a:t>
+              <a:t>11/26/2023</a:t>
             </a:fld>
             <a:endParaRPr lang="en-US"/>
           </a:p>
@@ -2550,10 +2496,9 @@
           </a:lstStyle>
           <a:p>
             <a:r>
-              <a:rPr lang="en-US" smtClean="0"/>
+              <a:rPr lang="en-US"/>
               <a:t>Click to edit Master title style</a:t>
             </a:r>
-            <a:endParaRPr lang="en-US"/>
           </a:p>
         </p:txBody>
       </p:sp>
@@ -2616,7 +2561,7 @@
           <a:p>
             <a:pPr lvl="0"/>
             <a:r>
-              <a:rPr lang="en-US" smtClean="0"/>
+              <a:rPr lang="en-US"/>
               <a:t>Click to edit Master text styles</a:t>
             </a:r>
           </a:p>
@@ -2672,38 +2617,37 @@
           <a:p>
             <a:pPr lvl="0"/>
             <a:r>
-              <a:rPr lang="en-US" smtClean="0"/>
+              <a:rPr lang="en-US"/>
               <a:t>Click to edit Master text styles</a:t>
             </a:r>
           </a:p>
           <a:p>
             <a:pPr lvl="1"/>
             <a:r>
-              <a:rPr lang="en-US" smtClean="0"/>
+              <a:rPr lang="en-US"/>
               <a:t>Second level</a:t>
             </a:r>
           </a:p>
           <a:p>
             <a:pPr lvl="2"/>
             <a:r>
-              <a:rPr lang="en-US" smtClean="0"/>
+              <a:rPr lang="en-US"/>
               <a:t>Third level</a:t>
             </a:r>
           </a:p>
           <a:p>
             <a:pPr lvl="3"/>
             <a:r>
-              <a:rPr lang="en-US" smtClean="0"/>
+              <a:rPr lang="en-US"/>
               <a:t>Fourth level</a:t>
             </a:r>
           </a:p>
           <a:p>
             <a:pPr lvl="4"/>
             <a:r>
-              <a:rPr lang="en-US" smtClean="0"/>
+              <a:rPr lang="en-US"/>
               <a:t>Fifth level</a:t>
             </a:r>
-            <a:endParaRPr lang="en-US"/>
           </a:p>
         </p:txBody>
       </p:sp>
@@ -2766,7 +2710,7 @@
           <a:p>
             <a:pPr lvl="0"/>
             <a:r>
-              <a:rPr lang="en-US" smtClean="0"/>
+              <a:rPr lang="en-US"/>
               <a:t>Click to edit Master text styles</a:t>
             </a:r>
           </a:p>
@@ -2822,38 +2766,37 @@
           <a:p>
             <a:pPr lvl="0"/>
             <a:r>
-              <a:rPr lang="en-US" smtClean="0"/>
+              <a:rPr lang="en-US"/>
               <a:t>Click to edit Master text styles</a:t>
             </a:r>
           </a:p>
           <a:p>
             <a:pPr lvl="1"/>
             <a:r>
-              <a:rPr lang="en-US" smtClean="0"/>
+              <a:rPr lang="en-US"/>
               <a:t>Second level</a:t>
             </a:r>
           </a:p>
           <a:p>
             <a:pPr lvl="2"/>
             <a:r>
-              <a:rPr lang="en-US" smtClean="0"/>
+              <a:rPr lang="en-US"/>
               <a:t>Third level</a:t>
             </a:r>
           </a:p>
           <a:p>
             <a:pPr lvl="3"/>
             <a:r>
-              <a:rPr lang="en-US" smtClean="0"/>
+              <a:rPr lang="en-US"/>
               <a:t>Fourth level</a:t>
             </a:r>
           </a:p>
           <a:p>
             <a:pPr lvl="4"/>
             <a:r>
-              <a:rPr lang="en-US" smtClean="0"/>
+              <a:rPr lang="en-US"/>
               <a:t>Fifth level</a:t>
             </a:r>
-            <a:endParaRPr lang="en-US"/>
           </a:p>
         </p:txBody>
       </p:sp>
@@ -2874,7 +2817,7 @@
           <a:p>
             <a:fld id="{FE54115B-6CD9-43BC-8D55-E1FCD10AF002}" type="datetimeFigureOut">
               <a:rPr lang="en-US" smtClean="0"/>
-              <a:t>2/23/2023</a:t>
+              <a:t>11/26/2023</a:t>
             </a:fld>
             <a:endParaRPr lang="en-US"/>
           </a:p>
@@ -2968,10 +2911,9 @@
           <a:lstStyle/>
           <a:p>
             <a:r>
-              <a:rPr lang="en-US" smtClean="0"/>
+              <a:rPr lang="en-US"/>
               <a:t>Click to edit Master title style</a:t>
             </a:r>
-            <a:endParaRPr lang="en-US"/>
           </a:p>
         </p:txBody>
       </p:sp>
@@ -2992,7 +2934,7 @@
           <a:p>
             <a:fld id="{FE54115B-6CD9-43BC-8D55-E1FCD10AF002}" type="datetimeFigureOut">
               <a:rPr lang="en-US" smtClean="0"/>
-              <a:t>2/23/2023</a:t>
+              <a:t>11/26/2023</a:t>
             </a:fld>
             <a:endParaRPr lang="en-US"/>
           </a:p>
@@ -3087,7 +3029,7 @@
           <a:p>
             <a:fld id="{FE54115B-6CD9-43BC-8D55-E1FCD10AF002}" type="datetimeFigureOut">
               <a:rPr lang="en-US" smtClean="0"/>
-              <a:t>2/23/2023</a:t>
+              <a:t>11/26/2023</a:t>
             </a:fld>
             <a:endParaRPr lang="en-US"/>
           </a:p>
@@ -3189,10 +3131,9 @@
           <a:lstStyle/>
           <a:p>
             <a:r>
-              <a:rPr lang="en-US" smtClean="0"/>
+              <a:rPr lang="en-US"/>
               <a:t>Click to edit Master title style</a:t>
             </a:r>
-            <a:endParaRPr lang="en-US"/>
           </a:p>
         </p:txBody>
       </p:sp>
@@ -3221,38 +3162,37 @@
           <a:p>
             <a:pPr lvl="0"/>
             <a:r>
-              <a:rPr lang="en-US" dirty="0" smtClean="0"/>
+              <a:rPr lang="en-US" dirty="0"/>
               <a:t>Click to edit Master text styles</a:t>
             </a:r>
           </a:p>
           <a:p>
             <a:pPr lvl="1"/>
             <a:r>
-              <a:rPr lang="en-US" dirty="0" smtClean="0"/>
+              <a:rPr lang="en-US" dirty="0"/>
               <a:t>Second level</a:t>
             </a:r>
           </a:p>
           <a:p>
             <a:pPr lvl="2"/>
             <a:r>
-              <a:rPr lang="en-US" dirty="0" smtClean="0"/>
+              <a:rPr lang="en-US" dirty="0"/>
               <a:t>Third level</a:t>
             </a:r>
           </a:p>
           <a:p>
             <a:pPr lvl="3"/>
             <a:r>
-              <a:rPr lang="en-US" dirty="0" smtClean="0"/>
+              <a:rPr lang="en-US" dirty="0"/>
               <a:t>Fourth level</a:t>
             </a:r>
           </a:p>
           <a:p>
             <a:pPr lvl="4"/>
             <a:r>
-              <a:rPr lang="en-US" dirty="0" smtClean="0"/>
+              <a:rPr lang="en-US" dirty="0"/>
               <a:t>Fifth level</a:t>
             </a:r>
-            <a:endParaRPr lang="en-US" dirty="0"/>
           </a:p>
         </p:txBody>
       </p:sp>
@@ -3280,28 +3220,28 @@
           <a:lstStyle/>
           <a:p>
             <a:r>
-              <a:rPr lang="en-US" dirty="0" smtClean="0"/>
+              <a:rPr lang="en-US" dirty="0"/>
               <a:t> Copyright © 2017 </a:t>
             </a:r>
             <a:r>
-              <a:rPr lang="en-US" dirty="0" err="1" smtClean="0"/>
+              <a:rPr lang="en-US" dirty="0" err="1"/>
               <a:t>Cybage</a:t>
             </a:r>
             <a:r>
-              <a:rPr lang="en-US" dirty="0" smtClean="0"/>
+              <a:rPr lang="en-US" dirty="0"/>
               <a:t> Software Pvt. Ltd. All Rights Reserved. </a:t>
             </a:r>
             <a:r>
-              <a:rPr lang="en-US" dirty="0" err="1" smtClean="0"/>
+              <a:rPr lang="en-US" dirty="0" err="1"/>
               <a:t>Cybage</a:t>
             </a:r>
             <a:r>
-              <a:rPr lang="en-US" dirty="0" smtClean="0"/>
+              <a:rPr lang="en-US" dirty="0"/>
               <a:t> Confidential.</a:t>
             </a:r>
           </a:p>
           <a:p>
-            <a:endParaRPr lang="en-US" dirty="0" smtClean="0"/>
+            <a:endParaRPr lang="en-US" dirty="0"/>
           </a:p>
           <a:p>
             <a:endParaRPr lang="en-US" dirty="0"/>
@@ -3341,13 +3281,6 @@
   <p:clrMapOvr>
     <a:masterClrMapping/>
   </p:clrMapOvr>
-  <p:timing>
-    <p:tnLst>
-      <p:par>
-        <p:cTn id="1" dur="indefinite" restart="never" nodeType="tmRoot"/>
-      </p:par>
-    </p:tnLst>
-  </p:timing>
 </p:sldLayout>
 </file>
 
@@ -3393,10 +3326,9 @@
           </a:lstStyle>
           <a:p>
             <a:r>
-              <a:rPr lang="en-US" smtClean="0"/>
+              <a:rPr lang="en-US"/>
               <a:t>Click to edit Master title style</a:t>
             </a:r>
-            <a:endParaRPr lang="en-US"/>
           </a:p>
         </p:txBody>
       </p:sp>
@@ -3450,38 +3382,37 @@
           <a:p>
             <a:pPr lvl="0"/>
             <a:r>
-              <a:rPr lang="en-US" smtClean="0"/>
+              <a:rPr lang="en-US"/>
               <a:t>Click to edit Master text styles</a:t>
             </a:r>
           </a:p>
           <a:p>
             <a:pPr lvl="1"/>
             <a:r>
-              <a:rPr lang="en-US" smtClean="0"/>
+              <a:rPr lang="en-US"/>
               <a:t>Second level</a:t>
             </a:r>
           </a:p>
           <a:p>
             <a:pPr lvl="2"/>
             <a:r>
-              <a:rPr lang="en-US" smtClean="0"/>
+              <a:rPr lang="en-US"/>
               <a:t>Third level</a:t>
             </a:r>
           </a:p>
           <a:p>
             <a:pPr lvl="3"/>
             <a:r>
-              <a:rPr lang="en-US" smtClean="0"/>
+              <a:rPr lang="en-US"/>
               <a:t>Fourth level</a:t>
             </a:r>
           </a:p>
           <a:p>
             <a:pPr lvl="4"/>
             <a:r>
-              <a:rPr lang="en-US" smtClean="0"/>
+              <a:rPr lang="en-US"/>
               <a:t>Fifth level</a:t>
             </a:r>
-            <a:endParaRPr lang="en-US"/>
           </a:p>
         </p:txBody>
       </p:sp>
@@ -3544,7 +3475,7 @@
           <a:p>
             <a:pPr lvl="0"/>
             <a:r>
-              <a:rPr lang="en-US" smtClean="0"/>
+              <a:rPr lang="en-US"/>
               <a:t>Click to edit Master text styles</a:t>
             </a:r>
           </a:p>
@@ -3567,7 +3498,7 @@
           <a:p>
             <a:fld id="{FE54115B-6CD9-43BC-8D55-E1FCD10AF002}" type="datetimeFigureOut">
               <a:rPr lang="en-US" smtClean="0"/>
-              <a:t>2/23/2023</a:t>
+              <a:t>11/26/2023</a:t>
             </a:fld>
             <a:endParaRPr lang="en-US"/>
           </a:p>
@@ -3670,10 +3601,9 @@
           </a:lstStyle>
           <a:p>
             <a:r>
-              <a:rPr lang="en-US" smtClean="0"/>
+              <a:rPr lang="en-US"/>
               <a:t>Click to edit Master title style</a:t>
             </a:r>
-            <a:endParaRPr lang="en-US"/>
           </a:p>
         </p:txBody>
       </p:sp>
@@ -3797,7 +3727,7 @@
           <a:p>
             <a:pPr lvl="0"/>
             <a:r>
-              <a:rPr lang="en-US" smtClean="0"/>
+              <a:rPr lang="en-US"/>
               <a:t>Click to edit Master text styles</a:t>
             </a:r>
           </a:p>
@@ -3820,7 +3750,7 @@
           <a:p>
             <a:fld id="{FE54115B-6CD9-43BC-8D55-E1FCD10AF002}" type="datetimeFigureOut">
               <a:rPr lang="en-US" smtClean="0"/>
-              <a:t>2/23/2023</a:t>
+              <a:t>11/26/2023</a:t>
             </a:fld>
             <a:endParaRPr lang="en-US"/>
           </a:p>
@@ -3914,10 +3844,9 @@
           <a:lstStyle/>
           <a:p>
             <a:r>
-              <a:rPr lang="en-US" smtClean="0"/>
+              <a:rPr lang="en-US"/>
               <a:t>Click to edit Master title style</a:t>
             </a:r>
-            <a:endParaRPr lang="en-US"/>
           </a:p>
         </p:txBody>
       </p:sp>
@@ -3938,38 +3867,37 @@
           <a:p>
             <a:pPr lvl="0"/>
             <a:r>
-              <a:rPr lang="en-US" smtClean="0"/>
+              <a:rPr lang="en-US"/>
               <a:t>Click to edit Master text styles</a:t>
             </a:r>
           </a:p>
           <a:p>
             <a:pPr lvl="1"/>
             <a:r>
-              <a:rPr lang="en-US" smtClean="0"/>
+              <a:rPr lang="en-US"/>
               <a:t>Second level</a:t>
             </a:r>
           </a:p>
           <a:p>
             <a:pPr lvl="2"/>
             <a:r>
-              <a:rPr lang="en-US" smtClean="0"/>
+              <a:rPr lang="en-US"/>
               <a:t>Third level</a:t>
             </a:r>
           </a:p>
           <a:p>
             <a:pPr lvl="3"/>
             <a:r>
-              <a:rPr lang="en-US" smtClean="0"/>
+              <a:rPr lang="en-US"/>
               <a:t>Fourth level</a:t>
             </a:r>
           </a:p>
           <a:p>
             <a:pPr lvl="4"/>
             <a:r>
-              <a:rPr lang="en-US" smtClean="0"/>
+              <a:rPr lang="en-US"/>
               <a:t>Fifth level</a:t>
             </a:r>
-            <a:endParaRPr lang="en-US"/>
           </a:p>
         </p:txBody>
       </p:sp>
@@ -3990,7 +3918,7 @@
           <a:p>
             <a:fld id="{FE54115B-6CD9-43BC-8D55-E1FCD10AF002}" type="datetimeFigureOut">
               <a:rPr lang="en-US" smtClean="0"/>
-              <a:t>2/23/2023</a:t>
+              <a:t>11/26/2023</a:t>
             </a:fld>
             <a:endParaRPr lang="en-US"/>
           </a:p>
@@ -4089,10 +4017,9 @@
           <a:lstStyle/>
           <a:p>
             <a:r>
-              <a:rPr lang="en-US" smtClean="0"/>
+              <a:rPr lang="en-US"/>
               <a:t>Click to edit Master title style</a:t>
             </a:r>
-            <a:endParaRPr lang="en-US"/>
           </a:p>
         </p:txBody>
       </p:sp>
@@ -4118,38 +4045,37 @@
           <a:p>
             <a:pPr lvl="0"/>
             <a:r>
-              <a:rPr lang="en-US" smtClean="0"/>
+              <a:rPr lang="en-US"/>
               <a:t>Click to edit Master text styles</a:t>
             </a:r>
           </a:p>
           <a:p>
             <a:pPr lvl="1"/>
             <a:r>
-              <a:rPr lang="en-US" smtClean="0"/>
+              <a:rPr lang="en-US"/>
               <a:t>Second level</a:t>
             </a:r>
           </a:p>
           <a:p>
             <a:pPr lvl="2"/>
             <a:r>
-              <a:rPr lang="en-US" smtClean="0"/>
+              <a:rPr lang="en-US"/>
               <a:t>Third level</a:t>
             </a:r>
           </a:p>
           <a:p>
             <a:pPr lvl="3"/>
             <a:r>
-              <a:rPr lang="en-US" smtClean="0"/>
+              <a:rPr lang="en-US"/>
               <a:t>Fourth level</a:t>
             </a:r>
           </a:p>
           <a:p>
             <a:pPr lvl="4"/>
             <a:r>
-              <a:rPr lang="en-US" smtClean="0"/>
+              <a:rPr lang="en-US"/>
               <a:t>Fifth level</a:t>
             </a:r>
-            <a:endParaRPr lang="en-US"/>
           </a:p>
         </p:txBody>
       </p:sp>
@@ -4170,7 +4096,7 @@
           <a:p>
             <a:fld id="{FE54115B-6CD9-43BC-8D55-E1FCD10AF002}" type="datetimeFigureOut">
               <a:rPr lang="en-US" smtClean="0"/>
-              <a:t>2/23/2023</a:t>
+              <a:t>11/26/2023</a:t>
             </a:fld>
             <a:endParaRPr lang="en-US"/>
           </a:p>
@@ -4276,10 +4202,9 @@
           </a:lstStyle>
           <a:p>
             <a:r>
-              <a:rPr lang="en-US" smtClean="0"/>
+              <a:rPr lang="en-US"/>
               <a:t>Click to edit Master title style</a:t>
             </a:r>
-            <a:endParaRPr lang="en-US"/>
           </a:p>
         </p:txBody>
       </p:sp>
@@ -4399,7 +4324,7 @@
           <a:p>
             <a:pPr lvl="0"/>
             <a:r>
-              <a:rPr lang="en-US" smtClean="0"/>
+              <a:rPr lang="en-US"/>
               <a:t>Click to edit Master text styles</a:t>
             </a:r>
           </a:p>
@@ -4430,7 +4355,7 @@
           <a:p>
             <a:fld id="{72CC6C99-819B-4E2C-B66B-9C4B0D9D41D3}" type="datetimeFigureOut">
               <a:rPr lang="en-US" smtClean="0"/>
-              <a:t>2/23/2023</a:t>
+              <a:t>11/26/2023</a:t>
             </a:fld>
             <a:endParaRPr lang="en-US"/>
           </a:p>
@@ -4496,13 +4421,6 @@
   <p:clrMapOvr>
     <a:masterClrMapping/>
   </p:clrMapOvr>
-  <p:timing>
-    <p:tnLst>
-      <p:par>
-        <p:cTn id="1" dur="indefinite" restart="never" nodeType="tmRoot"/>
-      </p:par>
-    </p:tnLst>
-  </p:timing>
 </p:sldLayout>
 </file>
 
@@ -4547,10 +4465,9 @@
           <a:lstStyle/>
           <a:p>
             <a:r>
-              <a:rPr lang="en-US" smtClean="0"/>
+              <a:rPr lang="en-US"/>
               <a:t>Click to edit Master title style</a:t>
             </a:r>
-            <a:endParaRPr lang="en-US"/>
           </a:p>
         </p:txBody>
       </p:sp>
@@ -4607,38 +4524,37 @@
           <a:p>
             <a:pPr lvl="0"/>
             <a:r>
-              <a:rPr lang="en-US" smtClean="0"/>
+              <a:rPr lang="en-US"/>
               <a:t>Click to edit Master text styles</a:t>
             </a:r>
           </a:p>
           <a:p>
             <a:pPr lvl="1"/>
             <a:r>
-              <a:rPr lang="en-US" smtClean="0"/>
+              <a:rPr lang="en-US"/>
               <a:t>Second level</a:t>
             </a:r>
           </a:p>
           <a:p>
             <a:pPr lvl="2"/>
             <a:r>
-              <a:rPr lang="en-US" smtClean="0"/>
+              <a:rPr lang="en-US"/>
               <a:t>Third level</a:t>
             </a:r>
           </a:p>
           <a:p>
             <a:pPr lvl="3"/>
             <a:r>
-              <a:rPr lang="en-US" smtClean="0"/>
+              <a:rPr lang="en-US"/>
               <a:t>Fourth level</a:t>
             </a:r>
           </a:p>
           <a:p>
             <a:pPr lvl="4"/>
             <a:r>
-              <a:rPr lang="en-US" smtClean="0"/>
+              <a:rPr lang="en-US"/>
               <a:t>Fifth level</a:t>
             </a:r>
-            <a:endParaRPr lang="en-US"/>
           </a:p>
         </p:txBody>
       </p:sp>
@@ -4695,38 +4611,37 @@
           <a:p>
             <a:pPr lvl="0"/>
             <a:r>
-              <a:rPr lang="en-US" smtClean="0"/>
+              <a:rPr lang="en-US"/>
               <a:t>Click to edit Master text styles</a:t>
             </a:r>
           </a:p>
           <a:p>
             <a:pPr lvl="1"/>
             <a:r>
-              <a:rPr lang="en-US" smtClean="0"/>
+              <a:rPr lang="en-US"/>
               <a:t>Second level</a:t>
             </a:r>
           </a:p>
           <a:p>
             <a:pPr lvl="2"/>
             <a:r>
-              <a:rPr lang="en-US" smtClean="0"/>
+              <a:rPr lang="en-US"/>
               <a:t>Third level</a:t>
             </a:r>
           </a:p>
           <a:p>
             <a:pPr lvl="3"/>
             <a:r>
-              <a:rPr lang="en-US" smtClean="0"/>
+              <a:rPr lang="en-US"/>
               <a:t>Fourth level</a:t>
             </a:r>
           </a:p>
           <a:p>
             <a:pPr lvl="4"/>
             <a:r>
-              <a:rPr lang="en-US" smtClean="0"/>
+              <a:rPr lang="en-US"/>
               <a:t>Fifth level</a:t>
             </a:r>
-            <a:endParaRPr lang="en-US"/>
           </a:p>
         </p:txBody>
       </p:sp>
@@ -4755,7 +4670,7 @@
           <a:p>
             <a:fld id="{72CC6C99-819B-4E2C-B66B-9C4B0D9D41D3}" type="datetimeFigureOut">
               <a:rPr lang="en-US" smtClean="0"/>
-              <a:t>2/23/2023</a:t>
+              <a:t>11/26/2023</a:t>
             </a:fld>
             <a:endParaRPr lang="en-US"/>
           </a:p>
@@ -4821,13 +4736,6 @@
   <p:clrMapOvr>
     <a:masterClrMapping/>
   </p:clrMapOvr>
-  <p:timing>
-    <p:tnLst>
-      <p:par>
-        <p:cTn id="1" dur="indefinite" restart="never" nodeType="tmRoot"/>
-      </p:par>
-    </p:tnLst>
-  </p:timing>
 </p:sldLayout>
 </file>
 
@@ -4876,10 +4784,9 @@
           </a:lstStyle>
           <a:p>
             <a:r>
-              <a:rPr lang="en-US" smtClean="0"/>
+              <a:rPr lang="en-US"/>
               <a:t>Click to edit Master title style</a:t>
             </a:r>
-            <a:endParaRPr lang="en-US"/>
           </a:p>
         </p:txBody>
       </p:sp>
@@ -4945,7 +4852,7 @@
           <a:p>
             <a:pPr lvl="0"/>
             <a:r>
-              <a:rPr lang="en-US" smtClean="0"/>
+              <a:rPr lang="en-US"/>
               <a:t>Click to edit Master text styles</a:t>
             </a:r>
           </a:p>
@@ -5004,38 +4911,37 @@
           <a:p>
             <a:pPr lvl="0"/>
             <a:r>
-              <a:rPr lang="en-US" smtClean="0"/>
+              <a:rPr lang="en-US"/>
               <a:t>Click to edit Master text styles</a:t>
             </a:r>
           </a:p>
           <a:p>
             <a:pPr lvl="1"/>
             <a:r>
-              <a:rPr lang="en-US" smtClean="0"/>
+              <a:rPr lang="en-US"/>
               <a:t>Second level</a:t>
             </a:r>
           </a:p>
           <a:p>
             <a:pPr lvl="2"/>
             <a:r>
-              <a:rPr lang="en-US" smtClean="0"/>
+              <a:rPr lang="en-US"/>
               <a:t>Third level</a:t>
             </a:r>
           </a:p>
           <a:p>
             <a:pPr lvl="3"/>
             <a:r>
-              <a:rPr lang="en-US" smtClean="0"/>
+              <a:rPr lang="en-US"/>
               <a:t>Fourth level</a:t>
             </a:r>
           </a:p>
           <a:p>
             <a:pPr lvl="4"/>
             <a:r>
-              <a:rPr lang="en-US" smtClean="0"/>
+              <a:rPr lang="en-US"/>
               <a:t>Fifth level</a:t>
             </a:r>
-            <a:endParaRPr lang="en-US"/>
           </a:p>
         </p:txBody>
       </p:sp>
@@ -5101,7 +5007,7 @@
           <a:p>
             <a:pPr lvl="0"/>
             <a:r>
-              <a:rPr lang="en-US" smtClean="0"/>
+              <a:rPr lang="en-US"/>
               <a:t>Click to edit Master text styles</a:t>
             </a:r>
           </a:p>
@@ -5160,38 +5066,37 @@
           <a:p>
             <a:pPr lvl="0"/>
             <a:r>
-              <a:rPr lang="en-US" smtClean="0"/>
+              <a:rPr lang="en-US"/>
               <a:t>Click to edit Master text styles</a:t>
             </a:r>
           </a:p>
           <a:p>
             <a:pPr lvl="1"/>
             <a:r>
-              <a:rPr lang="en-US" smtClean="0"/>
+              <a:rPr lang="en-US"/>
               <a:t>Second level</a:t>
             </a:r>
           </a:p>
           <a:p>
             <a:pPr lvl="2"/>
             <a:r>
-              <a:rPr lang="en-US" smtClean="0"/>
+              <a:rPr lang="en-US"/>
               <a:t>Third level</a:t>
             </a:r>
           </a:p>
           <a:p>
             <a:pPr lvl="3"/>
             <a:r>
-              <a:rPr lang="en-US" smtClean="0"/>
+              <a:rPr lang="en-US"/>
               <a:t>Fourth level</a:t>
             </a:r>
           </a:p>
           <a:p>
             <a:pPr lvl="4"/>
             <a:r>
-              <a:rPr lang="en-US" smtClean="0"/>
+              <a:rPr lang="en-US"/>
               <a:t>Fifth level</a:t>
             </a:r>
-            <a:endParaRPr lang="en-US"/>
           </a:p>
         </p:txBody>
       </p:sp>
@@ -5220,7 +5125,7 @@
           <a:p>
             <a:fld id="{72CC6C99-819B-4E2C-B66B-9C4B0D9D41D3}" type="datetimeFigureOut">
               <a:rPr lang="en-US" smtClean="0"/>
-              <a:t>2/23/2023</a:t>
+              <a:t>11/26/2023</a:t>
             </a:fld>
             <a:endParaRPr lang="en-US"/>
           </a:p>
@@ -5286,13 +5191,6 @@
   <p:clrMapOvr>
     <a:masterClrMapping/>
   </p:clrMapOvr>
-  <p:timing>
-    <p:tnLst>
-      <p:par>
-        <p:cTn id="1" dur="indefinite" restart="never" nodeType="tmRoot"/>
-      </p:par>
-    </p:tnLst>
-  </p:timing>
 </p:sldLayout>
 </file>
 
@@ -5337,10 +5235,9 @@
           <a:lstStyle/>
           <a:p>
             <a:r>
-              <a:rPr lang="en-US" smtClean="0"/>
+              <a:rPr lang="en-US"/>
               <a:t>Click to edit Master title style</a:t>
             </a:r>
-            <a:endParaRPr lang="en-US"/>
           </a:p>
         </p:txBody>
       </p:sp>
@@ -5369,7 +5266,7 @@
           <a:p>
             <a:fld id="{72CC6C99-819B-4E2C-B66B-9C4B0D9D41D3}" type="datetimeFigureOut">
               <a:rPr lang="en-US" smtClean="0"/>
-              <a:t>2/23/2023</a:t>
+              <a:t>11/26/2023</a:t>
             </a:fld>
             <a:endParaRPr lang="en-US"/>
           </a:p>
@@ -5435,13 +5332,6 @@
   <p:clrMapOvr>
     <a:masterClrMapping/>
   </p:clrMapOvr>
-  <p:timing>
-    <p:tnLst>
-      <p:par>
-        <p:cTn id="1" dur="indefinite" restart="never" nodeType="tmRoot"/>
-      </p:par>
-    </p:tnLst>
-  </p:timing>
 </p:sldLayout>
 </file>
 
@@ -5487,7 +5377,7 @@
           <a:p>
             <a:fld id="{72CC6C99-819B-4E2C-B66B-9C4B0D9D41D3}" type="datetimeFigureOut">
               <a:rPr lang="en-US" smtClean="0"/>
-              <a:t>2/23/2023</a:t>
+              <a:t>11/26/2023</a:t>
             </a:fld>
             <a:endParaRPr lang="en-US"/>
           </a:p>
@@ -5601,10 +5491,9 @@
           </a:lstStyle>
           <a:p>
             <a:r>
-              <a:rPr lang="en-US" smtClean="0"/>
+              <a:rPr lang="en-US"/>
               <a:t>Click to edit Master title style</a:t>
             </a:r>
-            <a:endParaRPr lang="en-US"/>
           </a:p>
         </p:txBody>
       </p:sp>
@@ -5661,38 +5550,37 @@
           <a:p>
             <a:pPr lvl="0"/>
             <a:r>
-              <a:rPr lang="en-US" smtClean="0"/>
+              <a:rPr lang="en-US"/>
               <a:t>Click to edit Master text styles</a:t>
             </a:r>
           </a:p>
           <a:p>
             <a:pPr lvl="1"/>
             <a:r>
-              <a:rPr lang="en-US" smtClean="0"/>
+              <a:rPr lang="en-US"/>
               <a:t>Second level</a:t>
             </a:r>
           </a:p>
           <a:p>
             <a:pPr lvl="2"/>
             <a:r>
-              <a:rPr lang="en-US" smtClean="0"/>
+              <a:rPr lang="en-US"/>
               <a:t>Third level</a:t>
             </a:r>
           </a:p>
           <a:p>
             <a:pPr lvl="3"/>
             <a:r>
-              <a:rPr lang="en-US" smtClean="0"/>
+              <a:rPr lang="en-US"/>
               <a:t>Fourth level</a:t>
             </a:r>
           </a:p>
           <a:p>
             <a:pPr lvl="4"/>
             <a:r>
-              <a:rPr lang="en-US" smtClean="0"/>
+              <a:rPr lang="en-US"/>
               <a:t>Fifth level</a:t>
             </a:r>
-            <a:endParaRPr lang="en-US"/>
           </a:p>
         </p:txBody>
       </p:sp>
@@ -5758,7 +5646,7 @@
           <a:p>
             <a:pPr lvl="0"/>
             <a:r>
-              <a:rPr lang="en-US" smtClean="0"/>
+              <a:rPr lang="en-US"/>
               <a:t>Click to edit Master text styles</a:t>
             </a:r>
           </a:p>
@@ -5789,7 +5677,7 @@
           <a:p>
             <a:fld id="{72CC6C99-819B-4E2C-B66B-9C4B0D9D41D3}" type="datetimeFigureOut">
               <a:rPr lang="en-US" smtClean="0"/>
-              <a:t>2/23/2023</a:t>
+              <a:t>11/26/2023</a:t>
             </a:fld>
             <a:endParaRPr lang="en-US"/>
           </a:p>
@@ -5903,10 +5791,9 @@
           </a:lstStyle>
           <a:p>
             <a:r>
-              <a:rPr lang="en-US" smtClean="0"/>
+              <a:rPr lang="en-US"/>
               <a:t>Click to edit Master title style</a:t>
             </a:r>
-            <a:endParaRPr lang="en-US"/>
           </a:p>
         </p:txBody>
       </p:sp>
@@ -6036,7 +5923,7 @@
           <a:p>
             <a:pPr lvl="0"/>
             <a:r>
-              <a:rPr lang="en-US" smtClean="0"/>
+              <a:rPr lang="en-US"/>
               <a:t>Click to edit Master text styles</a:t>
             </a:r>
           </a:p>
@@ -6067,7 +5954,7 @@
           <a:p>
             <a:fld id="{72CC6C99-819B-4E2C-B66B-9C4B0D9D41D3}" type="datetimeFigureOut">
               <a:rPr lang="en-US" smtClean="0"/>
-              <a:t>2/23/2023</a:t>
+              <a:t>11/26/2023</a:t>
             </a:fld>
             <a:endParaRPr lang="en-US"/>
           </a:p>
@@ -6406,35 +6293,7 @@
                 <a:ea typeface="Segoe UI" panose="020B0502040204020203" pitchFamily="34" charset="0"/>
                 <a:cs typeface="Segoe UI" panose="020B0502040204020203" pitchFamily="34" charset="0"/>
               </a:rPr>
-              <a:t> Copyright © </a:t>
-            </a:r>
-            <a:r>
-              <a:rPr lang="en-US" sz="700" dirty="0" smtClean="0">
-                <a:solidFill>
-                  <a:schemeClr val="tx1">
-                    <a:lumMod val="75000"/>
-                    <a:lumOff val="25000"/>
-                  </a:schemeClr>
-                </a:solidFill>
-                <a:latin typeface="Segoe UI Light" panose="020B0502040204020203" pitchFamily="34" charset="0"/>
-                <a:ea typeface="Segoe UI" panose="020B0502040204020203" pitchFamily="34" charset="0"/>
-                <a:cs typeface="Segoe UI" panose="020B0502040204020203" pitchFamily="34" charset="0"/>
-              </a:rPr>
-              <a:t>2020 </a:t>
-            </a:r>
-            <a:r>
-              <a:rPr lang="en-US" sz="700" dirty="0">
-                <a:solidFill>
-                  <a:schemeClr val="tx1">
-                    <a:lumMod val="75000"/>
-                    <a:lumOff val="25000"/>
-                  </a:schemeClr>
-                </a:solidFill>
-                <a:latin typeface="Segoe UI Light" panose="020B0502040204020203" pitchFamily="34" charset="0"/>
-                <a:ea typeface="Segoe UI" panose="020B0502040204020203" pitchFamily="34" charset="0"/>
-                <a:cs typeface="Segoe UI" panose="020B0502040204020203" pitchFamily="34" charset="0"/>
-              </a:rPr>
-              <a:t>Cybage Software Pvt. Ltd. All Rights Reserved. Cybage Confidential.</a:t>
+              <a:t> Copyright © 2020 Cybage Software Pvt. Ltd. All Rights Reserved. Cybage Confidential.</a:t>
             </a:r>
           </a:p>
         </p:txBody>
@@ -6462,7 +6321,7 @@
           <a:lstStyle/>
           <a:p>
             <a:r>
-              <a:rPr lang="en-US" sz="900" dirty="0" smtClean="0">
+              <a:rPr lang="en-US" sz="900" dirty="0">
                 <a:solidFill>
                   <a:schemeClr val="tx1">
                     <a:lumMod val="75000"/>
@@ -6511,13 +6370,6 @@
     <p:sldLayoutId id="2147483659" r:id="rId11"/>
     <p:sldLayoutId id="2147483672" r:id="rId12"/>
   </p:sldLayoutIdLst>
-  <p:timing>
-    <p:tnLst>
-      <p:par>
-        <p:cTn id="1" dur="indefinite" restart="never" nodeType="tmRoot"/>
-      </p:par>
-    </p:tnLst>
-  </p:timing>
   <p:txStyles>
     <p:titleStyle>
       <a:lvl1pPr algn="ctr" defTabSz="1005566" rtl="0" eaLnBrk="1" latinLnBrk="0" hangingPunct="1">
@@ -6819,10 +6671,9 @@
           <a:lstStyle/>
           <a:p>
             <a:r>
-              <a:rPr lang="en-US" smtClean="0"/>
+              <a:rPr lang="en-US"/>
               <a:t>Click to edit Master title style</a:t>
             </a:r>
-            <a:endParaRPr lang="en-US"/>
           </a:p>
         </p:txBody>
       </p:sp>
@@ -6853,38 +6704,37 @@
           <a:p>
             <a:pPr lvl="0"/>
             <a:r>
-              <a:rPr lang="en-US" smtClean="0"/>
+              <a:rPr lang="en-US"/>
               <a:t>Click to edit Master text styles</a:t>
             </a:r>
           </a:p>
           <a:p>
             <a:pPr lvl="1"/>
             <a:r>
-              <a:rPr lang="en-US" smtClean="0"/>
+              <a:rPr lang="en-US"/>
               <a:t>Second level</a:t>
             </a:r>
           </a:p>
           <a:p>
             <a:pPr lvl="2"/>
             <a:r>
-              <a:rPr lang="en-US" smtClean="0"/>
+              <a:rPr lang="en-US"/>
               <a:t>Third level</a:t>
             </a:r>
           </a:p>
           <a:p>
             <a:pPr lvl="3"/>
             <a:r>
-              <a:rPr lang="en-US" smtClean="0"/>
+              <a:rPr lang="en-US"/>
               <a:t>Fourth level</a:t>
             </a:r>
           </a:p>
           <a:p>
             <a:pPr lvl="4"/>
             <a:r>
-              <a:rPr lang="en-US" smtClean="0"/>
+              <a:rPr lang="en-US"/>
               <a:t>Fifth level</a:t>
             </a:r>
-            <a:endParaRPr lang="en-US"/>
           </a:p>
         </p:txBody>
       </p:sp>
@@ -6923,7 +6773,7 @@
           <a:p>
             <a:fld id="{FE54115B-6CD9-43BC-8D55-E1FCD10AF002}" type="datetimeFigureOut">
               <a:rPr lang="en-US" smtClean="0"/>
-              <a:t>2/23/2023</a:t>
+              <a:t>11/26/2023</a:t>
             </a:fld>
             <a:endParaRPr lang="en-US"/>
           </a:p>
@@ -7028,13 +6878,6 @@
     <p:sldLayoutId id="2147483670" r:id="rId10"/>
     <p:sldLayoutId id="2147483671" r:id="rId11"/>
   </p:sldLayoutIdLst>
-  <p:timing>
-    <p:tnLst>
-      <p:par>
-        <p:cTn id="1" dur="indefinite" restart="never" nodeType="tmRoot"/>
-      </p:par>
-    </p:tnLst>
-  </p:timing>
   <p:txStyles>
     <p:titleStyle>
       <a:lvl1pPr algn="ctr" defTabSz="914400" rtl="0" eaLnBrk="1" latinLnBrk="0" hangingPunct="1">
@@ -7512,7 +7355,7 @@
               <a:buNone/>
             </a:pPr>
             <a:r>
-              <a:rPr lang="en-US" sz="1400" b="1" dirty="0" smtClean="0">
+              <a:rPr lang="en-US" sz="1400" b="1" dirty="0">
                 <a:solidFill>
                   <a:srgbClr val="2B3B4B"/>
                 </a:solidFill>
@@ -7522,14 +7365,6 @@
               </a:rPr>
               <a:t>Lorem Ipsum Lorem Ipsum</a:t>
             </a:r>
-            <a:endParaRPr lang="en-US" sz="1400" b="1" dirty="0">
-              <a:solidFill>
-                <a:srgbClr val="2B3B4B"/>
-              </a:solidFill>
-              <a:latin typeface="Tahoma" panose="020B0604030504040204" pitchFamily="34" charset="0"/>
-              <a:ea typeface="Tahoma" panose="020B0604030504040204" pitchFamily="34" charset="0"/>
-              <a:cs typeface="Tahoma" panose="020B0604030504040204" pitchFamily="34" charset="0"/>
-            </a:endParaRPr>
           </a:p>
         </p:txBody>
       </p:sp>
@@ -7828,29 +7663,7 @@
                 <a:ea typeface="Segoe UI" panose="020B0502040204020203" pitchFamily="34" charset="0"/>
                 <a:cs typeface="Segoe UI" panose="020B0502040204020203" pitchFamily="34" charset="0"/>
               </a:rPr>
-              <a:t> Copyright © </a:t>
-            </a:r>
-            <a:r>
-              <a:rPr lang="en-US" sz="700" dirty="0" smtClean="0">
-                <a:solidFill>
-                  <a:schemeClr val="bg1"/>
-                </a:solidFill>
-                <a:latin typeface="Segoe UI Light" panose="020B0502040204020203" pitchFamily="34" charset="0"/>
-                <a:ea typeface="Segoe UI" panose="020B0502040204020203" pitchFamily="34" charset="0"/>
-                <a:cs typeface="Segoe UI" panose="020B0502040204020203" pitchFamily="34" charset="0"/>
-              </a:rPr>
-              <a:t>2020 </a:t>
-            </a:r>
-            <a:r>
-              <a:rPr lang="en-US" sz="700" dirty="0">
-                <a:solidFill>
-                  <a:schemeClr val="bg1"/>
-                </a:solidFill>
-                <a:latin typeface="Segoe UI Light" panose="020B0502040204020203" pitchFamily="34" charset="0"/>
-                <a:ea typeface="Segoe UI" panose="020B0502040204020203" pitchFamily="34" charset="0"/>
-                <a:cs typeface="Segoe UI" panose="020B0502040204020203" pitchFamily="34" charset="0"/>
-              </a:rPr>
-              <a:t>Cybage Software Pvt. Ltd. All Rights Reserved. Cybage Confidential.</a:t>
+              <a:t> Copyright © 2020 Cybage Software Pvt. Ltd. All Rights Reserved. Cybage Confidential.</a:t>
             </a:r>
           </a:p>
         </p:txBody>
@@ -7878,7 +7691,7 @@
           <a:lstStyle/>
           <a:p>
             <a:r>
-              <a:rPr lang="en-US" sz="1000" dirty="0" smtClean="0">
+              <a:rPr lang="en-US" sz="1000" dirty="0">
                 <a:solidFill>
                   <a:schemeClr val="bg1"/>
                 </a:solidFill>
@@ -8141,7 +7954,7 @@
           <a:p>
             <a:pPr algn="r"/>
             <a:r>
-              <a:rPr lang="en-US" sz="3600" dirty="0" smtClean="0">
+              <a:rPr lang="en-US" sz="3600" dirty="0">
                 <a:solidFill>
                   <a:srgbClr val="2B3B4B"/>
                 </a:solidFill>
@@ -8151,6 +7964,62 @@
               </a:rPr>
               <a:t>SonarQube</a:t>
             </a:r>
+          </a:p>
+        </p:txBody>
+      </p:sp>
+      <p:sp>
+        <p:nvSpPr>
+          <p:cNvPr id="4" name="Rectangle 3">
+            <a:extLst>
+              <a:ext uri="{FF2B5EF4-FFF2-40B4-BE49-F238E27FC236}">
+                <a16:creationId xmlns:a16="http://schemas.microsoft.com/office/drawing/2014/main" id="{D71E9677-C2A3-631B-6794-4F3546E8AF3A}"/>
+              </a:ext>
+            </a:extLst>
+          </p:cNvPr>
+          <p:cNvSpPr/>
+          <p:nvPr/>
+        </p:nvSpPr>
+        <p:spPr>
+          <a:xfrm>
+            <a:off x="1242016" y="1893030"/>
+            <a:ext cx="4049122" cy="762000"/>
+          </a:xfrm>
+          <a:prstGeom prst="rect">
+            <a:avLst/>
+          </a:prstGeom>
+        </p:spPr>
+        <p:style>
+          <a:lnRef idx="2">
+            <a:schemeClr val="accent1">
+              <a:shade val="15000"/>
+            </a:schemeClr>
+          </a:lnRef>
+          <a:fillRef idx="1">
+            <a:schemeClr val="accent1"/>
+          </a:fillRef>
+          <a:effectRef idx="0">
+            <a:schemeClr val="accent1"/>
+          </a:effectRef>
+          <a:fontRef idx="minor">
+            <a:schemeClr val="lt1"/>
+          </a:fontRef>
+        </p:style>
+        <p:txBody>
+          <a:bodyPr rtlCol="0" anchor="ctr"/>
+          <a:lstStyle/>
+          <a:p>
+            <a:pPr algn="ctr"/>
+            <a:r>
+              <a:rPr lang="en-US" sz="1200" b="0" i="1" dirty="0">
+                <a:solidFill>
+                  <a:srgbClr val="ECECF1"/>
+                </a:solidFill>
+                <a:effectLst/>
+                <a:latin typeface="Söhne"/>
+              </a:rPr>
+              <a:t>In simple terms, SonarQube, it is a platform ,used for continuous inspection of code quality , means it will help developers to understand Quality of code </a:t>
+            </a:r>
+            <a:endParaRPr lang="en-US" sz="1200" i="1" dirty="0"/>
           </a:p>
         </p:txBody>
       </p:sp>
@@ -8164,17 +8033,69 @@
   <p:clrMapOvr>
     <a:masterClrMapping/>
   </p:clrMapOvr>
-  <p:timing>
-    <p:tnLst>
-      <p:par>
-        <p:cTn id="1" dur="indefinite" restart="never" nodeType="tmRoot"/>
-      </p:par>
-    </p:tnLst>
-  </p:timing>
 </p:sld>
 </file>
 
 <file path=ppt/slides/slide10.xml><?xml version="1.0" encoding="utf-8"?>
+<p:sld xmlns:a="http://schemas.openxmlformats.org/drawingml/2006/main" xmlns:r="http://schemas.openxmlformats.org/officeDocument/2006/relationships" xmlns:p="http://schemas.openxmlformats.org/presentationml/2006/main">
+  <p:cSld>
+    <p:spTree>
+      <p:nvGrpSpPr>
+        <p:cNvPr id="1" name=""/>
+        <p:cNvGrpSpPr/>
+        <p:nvPr/>
+      </p:nvGrpSpPr>
+      <p:grpSpPr>
+        <a:xfrm>
+          <a:off x="0" y="0"/>
+          <a:ext cx="0" cy="0"/>
+          <a:chOff x="0" y="0"/>
+          <a:chExt cx="0" cy="0"/>
+        </a:xfrm>
+      </p:grpSpPr>
+      <p:sp>
+        <p:nvSpPr>
+          <p:cNvPr id="2" name="Title 1"/>
+          <p:cNvSpPr>
+            <a:spLocks noGrp="1"/>
+          </p:cNvSpPr>
+          <p:nvPr>
+            <p:ph type="title"/>
+          </p:nvPr>
+        </p:nvSpPr>
+        <p:spPr>
+          <a:xfrm>
+            <a:off x="685800" y="2448719"/>
+            <a:ext cx="8549640" cy="1124027"/>
+          </a:xfrm>
+        </p:spPr>
+        <p:txBody>
+          <a:bodyPr/>
+          <a:lstStyle/>
+          <a:p>
+            <a:pPr algn="ctr"/>
+            <a:r>
+              <a:rPr lang="en-US" dirty="0" err="1"/>
+              <a:t>DemoNstration</a:t>
+            </a:r>
+            <a:endParaRPr lang="en-US" dirty="0"/>
+          </a:p>
+        </p:txBody>
+      </p:sp>
+    </p:spTree>
+    <p:extLst>
+      <p:ext uri="{BB962C8B-B14F-4D97-AF65-F5344CB8AC3E}">
+        <p14:creationId xmlns:p14="http://schemas.microsoft.com/office/powerpoint/2010/main" val="755103224"/>
+      </p:ext>
+    </p:extLst>
+  </p:cSld>
+  <p:clrMapOvr>
+    <a:masterClrMapping/>
+  </p:clrMapOvr>
+</p:sld>
+</file>
+
+<file path=ppt/slides/slide11.xml><?xml version="1.0" encoding="utf-8"?>
 <p:sld xmlns:a="http://schemas.openxmlformats.org/drawingml/2006/main" xmlns:r="http://schemas.openxmlformats.org/officeDocument/2006/relationships" xmlns:p="http://schemas.openxmlformats.org/presentationml/2006/main">
   <p:cSld>
     <p:spTree>
@@ -9558,17 +9479,10 @@
   <p:clrMapOvr>
     <a:masterClrMapping/>
   </p:clrMapOvr>
-  <p:timing>
-    <p:tnLst>
-      <p:par>
-        <p:cTn id="1" dur="indefinite" restart="never" nodeType="tmRoot"/>
-      </p:par>
-    </p:tnLst>
-  </p:timing>
 </p:sld>
 </file>
 
-<file path=ppt/slides/slide11.xml><?xml version="1.0" encoding="utf-8"?>
+<file path=ppt/slides/slide12.xml><?xml version="1.0" encoding="utf-8"?>
 <p:sld xmlns:a="http://schemas.openxmlformats.org/drawingml/2006/main" xmlns:r="http://schemas.openxmlformats.org/officeDocument/2006/relationships" xmlns:p="http://schemas.openxmlformats.org/presentationml/2006/main">
   <p:cSld>
     <p:spTree>
@@ -9792,7 +9706,7 @@
               <a:buNone/>
             </a:pPr>
             <a:r>
-              <a:rPr lang="en-US" sz="1800" b="1" dirty="0" err="1" smtClean="0">
+              <a:rPr lang="en-US" sz="1800" b="1" dirty="0" err="1">
                 <a:solidFill>
                   <a:srgbClr val="2B3B4B"/>
                 </a:solidFill>
@@ -9877,17 +9791,10 @@
   <p:clrMapOvr>
     <a:masterClrMapping/>
   </p:clrMapOvr>
-  <p:timing>
-    <p:tnLst>
-      <p:par>
-        <p:cTn id="1" dur="indefinite" restart="never" nodeType="tmRoot"/>
-      </p:par>
-    </p:tnLst>
-  </p:timing>
 </p:sld>
 </file>
 
-<file path=ppt/slides/slide12.xml><?xml version="1.0" encoding="utf-8"?>
+<file path=ppt/slides/slide13.xml><?xml version="1.0" encoding="utf-8"?>
 <p:sld xmlns:a="http://schemas.openxmlformats.org/drawingml/2006/main" xmlns:r="http://schemas.openxmlformats.org/officeDocument/2006/relationships" xmlns:p="http://schemas.openxmlformats.org/presentationml/2006/main">
   <p:cSld>
     <p:spTree>
@@ -9955,17 +9862,10 @@
   <p:clrMapOvr>
     <a:masterClrMapping/>
   </p:clrMapOvr>
-  <p:timing>
-    <p:tnLst>
-      <p:par>
-        <p:cTn id="1" dur="indefinite" restart="never" nodeType="tmRoot"/>
-      </p:par>
-    </p:tnLst>
-  </p:timing>
 </p:sld>
 </file>
 
-<file path=ppt/slides/slide13.xml><?xml version="1.0" encoding="utf-8"?>
+<file path=ppt/slides/slide14.xml><?xml version="1.0" encoding="utf-8"?>
 <p:sld xmlns:a="http://schemas.openxmlformats.org/drawingml/2006/main" xmlns:r="http://schemas.openxmlformats.org/officeDocument/2006/relationships" xmlns:p="http://schemas.openxmlformats.org/presentationml/2006/main">
   <p:cSld>
     <p:spTree>
@@ -10189,7 +10089,7 @@
               <a:buNone/>
             </a:pPr>
             <a:r>
-              <a:rPr lang="en-US" sz="1400" b="1" dirty="0" smtClean="0">
+              <a:rPr lang="en-US" sz="1400" b="1" dirty="0">
                 <a:solidFill>
                   <a:srgbClr val="2B3B4B"/>
                 </a:solidFill>
@@ -10199,14 +10099,6 @@
               </a:rPr>
               <a:t>Lorem Ipsum Lorem Ipsum</a:t>
             </a:r>
-            <a:endParaRPr lang="en-US" sz="1400" b="1" dirty="0">
-              <a:solidFill>
-                <a:srgbClr val="2B3B4B"/>
-              </a:solidFill>
-              <a:latin typeface="Tahoma" panose="020B0604030504040204" pitchFamily="34" charset="0"/>
-              <a:ea typeface="Tahoma" panose="020B0604030504040204" pitchFamily="34" charset="0"/>
-              <a:cs typeface="Tahoma" panose="020B0604030504040204" pitchFamily="34" charset="0"/>
-            </a:endParaRPr>
           </a:p>
         </p:txBody>
       </p:sp>
@@ -10581,7 +10473,7 @@
               </a:lnSpc>
             </a:pPr>
             <a:r>
-              <a:rPr lang="en-US" sz="2800" dirty="0" smtClean="0">
+              <a:rPr lang="en-US" sz="2800" dirty="0">
                 <a:solidFill>
                   <a:srgbClr val="2B3B4B"/>
                 </a:solidFill>
@@ -10640,29 +10532,7 @@
                 <a:ea typeface="Segoe UI" panose="020B0502040204020203" pitchFamily="34" charset="0"/>
                 <a:cs typeface="Segoe UI" panose="020B0502040204020203" pitchFamily="34" charset="0"/>
               </a:rPr>
-              <a:t> Copyright © </a:t>
-            </a:r>
-            <a:r>
-              <a:rPr lang="en-US" sz="700" dirty="0" smtClean="0">
-                <a:solidFill>
-                  <a:schemeClr val="bg1"/>
-                </a:solidFill>
-                <a:latin typeface="Segoe UI Light" panose="020B0502040204020203" pitchFamily="34" charset="0"/>
-                <a:ea typeface="Segoe UI" panose="020B0502040204020203" pitchFamily="34" charset="0"/>
-                <a:cs typeface="Segoe UI" panose="020B0502040204020203" pitchFamily="34" charset="0"/>
-              </a:rPr>
-              <a:t>2020 </a:t>
-            </a:r>
-            <a:r>
-              <a:rPr lang="en-US" sz="700" dirty="0">
-                <a:solidFill>
-                  <a:schemeClr val="bg1"/>
-                </a:solidFill>
-                <a:latin typeface="Segoe UI Light" panose="020B0502040204020203" pitchFamily="34" charset="0"/>
-                <a:ea typeface="Segoe UI" panose="020B0502040204020203" pitchFamily="34" charset="0"/>
-                <a:cs typeface="Segoe UI" panose="020B0502040204020203" pitchFamily="34" charset="0"/>
-              </a:rPr>
-              <a:t>Cybage Software Pvt. Ltd. All Rights Reserved. Cybage Confidential.</a:t>
+              <a:t> Copyright © 2020 Cybage Software Pvt. Ltd. All Rights Reserved. Cybage Confidential.</a:t>
             </a:r>
           </a:p>
         </p:txBody>
@@ -10690,7 +10560,7 @@
           <a:lstStyle/>
           <a:p>
             <a:r>
-              <a:rPr lang="en-US" sz="900" dirty="0" smtClean="0">
+              <a:rPr lang="en-US" sz="900" dirty="0">
                 <a:solidFill>
                   <a:schemeClr val="bg1"/>
                 </a:solidFill>
@@ -10721,13 +10591,6 @@
   <p:clrMapOvr>
     <a:masterClrMapping/>
   </p:clrMapOvr>
-  <p:timing>
-    <p:tnLst>
-      <p:par>
-        <p:cTn id="1" dur="indefinite" restart="never" nodeType="tmRoot"/>
-      </p:par>
-    </p:tnLst>
-  </p:timing>
 </p:sld>
 </file>
 
@@ -10955,7 +10818,7 @@
               <a:buNone/>
             </a:pPr>
             <a:r>
-              <a:rPr lang="en-US" sz="1800" b="1" dirty="0" smtClean="0">
+              <a:rPr lang="en-US" sz="1800" b="1" dirty="0">
                 <a:solidFill>
                   <a:srgbClr val="2B3B4B"/>
                 </a:solidFill>
@@ -10965,14 +10828,6 @@
               </a:rPr>
               <a:t>Agenda</a:t>
             </a:r>
-            <a:endParaRPr lang="en-US" sz="1800" b="1" dirty="0">
-              <a:solidFill>
-                <a:srgbClr val="2B3B4B"/>
-              </a:solidFill>
-              <a:latin typeface="Tahoma" panose="020B0604030504040204" pitchFamily="34" charset="0"/>
-              <a:ea typeface="Tahoma" panose="020B0604030504040204" pitchFamily="34" charset="0"/>
-              <a:cs typeface="Tahoma" panose="020B0604030504040204" pitchFamily="34" charset="0"/>
-            </a:endParaRPr>
           </a:p>
         </p:txBody>
       </p:sp>
@@ -11016,7 +10871,7 @@
           </a:lstStyle>
           <a:p>
             <a:pPr algn="l"/>
-            <a:endParaRPr lang="en-US" sz="1400" dirty="0" smtClean="0">
+            <a:endParaRPr lang="en-US" sz="1400" dirty="0">
               <a:solidFill>
                 <a:schemeClr val="bg1">
                   <a:lumMod val="50000"/>
@@ -11038,7 +10893,7 @@
         <p:spPr>
           <a:xfrm>
             <a:off x="812800" y="1120907"/>
-            <a:ext cx="7086600" cy="3785652"/>
+            <a:ext cx="9245600" cy="3785652"/>
           </a:xfrm>
           <a:prstGeom prst="rect">
             <a:avLst/>
@@ -11059,8 +10914,12 @@
               <a:buChar char="•"/>
             </a:pPr>
             <a:r>
-              <a:rPr lang="en-US" dirty="0" smtClean="0"/>
-              <a:t>Why code analysis?</a:t>
+              <a:rPr lang="en-US" dirty="0"/>
+              <a:t>Why code analysis? </a:t>
+            </a:r>
+            <a:r>
+              <a:rPr lang="en-US" sz="1200" i="1" u="sng" dirty="0"/>
+              <a:t>Why we requires , purpose of usage</a:t>
             </a:r>
           </a:p>
           <a:p>
@@ -11072,14 +10931,29 @@
               <a:buChar char="•"/>
             </a:pPr>
             <a:r>
-              <a:rPr lang="en-US" dirty="0" smtClean="0"/>
-              <a:t>What is </a:t>
-            </a:r>
-            <a:r>
-              <a:rPr lang="en-US" dirty="0" err="1" smtClean="0"/>
-              <a:t>SonarQube</a:t>
-            </a:r>
-            <a:endParaRPr lang="en-US" dirty="0" smtClean="0"/>
+              <a:rPr lang="en-US" dirty="0"/>
+              <a:t>What is SonarQube  </a:t>
+            </a:r>
+            <a:r>
+              <a:rPr lang="en-US" sz="1200" i="1" u="sng" dirty="0"/>
+              <a:t>we</a:t>
+            </a:r>
+            <a:r>
+              <a:rPr lang="en-US" sz="1200" u="sng" dirty="0"/>
+              <a:t> </a:t>
+            </a:r>
+            <a:r>
+              <a:rPr lang="en-US" sz="1200" i="1" u="sng" dirty="0"/>
+              <a:t>will see in detail,  what is SQ concept all </a:t>
+            </a:r>
+            <a:r>
+              <a:rPr lang="en-US" sz="1200" i="1" u="sng" dirty="0" err="1"/>
+              <a:t>abt</a:t>
+            </a:r>
+            <a:r>
+              <a:rPr lang="en-US" sz="1200" i="1" u="sng" dirty="0"/>
+              <a:t> , and how it helps developer </a:t>
+            </a:r>
           </a:p>
           <a:p>
             <a:pPr marL="342900" indent="-342900">
@@ -11090,12 +10964,12 @@
               <a:buChar char="•"/>
             </a:pPr>
             <a:r>
-              <a:rPr lang="en-US" dirty="0" err="1" smtClean="0"/>
-              <a:t>SonarQube</a:t>
-            </a:r>
-            <a:r>
-              <a:rPr lang="en-US" dirty="0" smtClean="0"/>
-              <a:t> Architecture</a:t>
+              <a:rPr lang="en-US" dirty="0"/>
+              <a:t>SonarQube Architecture </a:t>
+            </a:r>
+            <a:r>
+              <a:rPr lang="en-US" sz="1200" i="1" u="sng" dirty="0"/>
+              <a:t>we will also see its architecture in detail</a:t>
             </a:r>
           </a:p>
           <a:p>
@@ -11107,13 +10981,14 @@
               <a:buChar char="•"/>
             </a:pPr>
             <a:r>
-              <a:rPr lang="en-US" dirty="0" err="1" smtClean="0"/>
-              <a:t>SonarQube</a:t>
-            </a:r>
-            <a:r>
-              <a:rPr lang="en-US" dirty="0" smtClean="0"/>
-              <a:t> Features</a:t>
-            </a:r>
+              <a:rPr lang="en-US" dirty="0"/>
+              <a:t>SonarQube Features </a:t>
+            </a:r>
+            <a:r>
+              <a:rPr lang="en-US" sz="1200" i="1" u="sng" dirty="0"/>
+              <a:t>we will overview see its different features in detail</a:t>
+            </a:r>
+            <a:endParaRPr lang="en-US" sz="1200" dirty="0"/>
           </a:p>
           <a:p>
             <a:pPr marL="342900" indent="-342900">
@@ -11124,8 +10999,12 @@
               <a:buChar char="•"/>
             </a:pPr>
             <a:r>
-              <a:rPr lang="en-US" dirty="0" smtClean="0"/>
-              <a:t>Available plugins</a:t>
+              <a:rPr lang="en-US" dirty="0"/>
+              <a:t>Available plugins </a:t>
+            </a:r>
+            <a:r>
+              <a:rPr lang="en-US" sz="1200" i="1" u="sng" dirty="0"/>
+              <a:t>what are the available plugins</a:t>
             </a:r>
           </a:p>
           <a:p>
@@ -11137,8 +11016,8 @@
               <a:buChar char="•"/>
             </a:pPr>
             <a:r>
-              <a:rPr lang="en-US" dirty="0" smtClean="0"/>
-              <a:t>Demonstration</a:t>
+              <a:rPr lang="en-US" dirty="0"/>
+              <a:t>Demonstration </a:t>
             </a:r>
           </a:p>
           <a:p>
@@ -11150,18 +11029,14 @@
               <a:buChar char="•"/>
             </a:pPr>
             <a:r>
-              <a:rPr lang="en-US" dirty="0" err="1" smtClean="0"/>
-              <a:t>SonarQube</a:t>
-            </a:r>
-            <a:r>
-              <a:rPr lang="en-US" dirty="0" smtClean="0"/>
-              <a:t> Editions </a:t>
-            </a:r>
-            <a:r>
-              <a:rPr lang="en-US" dirty="0" err="1" smtClean="0"/>
-              <a:t>comparision</a:t>
-            </a:r>
-            <a:endParaRPr lang="en-US" dirty="0" smtClean="0"/>
+              <a:rPr lang="en-US" dirty="0"/>
+              <a:t>SonarQube Editions comparison </a:t>
+            </a:r>
+            <a:r>
+              <a:rPr lang="en-US" sz="1200" i="1" u="sng" dirty="0"/>
+              <a:t>we will also see its different editions and there comparison  </a:t>
+            </a:r>
+            <a:endParaRPr lang="en-US" sz="1200" dirty="0"/>
           </a:p>
           <a:p>
             <a:pPr marL="342900" indent="-342900">
@@ -11172,10 +11047,25 @@
               <a:buChar char="•"/>
             </a:pPr>
             <a:r>
-              <a:rPr lang="en-US" dirty="0" err="1" smtClean="0"/>
+              <a:rPr lang="en-US" dirty="0" err="1"/>
               <a:t>SonarLint</a:t>
             </a:r>
-            <a:endParaRPr lang="en-US" dirty="0"/>
+            <a:r>
+              <a:rPr lang="en-US" dirty="0"/>
+              <a:t> </a:t>
+            </a:r>
+            <a:r>
+              <a:rPr lang="en-US" sz="1200" i="1" u="sng" dirty="0"/>
+              <a:t>IMP Concept of </a:t>
+            </a:r>
+            <a:r>
+              <a:rPr lang="en-US" sz="1200" i="1" u="sng" dirty="0" err="1"/>
+              <a:t>sonarlint</a:t>
+            </a:r>
+            <a:r>
+              <a:rPr lang="en-US" sz="1200" i="1" u="sng" dirty="0"/>
+              <a:t> , overview</a:t>
+            </a:r>
           </a:p>
         </p:txBody>
       </p:sp>
@@ -11189,13 +11079,6 @@
   <p:clrMapOvr>
     <a:masterClrMapping/>
   </p:clrMapOvr>
-  <p:timing>
-    <p:tnLst>
-      <p:par>
-        <p:cTn id="1" dur="indefinite" restart="never" nodeType="tmRoot"/>
-      </p:par>
-    </p:tnLst>
-  </p:timing>
 </p:sld>
 </file>
 
@@ -11273,7 +11156,7 @@
         <p:spPr>
           <a:xfrm>
             <a:off x="675277" y="696119"/>
-            <a:ext cx="3504201" cy="439869"/>
+            <a:ext cx="9383123" cy="838200"/>
           </a:xfrm>
           <a:prstGeom prst="rect">
             <a:avLst/>
@@ -11419,7 +11302,7 @@
             </a:lvl9pPr>
           </a:lstStyle>
           <a:p>
-            <a:pPr marL="0" indent="0">
+            <a:pPr marL="0" indent="0" algn="ctr">
               <a:buNone/>
             </a:pPr>
             <a:r>
@@ -11431,7 +11314,41 @@
                 <a:ea typeface="Tahoma" panose="020B0604030504040204" pitchFamily="34" charset="0"/>
                 <a:cs typeface="Tahoma" panose="020B0604030504040204" pitchFamily="34" charset="0"/>
               </a:rPr>
-              <a:t>Why Code Analysis?</a:t>
+              <a:t>Why Code Analysis?  </a:t>
+            </a:r>
+            <a:r>
+              <a:rPr lang="en-US" sz="1100" i="1" u="sng" dirty="0">
+                <a:solidFill>
+                  <a:srgbClr val="2B3B4B"/>
+                </a:solidFill>
+                <a:latin typeface="Tahoma" panose="020B0604030504040204" pitchFamily="34" charset="0"/>
+                <a:ea typeface="Tahoma" panose="020B0604030504040204" pitchFamily="34" charset="0"/>
+                <a:cs typeface="Tahoma" panose="020B0604030504040204" pitchFamily="34" charset="0"/>
+              </a:rPr>
+              <a:t>Before code analysis </a:t>
+            </a:r>
+            <a:r>
+              <a:rPr lang="en-US" sz="1100" i="1" u="sng" dirty="0">
+                <a:solidFill>
+                  <a:srgbClr val="2B3B4B"/>
+                </a:solidFill>
+                <a:latin typeface="Tahoma" panose="020B0604030504040204" pitchFamily="34" charset="0"/>
+                <a:ea typeface="Tahoma" panose="020B0604030504040204" pitchFamily="34" charset="0"/>
+                <a:cs typeface="Tahoma" panose="020B0604030504040204" pitchFamily="34" charset="0"/>
+                <a:sym typeface="Wingdings" panose="05000000000000000000" pitchFamily="2" charset="2"/>
+              </a:rPr>
+              <a:t> developer D1 developed code  _ he  wonders whether code developed is as per  standard coding practices or not  then for checking same he involves senior developers  it was time consuming mechanism </a:t>
+            </a:r>
+            <a:r>
+              <a:rPr lang="en-US" sz="1100" i="1" u="sng" dirty="0">
+                <a:solidFill>
+                  <a:srgbClr val="2B3B4B"/>
+                </a:solidFill>
+                <a:latin typeface="Tahoma" panose="020B0604030504040204" pitchFamily="34" charset="0"/>
+                <a:ea typeface="Tahoma" panose="020B0604030504040204" pitchFamily="34" charset="0"/>
+                <a:cs typeface="Tahoma" panose="020B0604030504040204" pitchFamily="34" charset="0"/>
+              </a:rPr>
+              <a:t>  to overcome  CA</a:t>
             </a:r>
           </a:p>
         </p:txBody>
@@ -11444,8 +11361,8 @@
         </p:nvSpPr>
         <p:spPr>
           <a:xfrm>
-            <a:off x="812800" y="1183620"/>
-            <a:ext cx="8534400" cy="3170099"/>
+            <a:off x="381000" y="1381919"/>
+            <a:ext cx="9677400" cy="3461845"/>
           </a:xfrm>
           <a:prstGeom prst="rect">
             <a:avLst/>
@@ -11466,16 +11383,22 @@
               <a:defRPr/>
             </a:pPr>
             <a:r>
-              <a:rPr lang="en-US" b="1" dirty="0">
+              <a:rPr lang="en-US" sz="1800" b="1" dirty="0">
                 <a:cs typeface="Segoe UI" panose="020B0502040204020203" pitchFamily="34" charset="0"/>
               </a:rPr>
               <a:t>Code</a:t>
             </a:r>
             <a:r>
-              <a:rPr lang="en-US" dirty="0">
+              <a:rPr lang="en-US" sz="1800" dirty="0">
                 <a:cs typeface="Segoe UI" panose="020B0502040204020203" pitchFamily="34" charset="0"/>
               </a:rPr>
-              <a:t> debugging without executing the program</a:t>
+              <a:t> debugging without executing the program </a:t>
+            </a:r>
+            <a:r>
+              <a:rPr lang="en-US" sz="1100" i="1" u="sng" dirty="0">
+                <a:cs typeface="Segoe UI" panose="020B0502040204020203" pitchFamily="34" charset="0"/>
+              </a:rPr>
+              <a:t>covered in TFVC  that how debugging can be carried out without  executing  </a:t>
             </a:r>
           </a:p>
           <a:p>
@@ -11488,22 +11411,28 @@
               <a:defRPr/>
             </a:pPr>
             <a:r>
-              <a:rPr lang="en-US" dirty="0">
+              <a:rPr lang="en-US" sz="1800" dirty="0">
                 <a:cs typeface="Segoe UI" panose="020B0502040204020203" pitchFamily="34" charset="0"/>
               </a:rPr>
               <a:t>Provides an understanding of </a:t>
             </a:r>
             <a:r>
-              <a:rPr lang="en-US" b="1" dirty="0">
+              <a:rPr lang="en-US" sz="1800" b="1" dirty="0">
                 <a:cs typeface="Segoe UI" panose="020B0502040204020203" pitchFamily="34" charset="0"/>
               </a:rPr>
               <a:t>code </a:t>
             </a:r>
             <a:r>
-              <a:rPr lang="en-US" dirty="0">
+              <a:rPr lang="en-US" sz="1800" dirty="0">
                 <a:cs typeface="Segoe UI" panose="020B0502040204020203" pitchFamily="34" charset="0"/>
               </a:rPr>
-              <a:t>structure</a:t>
+              <a:t>structure </a:t>
+            </a:r>
+            <a:r>
+              <a:rPr lang="en-US" sz="1200" i="1" u="sng" dirty="0">
+                <a:cs typeface="Segoe UI" panose="020B0502040204020203" pitchFamily="34" charset="0"/>
+              </a:rPr>
+              <a:t>so in upcoming  sessions , we will see on the dashboard  of SQ , that how the structure of code can properly be analyze </a:t>
             </a:r>
           </a:p>
           <a:p>
@@ -11516,11 +11445,27 @@
               <a:defRPr/>
             </a:pPr>
             <a:r>
-              <a:rPr lang="en-US" dirty="0">
+              <a:rPr lang="en-US" sz="1800" dirty="0">
                 <a:cs typeface="Segoe UI" panose="020B0502040204020203" pitchFamily="34" charset="0"/>
               </a:rPr>
-              <a:t>Checks for coding standards in program</a:t>
-            </a:r>
+              <a:t>Checks for coding standards in program  </a:t>
+            </a:r>
+            <a:r>
+              <a:rPr lang="en-US" sz="1000" i="1" u="sng" dirty="0">
+                <a:cs typeface="Segoe UI" panose="020B0502040204020203" pitchFamily="34" charset="0"/>
+              </a:rPr>
+              <a:t>as we have discusses above problem , using some Microsoft  rules  coding standards are defined </a:t>
+            </a:r>
+            <a:r>
+              <a:rPr lang="en-US" sz="1000" i="1" u="sng" dirty="0">
+                <a:cs typeface="Segoe UI" panose="020B0502040204020203" pitchFamily="34" charset="0"/>
+                <a:sym typeface="Wingdings" panose="05000000000000000000" pitchFamily="2" charset="2"/>
+              </a:rPr>
+              <a:t> and that are applied to code </a:t>
+            </a:r>
+            <a:endParaRPr lang="en-US" sz="1000" i="1" u="sng" dirty="0">
+              <a:cs typeface="Segoe UI" panose="020B0502040204020203" pitchFamily="34" charset="0"/>
+            </a:endParaRPr>
           </a:p>
           <a:p>
             <a:pPr marL="342900" indent="-342900">
@@ -11532,17 +11477,44 @@
               <a:defRPr/>
             </a:pPr>
             <a:r>
-              <a:rPr lang="en-US" b="1" dirty="0">
+              <a:rPr lang="en-US" sz="1800" b="1" dirty="0">
                 <a:cs typeface="Segoe UI" panose="020B0502040204020203" pitchFamily="34" charset="0"/>
               </a:rPr>
               <a:t>Code</a:t>
             </a:r>
             <a:r>
-              <a:rPr lang="en-US" dirty="0">
+              <a:rPr lang="en-US" sz="1800" dirty="0">
                 <a:cs typeface="Segoe UI" panose="020B0502040204020203" pitchFamily="34" charset="0"/>
               </a:rPr>
-              <a:t> as per industry standards</a:t>
-            </a:r>
+              <a:t> as per industry standards </a:t>
+            </a:r>
+            <a:r>
+              <a:rPr lang="en-US" sz="1200" i="1" u="sng" dirty="0">
+                <a:cs typeface="Segoe UI" panose="020B0502040204020203" pitchFamily="34" charset="0"/>
+              </a:rPr>
+              <a:t>just seen , </a:t>
+            </a:r>
+            <a:r>
+              <a:rPr lang="en-US" sz="1200" i="1" u="sng" dirty="0" err="1">
+                <a:cs typeface="Segoe UI" panose="020B0502040204020203" pitchFamily="34" charset="0"/>
+              </a:rPr>
+              <a:t>eg</a:t>
+            </a:r>
+            <a:r>
+              <a:rPr lang="en-US" sz="1200" i="1" u="sng" dirty="0">
+                <a:cs typeface="Segoe UI" panose="020B0502040204020203" pitchFamily="34" charset="0"/>
+              </a:rPr>
+              <a:t>  camel casing , unnecessary comments , hard coded variables  and </a:t>
+            </a:r>
+            <a:r>
+              <a:rPr lang="en-US" sz="1200" i="1" u="sng" dirty="0" err="1">
+                <a:cs typeface="Segoe UI" panose="020B0502040204020203" pitchFamily="34" charset="0"/>
+              </a:rPr>
+              <a:t>etc</a:t>
+            </a:r>
+            <a:endParaRPr lang="en-US" sz="1200" i="1" u="sng" dirty="0">
+              <a:cs typeface="Segoe UI" panose="020B0502040204020203" pitchFamily="34" charset="0"/>
+            </a:endParaRPr>
           </a:p>
           <a:p>
             <a:pPr marL="342900" indent="-342900">
@@ -11554,40 +11526,58 @@
               <a:defRPr/>
             </a:pPr>
             <a:r>
-              <a:rPr lang="en-US" b="1" dirty="0">
+              <a:rPr lang="en-US" sz="1800" b="1" dirty="0">
                 <a:cs typeface="Segoe UI" panose="020B0502040204020203" pitchFamily="34" charset="0"/>
               </a:rPr>
               <a:t>SCA tools</a:t>
             </a:r>
             <a:r>
-              <a:rPr lang="en-US" dirty="0">
+              <a:rPr lang="en-US" sz="1800" dirty="0">
                 <a:cs typeface="Segoe UI" panose="020B0502040204020203" pitchFamily="34" charset="0"/>
               </a:rPr>
               <a:t> - SonarQube, Code Climate, </a:t>
             </a:r>
             <a:r>
-              <a:rPr lang="en-US" dirty="0" err="1">
+              <a:rPr lang="en-US" sz="1800" dirty="0" err="1">
                 <a:cs typeface="Segoe UI" panose="020B0502040204020203" pitchFamily="34" charset="0"/>
               </a:rPr>
               <a:t>Checkmarx</a:t>
             </a:r>
             <a:r>
-              <a:rPr lang="en-US" dirty="0">
+              <a:rPr lang="en-US" sz="1800" dirty="0">
                 <a:cs typeface="Segoe UI" panose="020B0502040204020203" pitchFamily="34" charset="0"/>
               </a:rPr>
               <a:t>, </a:t>
             </a:r>
             <a:r>
-              <a:rPr lang="en-US" dirty="0" err="1">
+              <a:rPr lang="en-US" sz="1800" dirty="0" err="1">
                 <a:cs typeface="Segoe UI" panose="020B0502040204020203" pitchFamily="34" charset="0"/>
               </a:rPr>
               <a:t>SourceMeter</a:t>
             </a:r>
             <a:r>
-              <a:rPr lang="en-US" dirty="0">
+              <a:rPr lang="en-US" sz="1800" dirty="0">
                 <a:cs typeface="Segoe UI" panose="020B0502040204020203" pitchFamily="34" charset="0"/>
               </a:rPr>
-              <a:t> </a:t>
+              <a:t>  </a:t>
+            </a:r>
+            <a:r>
+              <a:rPr lang="en-US" sz="1200" i="1" u="sng" dirty="0">
+                <a:cs typeface="Segoe UI" panose="020B0502040204020203" pitchFamily="34" charset="0"/>
+              </a:rPr>
+              <a:t>we have different tool  for </a:t>
+            </a:r>
+            <a:r>
+              <a:rPr lang="en-US" sz="1200" i="1" u="sng" dirty="0" err="1">
+                <a:cs typeface="Segoe UI" panose="020B0502040204020203" pitchFamily="34" charset="0"/>
+              </a:rPr>
+              <a:t>sca</a:t>
+            </a:r>
+            <a:r>
+              <a:rPr lang="en-US" sz="1200" i="1" u="sng" dirty="0">
+                <a:cs typeface="Segoe UI" panose="020B0502040204020203" pitchFamily="34" charset="0"/>
+              </a:rPr>
+              <a:t> , SQ free ,other paid</a:t>
             </a:r>
           </a:p>
         </p:txBody>
@@ -11602,13 +11592,6 @@
   <p:clrMapOvr>
     <a:masterClrMapping/>
   </p:clrMapOvr>
-  <p:timing>
-    <p:tnLst>
-      <p:par>
-        <p:cTn id="1" dur="indefinite" restart="never" nodeType="tmRoot"/>
-      </p:par>
-    </p:tnLst>
-  </p:timing>
 </p:sld>
 </file>
 
@@ -11836,7 +11819,7 @@
               <a:buNone/>
             </a:pPr>
             <a:r>
-              <a:rPr lang="en-US" sz="1800" b="1" dirty="0" smtClean="0">
+              <a:rPr lang="en-US" sz="1800" b="1" dirty="0">
                 <a:solidFill>
                   <a:srgbClr val="2B3B4B"/>
                 </a:solidFill>
@@ -11844,38 +11827,8 @@
                 <a:ea typeface="Tahoma" panose="020B0604030504040204" pitchFamily="34" charset="0"/>
                 <a:cs typeface="Tahoma" panose="020B0604030504040204" pitchFamily="34" charset="0"/>
               </a:rPr>
-              <a:t>Static </a:t>
-            </a:r>
-            <a:r>
-              <a:rPr lang="en-US" sz="1800" b="1" dirty="0">
-                <a:solidFill>
-                  <a:srgbClr val="2B3B4B"/>
-                </a:solidFill>
-                <a:latin typeface="Tahoma" panose="020B0604030504040204" pitchFamily="34" charset="0"/>
-                <a:ea typeface="Tahoma" panose="020B0604030504040204" pitchFamily="34" charset="0"/>
-                <a:cs typeface="Tahoma" panose="020B0604030504040204" pitchFamily="34" charset="0"/>
-              </a:rPr>
-              <a:t>Code </a:t>
-            </a:r>
-            <a:r>
-              <a:rPr lang="en-US" sz="1800" b="1" dirty="0" smtClean="0">
-                <a:solidFill>
-                  <a:srgbClr val="2B3B4B"/>
-                </a:solidFill>
-                <a:latin typeface="Tahoma" panose="020B0604030504040204" pitchFamily="34" charset="0"/>
-                <a:ea typeface="Tahoma" panose="020B0604030504040204" pitchFamily="34" charset="0"/>
-                <a:cs typeface="Tahoma" panose="020B0604030504040204" pitchFamily="34" charset="0"/>
-              </a:rPr>
-              <a:t>Analysis</a:t>
-            </a:r>
-            <a:endParaRPr lang="en-US" sz="1800" b="1" dirty="0">
-              <a:solidFill>
-                <a:srgbClr val="2B3B4B"/>
-              </a:solidFill>
-              <a:latin typeface="Tahoma" panose="020B0604030504040204" pitchFamily="34" charset="0"/>
-              <a:ea typeface="Tahoma" panose="020B0604030504040204" pitchFamily="34" charset="0"/>
-              <a:cs typeface="Tahoma" panose="020B0604030504040204" pitchFamily="34" charset="0"/>
-            </a:endParaRPr>
+              <a:t>Static Code Analysis</a:t>
+            </a:r>
           </a:p>
         </p:txBody>
       </p:sp>
@@ -11888,7 +11841,7 @@
         <p:spPr>
           <a:xfrm>
             <a:off x="675278" y="1381919"/>
-            <a:ext cx="8849722" cy="3323987"/>
+            <a:ext cx="8849722" cy="3350276"/>
           </a:xfrm>
           <a:prstGeom prst="rect">
             <a:avLst/>
@@ -11909,9 +11862,22 @@
               <a:buChar char="•"/>
             </a:pPr>
             <a:r>
-              <a:rPr lang="en-US" dirty="0" smtClean="0"/>
-              <a:t>Collection of algorithms and techniques used to analyze source code in order to automatically  find potential errors or poor coding practices.</a:t>
-            </a:r>
+              <a:rPr lang="en-US" sz="1800" dirty="0"/>
+              <a:t>Collection of algorithms and techniques used to analyze source code in order to automatically  find potential errors or poor coding practices. </a:t>
+            </a:r>
+            <a:r>
+              <a:rPr lang="en-US" sz="1200" i="1" u="sng" dirty="0"/>
+              <a:t>Its self descriptive </a:t>
+            </a:r>
+            <a:r>
+              <a:rPr lang="en-US" sz="1200" i="1" u="sng" dirty="0" err="1"/>
+              <a:t>defn</a:t>
+            </a:r>
+            <a:r>
+              <a:rPr lang="en-US" sz="1200" i="1" u="sng" dirty="0"/>
+              <a:t> ,  using  different set of programs  , we will firstly scan our project code , and depending on that results of scanning , automatically  all the potential error ,defects , bugs and poor coding practices will be analyzed  and will be displayed </a:t>
+            </a:r>
+            <a:endParaRPr lang="en-US" sz="1800" dirty="0"/>
           </a:p>
           <a:p>
             <a:pPr marL="342900" indent="-342900">
@@ -11921,18 +11887,8 @@
               <a:buFont typeface="Arial" panose="020B0604020202020204" pitchFamily="34" charset="0"/>
               <a:buChar char="•"/>
             </a:pPr>
-            <a:endParaRPr lang="en-US" dirty="0" smtClean="0"/>
-          </a:p>
-          <a:p>
-            <a:pPr marL="342900" indent="-342900">
-              <a:lnSpc>
-                <a:spcPct val="150000"/>
-              </a:lnSpc>
-              <a:buFont typeface="Arial" panose="020B0604020202020204" pitchFamily="34" charset="0"/>
-              <a:buChar char="•"/>
-            </a:pPr>
-            <a:r>
-              <a:rPr lang="en-US" dirty="0" smtClean="0"/>
+            <a:r>
+              <a:rPr lang="en-US" sz="1800" dirty="0"/>
               <a:t>Tasks solved:</a:t>
             </a:r>
           </a:p>
@@ -11943,12 +11899,12 @@
               </a:lnSpc>
             </a:pPr>
             <a:r>
-              <a:rPr lang="en-US" dirty="0"/>
-              <a:t>	</a:t>
-            </a:r>
-            <a:r>
-              <a:rPr lang="en-US" dirty="0" smtClean="0"/>
-              <a:t>1.) Detecting errors in programs</a:t>
+              <a:rPr lang="en-US" sz="1800" dirty="0"/>
+              <a:t>	1.) Detecting errors in programs </a:t>
+            </a:r>
+            <a:r>
+              <a:rPr lang="en-US" sz="1200" i="1" u="sng" dirty="0"/>
+              <a:t>self </a:t>
             </a:r>
           </a:p>
           <a:p>
@@ -11958,12 +11914,12 @@
               </a:lnSpc>
             </a:pPr>
             <a:r>
-              <a:rPr lang="en-US" dirty="0"/>
-              <a:t>	</a:t>
-            </a:r>
-            <a:r>
-              <a:rPr lang="en-US" dirty="0" smtClean="0"/>
-              <a:t>2.) Recommendations on code formatting</a:t>
+              <a:rPr lang="en-US" sz="1800" dirty="0"/>
+              <a:t>	2.) Recommendations on code formatting  </a:t>
+            </a:r>
+            <a:r>
+              <a:rPr lang="en-US" sz="1100" i="1" u="sng" dirty="0"/>
+              <a:t>it will recommend you different things as per languages  what will be better  for code  </a:t>
             </a:r>
           </a:p>
           <a:p>
@@ -11973,14 +11929,9 @@
               </a:lnSpc>
             </a:pPr>
             <a:r>
-              <a:rPr lang="en-US" dirty="0"/>
-              <a:t>	</a:t>
-            </a:r>
-            <a:r>
-              <a:rPr lang="en-US" dirty="0" smtClean="0"/>
-              <a:t>3.) Metrics computation      	</a:t>
-            </a:r>
-            <a:endParaRPr lang="en-US" dirty="0"/>
+              <a:rPr lang="en-US" sz="1800" dirty="0"/>
+              <a:t>	3.) Metrics computation        	</a:t>
+            </a:r>
           </a:p>
         </p:txBody>
       </p:sp>
@@ -11994,13 +11945,6 @@
   <p:clrMapOvr>
     <a:masterClrMapping/>
   </p:clrMapOvr>
-  <p:timing>
-    <p:tnLst>
-      <p:par>
-        <p:cTn id="1" dur="indefinite" restart="never" nodeType="tmRoot"/>
-      </p:par>
-    </p:tnLst>
-  </p:timing>
 </p:sld>
 </file>
 
@@ -12271,8 +12215,8 @@
         </p:nvSpPr>
         <p:spPr>
           <a:xfrm>
-            <a:off x="952500" y="1610519"/>
-            <a:ext cx="8534400" cy="2708434"/>
+            <a:off x="76200" y="1610519"/>
+            <a:ext cx="9982200" cy="2962349"/>
           </a:xfrm>
           <a:prstGeom prst="rect">
             <a:avLst/>
@@ -12293,16 +12237,12 @@
               <a:buChar char="•"/>
             </a:pPr>
             <a:r>
-              <a:rPr lang="en-US" dirty="0" smtClean="0"/>
-              <a:t>Project for </a:t>
-            </a:r>
-            <a:r>
               <a:rPr lang="en-US" dirty="0"/>
-              <a:t>continuous inspection of code </a:t>
-            </a:r>
-            <a:r>
-              <a:rPr lang="en-US" dirty="0" smtClean="0"/>
-              <a:t>quality</a:t>
+              <a:t>Project for continuous inspection of code quality </a:t>
+            </a:r>
+            <a:r>
+              <a:rPr lang="en-US" sz="1100" i="1" u="sng" dirty="0"/>
+              <a:t>we have just seen in first slide</a:t>
             </a:r>
           </a:p>
           <a:p>
@@ -12314,8 +12254,12 @@
               <a:buChar char="•"/>
             </a:pPr>
             <a:r>
-              <a:rPr lang="en-US" dirty="0" smtClean="0"/>
-              <a:t>Combines static and dynamic analysis tools</a:t>
+              <a:rPr lang="en-US" dirty="0"/>
+              <a:t>Combines static and dynamic analysis tools </a:t>
+            </a:r>
+            <a:r>
+              <a:rPr lang="en-US" sz="1200" i="1" u="sng" dirty="0"/>
+              <a:t>self  </a:t>
             </a:r>
           </a:p>
           <a:p>
@@ -12327,9 +12271,30 @@
               <a:buChar char="•"/>
             </a:pPr>
             <a:r>
-              <a:rPr lang="en-US" dirty="0" smtClean="0"/>
-              <a:t>Analyze the source code from different perspective and drill down the code layer by layer, module by module level to class level.</a:t>
-            </a:r>
+              <a:rPr lang="en-US" dirty="0"/>
+              <a:t>Analyze the source code from different perspective and drill down the code layer by layer, module by module level to class level. </a:t>
+            </a:r>
+            <a:r>
+              <a:rPr lang="en-US" sz="1100" i="1" u="sng" dirty="0"/>
+              <a:t>First  modules will be scanned  </a:t>
+            </a:r>
+            <a:r>
+              <a:rPr lang="en-US" sz="1100" i="1" u="sng" dirty="0">
+                <a:sym typeface="Wingdings" panose="05000000000000000000" pitchFamily="2" charset="2"/>
+              </a:rPr>
+              <a:t> </a:t>
+            </a:r>
+            <a:r>
+              <a:rPr lang="en-US" sz="1100" i="1" u="sng" dirty="0"/>
+              <a:t>classes  </a:t>
+            </a:r>
+            <a:r>
+              <a:rPr lang="en-US" sz="1100" i="1" u="sng" dirty="0">
+                <a:sym typeface="Wingdings" panose="05000000000000000000" pitchFamily="2" charset="2"/>
+              </a:rPr>
+              <a:t> function lines of code  finally variables  this is the drilling  </a:t>
+            </a:r>
+            <a:endParaRPr lang="en-US" sz="1100" i="1" u="sng" dirty="0"/>
           </a:p>
           <a:p>
             <a:pPr marL="342900" indent="-342900">
@@ -12340,25 +12305,19 @@
               <a:buChar char="•"/>
             </a:pPr>
             <a:r>
-              <a:rPr lang="en-US" dirty="0" smtClean="0"/>
-              <a:t>Latest version is SonarQube </a:t>
-            </a:r>
-            <a:r>
-              <a:rPr lang="en-US" dirty="0" smtClean="0"/>
-              <a:t>9.9</a:t>
-            </a:r>
-            <a:endParaRPr lang="en-US" dirty="0" smtClean="0"/>
-          </a:p>
-          <a:p>
-            <a:r>
               <a:rPr lang="en-US" dirty="0"/>
-              <a:t> </a:t>
-            </a:r>
-            <a:r>
-              <a:rPr lang="en-US" dirty="0" smtClean="0"/>
-              <a:t>     But always recommended to use Long term support version(currently 8.9)</a:t>
-            </a:r>
-            <a:endParaRPr lang="en-US" dirty="0"/>
+              <a:t>Latest version is SonarQube 9.9</a:t>
+            </a:r>
+          </a:p>
+          <a:p>
+            <a:r>
+              <a:rPr lang="en-US" dirty="0"/>
+              <a:t>      But always recommended to use Long term support version(currently 8.9) </a:t>
+            </a:r>
+            <a:r>
+              <a:rPr lang="en-US" sz="1200" i="1" u="sng" dirty="0"/>
+              <a:t>why long term support ?  </a:t>
+            </a:r>
           </a:p>
         </p:txBody>
       </p:sp>
@@ -12372,13 +12331,6 @@
   <p:clrMapOvr>
     <a:masterClrMapping/>
   </p:clrMapOvr>
-  <p:timing>
-    <p:tnLst>
-      <p:par>
-        <p:cTn id="1" dur="indefinite" restart="never" nodeType="tmRoot"/>
-      </p:par>
-    </p:tnLst>
-  </p:timing>
 </p:sld>
 </file>
 
@@ -12606,7 +12558,7 @@
               <a:buNone/>
             </a:pPr>
             <a:r>
-              <a:rPr lang="en-US" sz="1800" b="1" dirty="0" err="1">
+              <a:rPr lang="en-US" sz="1800" b="1" dirty="0">
                 <a:solidFill>
                   <a:srgbClr val="2B3B4B"/>
                 </a:solidFill>
@@ -12614,18 +12566,7 @@
                 <a:ea typeface="Tahoma" panose="020B0604030504040204" pitchFamily="34" charset="0"/>
                 <a:cs typeface="Tahoma" panose="020B0604030504040204" pitchFamily="34" charset="0"/>
               </a:rPr>
-              <a:t>SonarQube</a:t>
-            </a:r>
-            <a:r>
-              <a:rPr lang="en-US" sz="1800" b="1" dirty="0">
-                <a:solidFill>
-                  <a:srgbClr val="2B3B4B"/>
-                </a:solidFill>
-                <a:latin typeface="Tahoma" panose="020B0604030504040204" pitchFamily="34" charset="0"/>
-                <a:ea typeface="Tahoma" panose="020B0604030504040204" pitchFamily="34" charset="0"/>
-                <a:cs typeface="Tahoma" panose="020B0604030504040204" pitchFamily="34" charset="0"/>
-              </a:rPr>
-              <a:t> Architecture</a:t>
+              <a:t>SonarQube Architecture</a:t>
             </a:r>
           </a:p>
         </p:txBody>
@@ -12663,6 +12604,250 @@
           </a:ln>
         </p:spPr>
       </p:pic>
+      <p:sp>
+        <p:nvSpPr>
+          <p:cNvPr id="2" name="Rectangle 1">
+            <a:extLst>
+              <a:ext uri="{FF2B5EF4-FFF2-40B4-BE49-F238E27FC236}">
+                <a16:creationId xmlns:a16="http://schemas.microsoft.com/office/drawing/2014/main" id="{5347B7CB-9E8F-5E2F-FAD0-79209DEBD5E7}"/>
+              </a:ext>
+            </a:extLst>
+          </p:cNvPr>
+          <p:cNvSpPr/>
+          <p:nvPr/>
+        </p:nvSpPr>
+        <p:spPr>
+          <a:xfrm>
+            <a:off x="76200" y="1839119"/>
+            <a:ext cx="1943420" cy="439870"/>
+          </a:xfrm>
+          <a:prstGeom prst="rect">
+            <a:avLst/>
+          </a:prstGeom>
+        </p:spPr>
+        <p:style>
+          <a:lnRef idx="2">
+            <a:schemeClr val="accent1">
+              <a:shade val="15000"/>
+            </a:schemeClr>
+          </a:lnRef>
+          <a:fillRef idx="1">
+            <a:schemeClr val="accent1"/>
+          </a:fillRef>
+          <a:effectRef idx="0">
+            <a:schemeClr val="accent1"/>
+          </a:effectRef>
+          <a:fontRef idx="minor">
+            <a:schemeClr val="lt1"/>
+          </a:fontRef>
+        </p:style>
+        <p:txBody>
+          <a:bodyPr rtlCol="0" anchor="ctr"/>
+          <a:lstStyle/>
+          <a:p>
+            <a:pPr algn="ctr"/>
+            <a:r>
+              <a:rPr lang="en-US" sz="1100" dirty="0"/>
+              <a:t>Developer will write code in its respective language</a:t>
+            </a:r>
+          </a:p>
+        </p:txBody>
+      </p:sp>
+      <p:sp>
+        <p:nvSpPr>
+          <p:cNvPr id="3" name="Rectangle 2">
+            <a:extLst>
+              <a:ext uri="{FF2B5EF4-FFF2-40B4-BE49-F238E27FC236}">
+                <a16:creationId xmlns:a16="http://schemas.microsoft.com/office/drawing/2014/main" id="{49BD42F4-5322-979E-04EB-C51A16473987}"/>
+              </a:ext>
+            </a:extLst>
+          </p:cNvPr>
+          <p:cNvSpPr/>
+          <p:nvPr/>
+        </p:nvSpPr>
+        <p:spPr>
+          <a:xfrm>
+            <a:off x="3733800" y="1065781"/>
+            <a:ext cx="4495800" cy="439870"/>
+          </a:xfrm>
+          <a:prstGeom prst="rect">
+            <a:avLst/>
+          </a:prstGeom>
+        </p:spPr>
+        <p:style>
+          <a:lnRef idx="2">
+            <a:schemeClr val="accent1">
+              <a:shade val="15000"/>
+            </a:schemeClr>
+          </a:lnRef>
+          <a:fillRef idx="1">
+            <a:schemeClr val="accent1"/>
+          </a:fillRef>
+          <a:effectRef idx="0">
+            <a:schemeClr val="accent1"/>
+          </a:effectRef>
+          <a:fontRef idx="minor">
+            <a:schemeClr val="lt1"/>
+          </a:fontRef>
+        </p:style>
+        <p:txBody>
+          <a:bodyPr rtlCol="0" anchor="ctr"/>
+          <a:lstStyle/>
+          <a:p>
+            <a:pPr algn="ctr"/>
+            <a:r>
+              <a:rPr lang="en-US" sz="1000" dirty="0"/>
+              <a:t>2ndly. There is a Server , it will be on anyone's machine  from team , and it is a combination of 3 things </a:t>
+            </a:r>
+          </a:p>
+        </p:txBody>
+      </p:sp>
+      <p:sp>
+        <p:nvSpPr>
+          <p:cNvPr id="7" name="Rectangle 6">
+            <a:extLst>
+              <a:ext uri="{FF2B5EF4-FFF2-40B4-BE49-F238E27FC236}">
+                <a16:creationId xmlns:a16="http://schemas.microsoft.com/office/drawing/2014/main" id="{DAD87351-DF44-E22B-3F42-7CEFE8434C89}"/>
+              </a:ext>
+            </a:extLst>
+          </p:cNvPr>
+          <p:cNvSpPr/>
+          <p:nvPr/>
+        </p:nvSpPr>
+        <p:spPr>
+          <a:xfrm>
+            <a:off x="8305800" y="2207822"/>
+            <a:ext cx="533400" cy="142334"/>
+          </a:xfrm>
+          <a:prstGeom prst="rect">
+            <a:avLst/>
+          </a:prstGeom>
+        </p:spPr>
+        <p:style>
+          <a:lnRef idx="2">
+            <a:schemeClr val="accent1">
+              <a:shade val="15000"/>
+            </a:schemeClr>
+          </a:lnRef>
+          <a:fillRef idx="1">
+            <a:schemeClr val="accent1"/>
+          </a:fillRef>
+          <a:effectRef idx="0">
+            <a:schemeClr val="accent1"/>
+          </a:effectRef>
+          <a:fontRef idx="minor">
+            <a:schemeClr val="lt1"/>
+          </a:fontRef>
+        </p:style>
+        <p:txBody>
+          <a:bodyPr rtlCol="0" anchor="ctr"/>
+          <a:lstStyle/>
+          <a:p>
+            <a:pPr algn="ctr"/>
+            <a:r>
+              <a:rPr lang="en-US" sz="1100" dirty="0"/>
+              <a:t>3rdly </a:t>
+            </a:r>
+          </a:p>
+        </p:txBody>
+      </p:sp>
+      <p:sp>
+        <p:nvSpPr>
+          <p:cNvPr id="8" name="Rectangle 7">
+            <a:extLst>
+              <a:ext uri="{FF2B5EF4-FFF2-40B4-BE49-F238E27FC236}">
+                <a16:creationId xmlns:a16="http://schemas.microsoft.com/office/drawing/2014/main" id="{753E9CA1-C1EF-B28A-75EA-D6165FD579E9}"/>
+              </a:ext>
+            </a:extLst>
+          </p:cNvPr>
+          <p:cNvSpPr/>
+          <p:nvPr/>
+        </p:nvSpPr>
+        <p:spPr>
+          <a:xfrm>
+            <a:off x="1981200" y="3591719"/>
+            <a:ext cx="2514600" cy="304800"/>
+          </a:xfrm>
+          <a:prstGeom prst="rect">
+            <a:avLst/>
+          </a:prstGeom>
+        </p:spPr>
+        <p:style>
+          <a:lnRef idx="2">
+            <a:schemeClr val="accent1">
+              <a:shade val="15000"/>
+            </a:schemeClr>
+          </a:lnRef>
+          <a:fillRef idx="1">
+            <a:schemeClr val="accent1"/>
+          </a:fillRef>
+          <a:effectRef idx="0">
+            <a:schemeClr val="accent1"/>
+          </a:effectRef>
+          <a:fontRef idx="minor">
+            <a:schemeClr val="lt1"/>
+          </a:fontRef>
+        </p:style>
+        <p:txBody>
+          <a:bodyPr rtlCol="0" anchor="ctr"/>
+          <a:lstStyle/>
+          <a:p>
+            <a:pPr algn="ctr"/>
+            <a:r>
+              <a:rPr lang="en-US" sz="900" dirty="0"/>
+              <a:t>4thly:  there will be different scanners  depending on languages</a:t>
+            </a:r>
+          </a:p>
+        </p:txBody>
+      </p:sp>
+      <p:sp>
+        <p:nvSpPr>
+          <p:cNvPr id="10" name="Rectangle 9">
+            <a:extLst>
+              <a:ext uri="{FF2B5EF4-FFF2-40B4-BE49-F238E27FC236}">
+                <a16:creationId xmlns:a16="http://schemas.microsoft.com/office/drawing/2014/main" id="{D3783B4D-BA39-4B35-58BF-B4C7FA5E1B58}"/>
+              </a:ext>
+            </a:extLst>
+          </p:cNvPr>
+          <p:cNvSpPr/>
+          <p:nvPr/>
+        </p:nvSpPr>
+        <p:spPr>
+          <a:xfrm>
+            <a:off x="533400" y="4478590"/>
+            <a:ext cx="9601200" cy="304800"/>
+          </a:xfrm>
+          <a:prstGeom prst="rect">
+            <a:avLst/>
+          </a:prstGeom>
+        </p:spPr>
+        <p:style>
+          <a:lnRef idx="2">
+            <a:schemeClr val="accent1">
+              <a:shade val="15000"/>
+            </a:schemeClr>
+          </a:lnRef>
+          <a:fillRef idx="1">
+            <a:schemeClr val="accent1"/>
+          </a:fillRef>
+          <a:effectRef idx="0">
+            <a:schemeClr val="accent1"/>
+          </a:effectRef>
+          <a:fontRef idx="minor">
+            <a:schemeClr val="lt1"/>
+          </a:fontRef>
+        </p:style>
+        <p:txBody>
+          <a:bodyPr rtlCol="0" anchor="ctr"/>
+          <a:lstStyle/>
+          <a:p>
+            <a:r>
+              <a:rPr lang="en-US" sz="900" dirty="0"/>
+              <a:t>SQ architecture can be configured  on one  machine or in distributed environment ,  on same machine means IMAGE  , and on distributed machine means  we can configure the SQ server  and  DB on some common machine  , and  rest of the team using  there  code  and sonar scanner on there  machine   , can sent there analysis on common machine   </a:t>
+            </a:r>
+          </a:p>
+        </p:txBody>
+      </p:sp>
     </p:spTree>
     <p:extLst>
       <p:ext uri="{BB962C8B-B14F-4D97-AF65-F5344CB8AC3E}">
@@ -12673,17 +12858,377 @@
   <p:clrMapOvr>
     <a:masterClrMapping/>
   </p:clrMapOvr>
-  <p:timing>
-    <p:tnLst>
-      <p:par>
-        <p:cTn id="1" dur="indefinite" restart="never" nodeType="tmRoot"/>
-      </p:par>
-    </p:tnLst>
-  </p:timing>
 </p:sld>
 </file>
 
 <file path=ppt/slides/slide7.xml><?xml version="1.0" encoding="utf-8"?>
+<p:sld xmlns:a="http://schemas.openxmlformats.org/drawingml/2006/main" xmlns:r="http://schemas.openxmlformats.org/officeDocument/2006/relationships" xmlns:p="http://schemas.openxmlformats.org/presentationml/2006/main">
+  <p:cSld>
+    <p:spTree>
+      <p:nvGrpSpPr>
+        <p:cNvPr id="1" name=""/>
+        <p:cNvGrpSpPr/>
+        <p:nvPr/>
+      </p:nvGrpSpPr>
+      <p:grpSpPr>
+        <a:xfrm>
+          <a:off x="0" y="0"/>
+          <a:ext cx="0" cy="0"/>
+          <a:chOff x="0" y="0"/>
+          <a:chExt cx="0" cy="0"/>
+        </a:xfrm>
+      </p:grpSpPr>
+      <p:sp>
+        <p:nvSpPr>
+          <p:cNvPr id="3" name="Content Placeholder 2">
+            <a:extLst>
+              <a:ext uri="{FF2B5EF4-FFF2-40B4-BE49-F238E27FC236}">
+                <a16:creationId xmlns:a16="http://schemas.microsoft.com/office/drawing/2014/main" id="{5DF07E8A-8E21-DB56-AEB7-87C71AF8F405}"/>
+              </a:ext>
+            </a:extLst>
+          </p:cNvPr>
+          <p:cNvSpPr>
+            <a:spLocks noGrp="1"/>
+          </p:cNvSpPr>
+          <p:nvPr>
+            <p:ph idx="1"/>
+          </p:nvPr>
+        </p:nvSpPr>
+        <p:spPr>
+          <a:xfrm>
+            <a:off x="228600" y="467520"/>
+            <a:ext cx="9326880" cy="4587986"/>
+          </a:xfrm>
+        </p:spPr>
+        <p:txBody>
+          <a:bodyPr/>
+          <a:lstStyle/>
+          <a:p>
+            <a:r>
+              <a:rPr lang="en-US" sz="1100" dirty="0"/>
+              <a:t>Now before moving on feature we will take  a look at pre requisites for moving </a:t>
+            </a:r>
+          </a:p>
+          <a:p>
+            <a:r>
+              <a:rPr lang="en-US" sz="1100" b="1" u="sng" dirty="0"/>
+              <a:t>1stly Install open </a:t>
+            </a:r>
+            <a:r>
+              <a:rPr lang="en-US" sz="1100" b="1" u="sng" dirty="0" err="1"/>
+              <a:t>JDk</a:t>
+            </a:r>
+            <a:r>
+              <a:rPr lang="en-US" sz="1100" b="1" u="sng" dirty="0"/>
+              <a:t> </a:t>
+            </a:r>
+            <a:r>
+              <a:rPr lang="en-US" sz="1100" dirty="0"/>
+              <a:t>-  </a:t>
+            </a:r>
+            <a:r>
+              <a:rPr lang="en-US" sz="1100" b="1" dirty="0"/>
+              <a:t>kept at </a:t>
+            </a:r>
+            <a:r>
+              <a:rPr lang="en-US" sz="1100" dirty="0"/>
+              <a:t>Open JDK  (</a:t>
+            </a:r>
+            <a:r>
+              <a:rPr lang="en-US" sz="1100" dirty="0" err="1"/>
+              <a:t>ct</a:t>
+            </a:r>
+            <a:r>
+              <a:rPr lang="en-US" sz="1100" dirty="0"/>
+              <a:t>-share </a:t>
+            </a:r>
+            <a:r>
+              <a:rPr lang="en-US" sz="1100" dirty="0">
+                <a:sym typeface="Wingdings" panose="05000000000000000000" pitchFamily="2" charset="2"/>
+              </a:rPr>
+              <a:t> </a:t>
+            </a:r>
+            <a:r>
+              <a:rPr lang="en-US" sz="1100" dirty="0" err="1">
+                <a:sym typeface="Wingdings" panose="05000000000000000000" pitchFamily="2" charset="2"/>
+              </a:rPr>
+              <a:t>UtiliesForAll</a:t>
+            </a:r>
+            <a:r>
+              <a:rPr lang="en-US" sz="1100" dirty="0">
+                <a:sym typeface="Wingdings" panose="05000000000000000000" pitchFamily="2" charset="2"/>
+              </a:rPr>
+              <a:t> Java   Open JSK 11.0 )    </a:t>
+            </a:r>
+          </a:p>
+          <a:p>
+            <a:pPr marL="0" indent="0">
+              <a:buNone/>
+            </a:pPr>
+            <a:r>
+              <a:rPr lang="en-US" sz="1100" dirty="0">
+                <a:sym typeface="Wingdings" panose="05000000000000000000" pitchFamily="2" charset="2"/>
+              </a:rPr>
+              <a:t>             Download it  </a:t>
+            </a:r>
+          </a:p>
+          <a:p>
+            <a:pPr marL="0" indent="0">
+              <a:buNone/>
+            </a:pPr>
+            <a:r>
+              <a:rPr lang="en-US" sz="1100" dirty="0">
+                <a:sym typeface="Wingdings" panose="05000000000000000000" pitchFamily="2" charset="2"/>
+              </a:rPr>
+              <a:t>              extract it  </a:t>
+            </a:r>
+          </a:p>
+          <a:p>
+            <a:pPr marL="0" indent="0">
+              <a:buNone/>
+            </a:pPr>
+            <a:r>
+              <a:rPr lang="en-US" sz="1100" dirty="0">
+                <a:sym typeface="Wingdings" panose="05000000000000000000" pitchFamily="2" charset="2"/>
+              </a:rPr>
+              <a:t>             set env variable </a:t>
+            </a:r>
+            <a:endParaRPr lang="en-US" sz="1100" dirty="0"/>
+          </a:p>
+          <a:p>
+            <a:r>
+              <a:rPr lang="en-US" sz="1100" dirty="0"/>
+              <a:t>SonarQube download</a:t>
+            </a:r>
+          </a:p>
+          <a:p>
+            <a:r>
+              <a:rPr lang="en-US" sz="1100" dirty="0"/>
+              <a:t>SonarQube docx </a:t>
+            </a:r>
+          </a:p>
+          <a:p>
+            <a:r>
+              <a:rPr lang="en-US" sz="1100" dirty="0"/>
+              <a:t>Already Downloaded </a:t>
+            </a:r>
+            <a:r>
+              <a:rPr lang="en-US" sz="1100" dirty="0">
+                <a:sym typeface="Wingdings" panose="05000000000000000000" pitchFamily="2" charset="2"/>
+              </a:rPr>
+              <a:t> create a proper folder structure  extract it   we can start server Now</a:t>
+            </a:r>
+          </a:p>
+          <a:p>
+            <a:pPr marL="0" indent="0" algn="ctr">
+              <a:buNone/>
+            </a:pPr>
+            <a:r>
+              <a:rPr lang="en-US" sz="1100" dirty="0">
+                <a:sym typeface="Wingdings" panose="05000000000000000000" pitchFamily="2" charset="2"/>
+              </a:rPr>
+              <a:t>                              </a:t>
+            </a:r>
+            <a:r>
+              <a:rPr lang="en-US" sz="1100" b="1" u="sng" dirty="0">
+                <a:sym typeface="Wingdings" panose="05000000000000000000" pitchFamily="2" charset="2"/>
+              </a:rPr>
+              <a:t>NOW BEFORE STARTING THE SERVER  LETS SEE THE REQUIRTEMENT OF SERVER </a:t>
+            </a:r>
+          </a:p>
+          <a:p>
+            <a:r>
+              <a:rPr lang="en-US" sz="1100" dirty="0"/>
+              <a:t>Firstly we will have to create new SQL DB   (</a:t>
+            </a:r>
+            <a:r>
+              <a:rPr lang="en-US" sz="1100" i="1" u="sng" dirty="0">
+                <a:highlight>
+                  <a:srgbClr val="FFFF00"/>
+                </a:highlight>
+              </a:rPr>
+              <a:t>show in image</a:t>
+            </a:r>
+            <a:r>
+              <a:rPr lang="en-US" sz="1100" dirty="0"/>
+              <a:t>)</a:t>
+            </a:r>
+            <a:r>
+              <a:rPr lang="en-US" sz="1100" dirty="0">
+                <a:sym typeface="Wingdings" panose="05000000000000000000" pitchFamily="2" charset="2"/>
+              </a:rPr>
+              <a:t>  so open MS SQL Server  right click database New Database  DB name ,  options   collation  SQL_Latin1_General_CP1_CS_AS (Value required to start the SQ)</a:t>
+            </a:r>
+          </a:p>
+          <a:p>
+            <a:r>
+              <a:rPr lang="en-US" sz="1100" dirty="0">
+                <a:sym typeface="Wingdings" panose="05000000000000000000" pitchFamily="2" charset="2"/>
+              </a:rPr>
+              <a:t>Now we have created DB  ,  So the  question  is  that where  we  have  to  configure   this DB  Information  ?   open (conf </a:t>
+            </a:r>
+            <a:r>
+              <a:rPr lang="en-US" sz="1100" dirty="0" err="1">
+                <a:sym typeface="Wingdings" panose="05000000000000000000" pitchFamily="2" charset="2"/>
+              </a:rPr>
+              <a:t>Sonar.properties</a:t>
+            </a:r>
+            <a:r>
+              <a:rPr lang="en-US" sz="1100" dirty="0">
+                <a:sym typeface="Wingdings" panose="05000000000000000000" pitchFamily="2" charset="2"/>
+              </a:rPr>
+              <a:t> files)</a:t>
+            </a:r>
+          </a:p>
+          <a:p>
+            <a:pPr marL="0" indent="0">
+              <a:buNone/>
+            </a:pPr>
+            <a:r>
+              <a:rPr lang="en-US" sz="1100" b="1" dirty="0">
+                <a:sym typeface="Wingdings" panose="05000000000000000000" pitchFamily="2" charset="2"/>
+              </a:rPr>
+              <a:t>	 	26  user name </a:t>
+            </a:r>
+          </a:p>
+          <a:p>
+            <a:pPr marL="0" indent="0">
+              <a:buNone/>
+            </a:pPr>
+            <a:r>
+              <a:rPr lang="en-US" sz="1100" b="1" dirty="0">
+                <a:sym typeface="Wingdings" panose="05000000000000000000" pitchFamily="2" charset="2"/>
+              </a:rPr>
+              <a:t>		27  Password </a:t>
+            </a:r>
+          </a:p>
+          <a:p>
+            <a:pPr marL="0" indent="0">
+              <a:buNone/>
+            </a:pPr>
+            <a:r>
+              <a:rPr lang="en-US" sz="1100" b="1" dirty="0">
+                <a:sym typeface="Wingdings" panose="05000000000000000000" pitchFamily="2" charset="2"/>
+              </a:rPr>
+              <a:t>		58 Database name</a:t>
+            </a:r>
+          </a:p>
+          <a:p>
+            <a:pPr marL="0" indent="0">
+              <a:buNone/>
+            </a:pPr>
+            <a:r>
+              <a:rPr lang="en-US" sz="1100" b="1" dirty="0">
+                <a:sym typeface="Wingdings" panose="05000000000000000000" pitchFamily="2" charset="2"/>
+              </a:rPr>
+              <a:t>		111 Port :</a:t>
+            </a:r>
+            <a:r>
+              <a:rPr lang="en-US" sz="1100" u="sng" dirty="0">
+                <a:sym typeface="Wingdings" panose="05000000000000000000" pitchFamily="2" charset="2"/>
+              </a:rPr>
+              <a:t> Port means what , it the  location  where  our  Server  is  going  to  launch , or we can also define it as it is the location where  our  OS system will  listen  different  request   DEMO</a:t>
+            </a:r>
+          </a:p>
+          <a:p>
+            <a:pPr marL="0" indent="0">
+              <a:buNone/>
+            </a:pPr>
+            <a:endParaRPr lang="en-US" sz="1100" u="sng" dirty="0">
+              <a:sym typeface="Wingdings" panose="05000000000000000000" pitchFamily="2" charset="2"/>
+            </a:endParaRPr>
+          </a:p>
+          <a:p>
+            <a:r>
+              <a:rPr lang="en-US" sz="1100" dirty="0">
+                <a:sym typeface="Wingdings" panose="05000000000000000000" pitchFamily="2" charset="2"/>
+              </a:rPr>
+              <a:t>  Now to run the server          as a  go </a:t>
+            </a:r>
+          </a:p>
+          <a:p>
+            <a:pPr marL="0" indent="0">
+              <a:buNone/>
+            </a:pPr>
+            <a:r>
+              <a:rPr lang="en-US" sz="1100" dirty="0">
+                <a:sym typeface="Wingdings" panose="05000000000000000000" pitchFamily="2" charset="2"/>
+              </a:rPr>
+              <a:t>                                                                as a service – means until and </a:t>
+            </a:r>
+            <a:r>
+              <a:rPr lang="en-US" sz="1100">
+                <a:sym typeface="Wingdings" panose="05000000000000000000" pitchFamily="2" charset="2"/>
+              </a:rPr>
+              <a:t>unless SQ server  </a:t>
+            </a:r>
+            <a:r>
+              <a:rPr lang="en-US" sz="1100" dirty="0">
+                <a:sym typeface="Wingdings" panose="05000000000000000000" pitchFamily="2" charset="2"/>
+              </a:rPr>
+              <a:t>is not stop explicitly it will keep running on the specified port</a:t>
+            </a:r>
+          </a:p>
+          <a:p>
+            <a:pPr marL="0" indent="0">
+              <a:buNone/>
+            </a:pPr>
+            <a:endParaRPr lang="en-US" sz="1100" dirty="0">
+              <a:sym typeface="Wingdings" panose="05000000000000000000" pitchFamily="2" charset="2"/>
+            </a:endParaRPr>
+          </a:p>
+          <a:p>
+            <a:pPr marL="0" indent="0">
+              <a:buNone/>
+            </a:pPr>
+            <a:r>
+              <a:rPr lang="en-US" sz="1100" dirty="0">
+                <a:highlight>
+                  <a:srgbClr val="FFFF00"/>
+                </a:highlight>
+                <a:sym typeface="Wingdings" panose="05000000000000000000" pitchFamily="2" charset="2"/>
+              </a:rPr>
+              <a:t>  on resource monitor  Network  port occupied will be visible       </a:t>
+            </a:r>
+            <a:r>
+              <a:rPr lang="en-US" sz="1100" u="sng" dirty="0">
+                <a:highlight>
+                  <a:srgbClr val="FFFF00"/>
+                </a:highlight>
+                <a:sym typeface="Wingdings" panose="05000000000000000000" pitchFamily="2" charset="2"/>
+              </a:rPr>
+              <a:t>  </a:t>
+            </a:r>
+          </a:p>
+          <a:p>
+            <a:pPr marL="0" indent="0">
+              <a:buNone/>
+            </a:pPr>
+            <a:endParaRPr lang="en-US" sz="1100" u="sng" dirty="0">
+              <a:sym typeface="Wingdings" panose="05000000000000000000" pitchFamily="2" charset="2"/>
+            </a:endParaRPr>
+          </a:p>
+          <a:p>
+            <a:endParaRPr lang="en-US" sz="1100" dirty="0">
+              <a:sym typeface="Wingdings" panose="05000000000000000000" pitchFamily="2" charset="2"/>
+            </a:endParaRPr>
+          </a:p>
+        </p:txBody>
+      </p:sp>
+    </p:spTree>
+    <p:extLst>
+      <p:ext uri="{BB962C8B-B14F-4D97-AF65-F5344CB8AC3E}">
+        <p14:creationId xmlns:p14="http://schemas.microsoft.com/office/powerpoint/2010/main" val="428932126"/>
+      </p:ext>
+    </p:extLst>
+  </p:cSld>
+  <p:clrMapOvr>
+    <a:masterClrMapping/>
+  </p:clrMapOvr>
+</p:sld>
+</file>
+
+<file path=ppt/slides/slide8.xml><?xml version="1.0" encoding="utf-8"?>
 <p:sld xmlns:a="http://schemas.openxmlformats.org/drawingml/2006/main" xmlns:r="http://schemas.openxmlformats.org/officeDocument/2006/relationships" xmlns:p="http://schemas.openxmlformats.org/presentationml/2006/main">
   <p:cSld>
     <p:spTree>
@@ -12964,12 +13509,8 @@
               <a:buChar char="•"/>
             </a:pPr>
             <a:r>
-              <a:rPr lang="en-US" dirty="0" smtClean="0"/>
-              <a:t>Comments (comments </a:t>
-            </a:r>
-            <a:r>
               <a:rPr lang="en-US" dirty="0"/>
-              <a:t>and duplication )</a:t>
+              <a:t>Comments (comments and duplication )</a:t>
             </a:r>
           </a:p>
           <a:p>
@@ -12982,13 +13523,8 @@
             </a:pPr>
             <a:r>
               <a:rPr lang="en-US" dirty="0"/>
-              <a:t>Coding </a:t>
-            </a:r>
-            <a:r>
-              <a:rPr lang="en-US" dirty="0" smtClean="0"/>
-              <a:t>rules (standards)</a:t>
-            </a:r>
-            <a:endParaRPr lang="en-US" dirty="0"/>
+              <a:t>Coding rules (standards)</a:t>
+            </a:r>
           </a:p>
           <a:p>
             <a:pPr marL="342900" lvl="0" indent="-342900">
@@ -13000,11 +13536,7 @@
             </a:pPr>
             <a:r>
               <a:rPr lang="en-US" dirty="0"/>
-              <a:t>Potential </a:t>
-            </a:r>
-            <a:r>
-              <a:rPr lang="en-US" dirty="0" smtClean="0"/>
-              <a:t>Bugs and Vulnerabilities</a:t>
+              <a:t>Potential Bugs and Vulnerabilities</a:t>
             </a:r>
           </a:p>
           <a:p>
@@ -13016,12 +13548,8 @@
               <a:buChar char="•"/>
             </a:pPr>
             <a:r>
-              <a:rPr lang="en-US" dirty="0" smtClean="0"/>
-              <a:t>Unit </a:t>
-            </a:r>
-            <a:r>
               <a:rPr lang="en-US" dirty="0"/>
-              <a:t>tests (Unit test coverage &amp; test case result)</a:t>
+              <a:t>Unit tests (Unit test coverage &amp; test case result)</a:t>
             </a:r>
           </a:p>
           <a:p>
@@ -13033,7 +13561,7 @@
               <a:buChar char="•"/>
             </a:pPr>
             <a:r>
-              <a:rPr lang="en-US" dirty="0" smtClean="0"/>
+              <a:rPr lang="en-US" dirty="0"/>
               <a:t>Complexity</a:t>
             </a:r>
           </a:p>
@@ -13046,10 +13574,9 @@
               <a:buChar char="•"/>
             </a:pPr>
             <a:r>
-              <a:rPr lang="en-US" dirty="0" smtClean="0"/>
+              <a:rPr lang="en-US" dirty="0"/>
               <a:t>Multi Language Support</a:t>
             </a:r>
-            <a:endParaRPr lang="en-US" dirty="0"/>
           </a:p>
           <a:p>
             <a:endParaRPr lang="en-US" dirty="0"/>
@@ -13066,17 +13593,10 @@
   <p:clrMapOvr>
     <a:masterClrMapping/>
   </p:clrMapOvr>
-  <p:timing>
-    <p:tnLst>
-      <p:par>
-        <p:cTn id="1" dur="indefinite" restart="never" nodeType="tmRoot"/>
-      </p:par>
-    </p:tnLst>
-  </p:timing>
 </p:sld>
 </file>
 
-<file path=ppt/slides/slide8.xml><?xml version="1.0" encoding="utf-8"?>
+<file path=ppt/slides/slide9.xml><?xml version="1.0" encoding="utf-8"?>
 <p:sld xmlns:a="http://schemas.openxmlformats.org/drawingml/2006/main" xmlns:r="http://schemas.openxmlformats.org/officeDocument/2006/relationships" xmlns:p="http://schemas.openxmlformats.org/presentationml/2006/main">
   <p:cSld>
     <p:spTree>
@@ -13300,7 +13820,7 @@
               <a:buNone/>
             </a:pPr>
             <a:r>
-              <a:rPr lang="en-US" sz="1800" b="1" dirty="0" smtClean="0">
+              <a:rPr lang="en-US" sz="1800" b="1" dirty="0">
                 <a:solidFill>
                   <a:srgbClr val="2B3B4B"/>
                 </a:solidFill>
@@ -13310,14 +13830,6 @@
               </a:rPr>
               <a:t>Available Plugins</a:t>
             </a:r>
-            <a:endParaRPr lang="en-US" sz="1800" b="1" dirty="0">
-              <a:solidFill>
-                <a:srgbClr val="2B3B4B"/>
-              </a:solidFill>
-              <a:latin typeface="Tahoma" panose="020B0604030504040204" pitchFamily="34" charset="0"/>
-              <a:ea typeface="Tahoma" panose="020B0604030504040204" pitchFamily="34" charset="0"/>
-              <a:cs typeface="Tahoma" panose="020B0604030504040204" pitchFamily="34" charset="0"/>
-            </a:endParaRPr>
           </a:p>
         </p:txBody>
       </p:sp>
@@ -13380,79 +13892,6 @@
   <p:clrMapOvr>
     <a:masterClrMapping/>
   </p:clrMapOvr>
-  <p:timing>
-    <p:tnLst>
-      <p:par>
-        <p:cTn id="1" dur="indefinite" restart="never" nodeType="tmRoot"/>
-      </p:par>
-    </p:tnLst>
-  </p:timing>
-</p:sld>
-</file>
-
-<file path=ppt/slides/slide9.xml><?xml version="1.0" encoding="utf-8"?>
-<p:sld xmlns:a="http://schemas.openxmlformats.org/drawingml/2006/main" xmlns:r="http://schemas.openxmlformats.org/officeDocument/2006/relationships" xmlns:p="http://schemas.openxmlformats.org/presentationml/2006/main">
-  <p:cSld>
-    <p:spTree>
-      <p:nvGrpSpPr>
-        <p:cNvPr id="1" name=""/>
-        <p:cNvGrpSpPr/>
-        <p:nvPr/>
-      </p:nvGrpSpPr>
-      <p:grpSpPr>
-        <a:xfrm>
-          <a:off x="0" y="0"/>
-          <a:ext cx="0" cy="0"/>
-          <a:chOff x="0" y="0"/>
-          <a:chExt cx="0" cy="0"/>
-        </a:xfrm>
-      </p:grpSpPr>
-      <p:sp>
-        <p:nvSpPr>
-          <p:cNvPr id="2" name="Title 1"/>
-          <p:cNvSpPr>
-            <a:spLocks noGrp="1"/>
-          </p:cNvSpPr>
-          <p:nvPr>
-            <p:ph type="title"/>
-          </p:nvPr>
-        </p:nvSpPr>
-        <p:spPr>
-          <a:xfrm>
-            <a:off x="685800" y="2448719"/>
-            <a:ext cx="8549640" cy="1124027"/>
-          </a:xfrm>
-        </p:spPr>
-        <p:txBody>
-          <a:bodyPr/>
-          <a:lstStyle/>
-          <a:p>
-            <a:pPr algn="ctr"/>
-            <a:r>
-              <a:rPr lang="en-US" dirty="0" err="1" smtClean="0"/>
-              <a:t>DemoNstration</a:t>
-            </a:r>
-            <a:endParaRPr lang="en-US" dirty="0"/>
-          </a:p>
-        </p:txBody>
-      </p:sp>
-    </p:spTree>
-    <p:extLst>
-      <p:ext uri="{BB962C8B-B14F-4D97-AF65-F5344CB8AC3E}">
-        <p14:creationId xmlns:p14="http://schemas.microsoft.com/office/powerpoint/2010/main" val="755103224"/>
-      </p:ext>
-    </p:extLst>
-  </p:cSld>
-  <p:clrMapOvr>
-    <a:masterClrMapping/>
-  </p:clrMapOvr>
-  <p:timing>
-    <p:tnLst>
-      <p:par>
-        <p:cTn id="1" dur="indefinite" restart="never" nodeType="tmRoot"/>
-      </p:par>
-    </p:tnLst>
-  </p:timing>
 </p:sld>
 </file>
 
@@ -14288,21 +14727,6 @@
 </file>
 
 <file path=customXml/item1.xml><?xml version="1.0" encoding="utf-8"?>
-<p:properties xmlns:p="http://schemas.microsoft.com/office/2006/metadata/properties" xmlns:xsi="http://www.w3.org/2001/XMLSchema-instance" xmlns:pc="http://schemas.microsoft.com/office/infopath/2007/PartnerControls">
-  <documentManagement/>
-</p:properties>
-</file>
-
-<file path=customXml/item2.xml><?xml version="1.0" encoding="utf-8"?>
-<?mso-contentType ?>
-<FormTemplates xmlns="http://schemas.microsoft.com/sharepoint/v3/contenttype/forms">
-  <Display>DocumentLibraryForm</Display>
-  <Edit>DocumentLibraryForm</Edit>
-  <New>DocumentLibraryForm</New>
-</FormTemplates>
-</file>
-
-<file path=customXml/item3.xml><?xml version="1.0" encoding="utf-8"?>
 <ct:contentTypeSchema xmlns:ct="http://schemas.microsoft.com/office/2006/metadata/contentType" xmlns:ma="http://schemas.microsoft.com/office/2006/metadata/properties/metaAttributes" ct:_="" ma:_="" ma:contentTypeName="Document" ma:contentTypeID="0x010100D6CFEBD4412E454DA1CFCF1077D1E3BA" ma:contentTypeVersion="0" ma:contentTypeDescription="Create a new document." ma:contentTypeScope="" ma:versionID="8298e5e809efd921dec1ac395905091a">
   <xsd:schema xmlns:xsd="http://www.w3.org/2001/XMLSchema" xmlns:xs="http://www.w3.org/2001/XMLSchema" xmlns:p="http://schemas.microsoft.com/office/2006/metadata/properties" targetNamespace="http://schemas.microsoft.com/office/2006/metadata/properties" ma:root="true" ma:fieldsID="1b05d82d297216baf5b26c55225140df">
     <xsd:element name="properties">
@@ -14416,17 +14840,33 @@
 </ct:contentTypeSchema>
 </file>
 
+<file path=customXml/item2.xml><?xml version="1.0" encoding="utf-8"?>
+<?mso-contentType ?>
+<FormTemplates xmlns="http://schemas.microsoft.com/sharepoint/v3/contenttype/forms">
+  <Display>DocumentLibraryForm</Display>
+  <Edit>DocumentLibraryForm</Edit>
+  <New>DocumentLibraryForm</New>
+</FormTemplates>
+</file>
+
+<file path=customXml/item3.xml><?xml version="1.0" encoding="utf-8"?>
+<p:properties xmlns:p="http://schemas.microsoft.com/office/2006/metadata/properties" xmlns:xsi="http://www.w3.org/2001/XMLSchema-instance" xmlns:pc="http://schemas.microsoft.com/office/infopath/2007/PartnerControls">
+  <documentManagement/>
+</p:properties>
+</file>
+
 <file path=customXml/itemProps1.xml><?xml version="1.0" encoding="utf-8"?>
-<ds:datastoreItem xmlns:ds="http://schemas.openxmlformats.org/officeDocument/2006/customXml" ds:itemID="{DF1BE659-B717-48DC-B7CD-5B8EBF1EFA81}">
+<ds:datastoreItem xmlns:ds="http://schemas.openxmlformats.org/officeDocument/2006/customXml" ds:itemID="{A8A2345F-2886-4094-855C-84BF9AB379F6}">
   <ds:schemaRefs>
-    <ds:schemaRef ds:uri="http://schemas.microsoft.com/office/infopath/2007/PartnerControls"/>
-    <ds:schemaRef ds:uri="http://www.w3.org/XML/1998/namespace"/>
-    <ds:schemaRef ds:uri="http://purl.org/dc/dcmitype/"/>
-    <ds:schemaRef ds:uri="http://schemas.microsoft.com/office/2006/documentManagement/types"/>
-    <ds:schemaRef ds:uri="http://purl.org/dc/elements/1.1/"/>
+    <ds:schemaRef ds:uri="http://schemas.microsoft.com/office/2006/metadata/contentType"/>
+    <ds:schemaRef ds:uri="http://schemas.microsoft.com/office/2006/metadata/properties/metaAttributes"/>
+    <ds:schemaRef ds:uri="http://www.w3.org/2001/XMLSchema"/>
     <ds:schemaRef ds:uri="http://schemas.microsoft.com/office/2006/metadata/properties"/>
     <ds:schemaRef ds:uri="http://schemas.openxmlformats.org/package/2006/metadata/core-properties"/>
+    <ds:schemaRef ds:uri="http://purl.org/dc/elements/1.1/"/>
     <ds:schemaRef ds:uri="http://purl.org/dc/terms/"/>
+    <ds:schemaRef ds:uri="http://schemas.microsoft.com/internal/obd"/>
+    <ds:schemaRef ds:uri="http://schemas.microsoft.com/office/infopath/2007/PartnerControls"/>
   </ds:schemaRefs>
 </ds:datastoreItem>
 </file>
@@ -14440,17 +14880,16 @@
 </file>
 
 <file path=customXml/itemProps3.xml><?xml version="1.0" encoding="utf-8"?>
-<ds:datastoreItem xmlns:ds="http://schemas.openxmlformats.org/officeDocument/2006/customXml" ds:itemID="{A8A2345F-2886-4094-855C-84BF9AB379F6}">
+<ds:datastoreItem xmlns:ds="http://schemas.openxmlformats.org/officeDocument/2006/customXml" ds:itemID="{DF1BE659-B717-48DC-B7CD-5B8EBF1EFA81}">
   <ds:schemaRefs>
-    <ds:schemaRef ds:uri="http://schemas.microsoft.com/office/2006/metadata/contentType"/>
-    <ds:schemaRef ds:uri="http://schemas.microsoft.com/office/2006/metadata/properties/metaAttributes"/>
-    <ds:schemaRef ds:uri="http://www.w3.org/2001/XMLSchema"/>
+    <ds:schemaRef ds:uri="http://schemas.microsoft.com/office/infopath/2007/PartnerControls"/>
+    <ds:schemaRef ds:uri="http://www.w3.org/XML/1998/namespace"/>
+    <ds:schemaRef ds:uri="http://purl.org/dc/dcmitype/"/>
+    <ds:schemaRef ds:uri="http://schemas.microsoft.com/office/2006/documentManagement/types"/>
+    <ds:schemaRef ds:uri="http://purl.org/dc/elements/1.1/"/>
     <ds:schemaRef ds:uri="http://schemas.microsoft.com/office/2006/metadata/properties"/>
     <ds:schemaRef ds:uri="http://schemas.openxmlformats.org/package/2006/metadata/core-properties"/>
-    <ds:schemaRef ds:uri="http://purl.org/dc/elements/1.1/"/>
     <ds:schemaRef ds:uri="http://purl.org/dc/terms/"/>
-    <ds:schemaRef ds:uri="http://schemas.microsoft.com/internal/obd"/>
-    <ds:schemaRef ds:uri="http://schemas.microsoft.com/office/infopath/2007/PartnerControls"/>
   </ds:schemaRefs>
 </ds:datastoreItem>
 </file>
</xml_diff>

<commit_message>
2 policy related document
</commit_message>
<xml_diff>
--- a/SonarQube.pptx
+++ b/SonarQube.pptx
@@ -6,7 +6,7 @@
     <p:sldMasterId id="2147483660" r:id="rId5"/>
   </p:sldMasterIdLst>
   <p:notesMasterIdLst>
-    <p:notesMasterId r:id="rId20"/>
+    <p:notesMasterId r:id="rId25"/>
   </p:notesMasterIdLst>
   <p:sldIdLst>
     <p:sldId id="281" r:id="rId6"/>
@@ -16,13 +16,18 @@
     <p:sldId id="298" r:id="rId10"/>
     <p:sldId id="296" r:id="rId11"/>
     <p:sldId id="303" r:id="rId12"/>
-    <p:sldId id="300" r:id="rId13"/>
-    <p:sldId id="289" r:id="rId14"/>
-    <p:sldId id="292" r:id="rId15"/>
-    <p:sldId id="291" r:id="rId16"/>
-    <p:sldId id="302" r:id="rId17"/>
-    <p:sldId id="294" r:id="rId18"/>
-    <p:sldId id="282" r:id="rId19"/>
+    <p:sldId id="304" r:id="rId13"/>
+    <p:sldId id="305" r:id="rId14"/>
+    <p:sldId id="306" r:id="rId15"/>
+    <p:sldId id="300" r:id="rId16"/>
+    <p:sldId id="289" r:id="rId17"/>
+    <p:sldId id="292" r:id="rId18"/>
+    <p:sldId id="307" r:id="rId19"/>
+    <p:sldId id="308" r:id="rId20"/>
+    <p:sldId id="291" r:id="rId21"/>
+    <p:sldId id="302" r:id="rId22"/>
+    <p:sldId id="294" r:id="rId23"/>
+    <p:sldId id="282" r:id="rId24"/>
   </p:sldIdLst>
   <p:sldSz cx="10058400" cy="5659438"/>
   <p:notesSz cx="9144000" cy="6858000"/>
@@ -233,7 +238,7 @@
           <a:p>
             <a:fld id="{F3B47075-42FC-4992-BFD6-71B1872E4AB2}" type="datetimeFigureOut">
               <a:rPr lang="en-US" smtClean="0"/>
-              <a:t>11/26/2023</a:t>
+              <a:t>12/8/2023</a:t>
             </a:fld>
             <a:endParaRPr lang="en-US"/>
           </a:p>
@@ -1222,7 +1227,7 @@
           <a:p>
             <a:fld id="{72CC6C99-819B-4E2C-B66B-9C4B0D9D41D3}" type="datetimeFigureOut">
               <a:rPr lang="en-US" smtClean="0"/>
-              <a:t>11/26/2023</a:t>
+              <a:t>12/8/2023</a:t>
             </a:fld>
             <a:endParaRPr lang="en-US"/>
           </a:p>
@@ -1422,7 +1427,7 @@
           <a:p>
             <a:fld id="{72CC6C99-819B-4E2C-B66B-9C4B0D9D41D3}" type="datetimeFigureOut">
               <a:rPr lang="en-US" smtClean="0"/>
-              <a:t>11/26/2023</a:t>
+              <a:t>12/8/2023</a:t>
             </a:fld>
             <a:endParaRPr lang="en-US"/>
           </a:p>
@@ -1700,7 +1705,7 @@
           <a:p>
             <a:fld id="{FE54115B-6CD9-43BC-8D55-E1FCD10AF002}" type="datetimeFigureOut">
               <a:rPr lang="en-US" smtClean="0"/>
-              <a:t>11/26/2023</a:t>
+              <a:t>12/8/2023</a:t>
             </a:fld>
             <a:endParaRPr lang="en-US"/>
           </a:p>
@@ -1868,7 +1873,7 @@
           <a:p>
             <a:fld id="{FE54115B-6CD9-43BC-8D55-E1FCD10AF002}" type="datetimeFigureOut">
               <a:rPr lang="en-US" smtClean="0"/>
-              <a:t>11/26/2023</a:t>
+              <a:t>12/8/2023</a:t>
             </a:fld>
             <a:endParaRPr lang="en-US"/>
           </a:p>
@@ -2113,7 +2118,7 @@
           <a:p>
             <a:fld id="{FE54115B-6CD9-43BC-8D55-E1FCD10AF002}" type="datetimeFigureOut">
               <a:rPr lang="en-US" smtClean="0"/>
-              <a:t>11/26/2023</a:t>
+              <a:t>12/8/2023</a:t>
             </a:fld>
             <a:endParaRPr lang="en-US"/>
           </a:p>
@@ -2398,7 +2403,7 @@
           <a:p>
             <a:fld id="{FE54115B-6CD9-43BC-8D55-E1FCD10AF002}" type="datetimeFigureOut">
               <a:rPr lang="en-US" smtClean="0"/>
-              <a:t>11/26/2023</a:t>
+              <a:t>12/8/2023</a:t>
             </a:fld>
             <a:endParaRPr lang="en-US"/>
           </a:p>
@@ -2817,7 +2822,7 @@
           <a:p>
             <a:fld id="{FE54115B-6CD9-43BC-8D55-E1FCD10AF002}" type="datetimeFigureOut">
               <a:rPr lang="en-US" smtClean="0"/>
-              <a:t>11/26/2023</a:t>
+              <a:t>12/8/2023</a:t>
             </a:fld>
             <a:endParaRPr lang="en-US"/>
           </a:p>
@@ -2934,7 +2939,7 @@
           <a:p>
             <a:fld id="{FE54115B-6CD9-43BC-8D55-E1FCD10AF002}" type="datetimeFigureOut">
               <a:rPr lang="en-US" smtClean="0"/>
-              <a:t>11/26/2023</a:t>
+              <a:t>12/8/2023</a:t>
             </a:fld>
             <a:endParaRPr lang="en-US"/>
           </a:p>
@@ -3029,7 +3034,7 @@
           <a:p>
             <a:fld id="{FE54115B-6CD9-43BC-8D55-E1FCD10AF002}" type="datetimeFigureOut">
               <a:rPr lang="en-US" smtClean="0"/>
-              <a:t>11/26/2023</a:t>
+              <a:t>12/8/2023</a:t>
             </a:fld>
             <a:endParaRPr lang="en-US"/>
           </a:p>
@@ -3498,7 +3503,7 @@
           <a:p>
             <a:fld id="{FE54115B-6CD9-43BC-8D55-E1FCD10AF002}" type="datetimeFigureOut">
               <a:rPr lang="en-US" smtClean="0"/>
-              <a:t>11/26/2023</a:t>
+              <a:t>12/8/2023</a:t>
             </a:fld>
             <a:endParaRPr lang="en-US"/>
           </a:p>
@@ -3750,7 +3755,7 @@
           <a:p>
             <a:fld id="{FE54115B-6CD9-43BC-8D55-E1FCD10AF002}" type="datetimeFigureOut">
               <a:rPr lang="en-US" smtClean="0"/>
-              <a:t>11/26/2023</a:t>
+              <a:t>12/8/2023</a:t>
             </a:fld>
             <a:endParaRPr lang="en-US"/>
           </a:p>
@@ -3918,7 +3923,7 @@
           <a:p>
             <a:fld id="{FE54115B-6CD9-43BC-8D55-E1FCD10AF002}" type="datetimeFigureOut">
               <a:rPr lang="en-US" smtClean="0"/>
-              <a:t>11/26/2023</a:t>
+              <a:t>12/8/2023</a:t>
             </a:fld>
             <a:endParaRPr lang="en-US"/>
           </a:p>
@@ -4096,7 +4101,7 @@
           <a:p>
             <a:fld id="{FE54115B-6CD9-43BC-8D55-E1FCD10AF002}" type="datetimeFigureOut">
               <a:rPr lang="en-US" smtClean="0"/>
-              <a:t>11/26/2023</a:t>
+              <a:t>12/8/2023</a:t>
             </a:fld>
             <a:endParaRPr lang="en-US"/>
           </a:p>
@@ -4355,7 +4360,7 @@
           <a:p>
             <a:fld id="{72CC6C99-819B-4E2C-B66B-9C4B0D9D41D3}" type="datetimeFigureOut">
               <a:rPr lang="en-US" smtClean="0"/>
-              <a:t>11/26/2023</a:t>
+              <a:t>12/8/2023</a:t>
             </a:fld>
             <a:endParaRPr lang="en-US"/>
           </a:p>
@@ -4670,7 +4675,7 @@
           <a:p>
             <a:fld id="{72CC6C99-819B-4E2C-B66B-9C4B0D9D41D3}" type="datetimeFigureOut">
               <a:rPr lang="en-US" smtClean="0"/>
-              <a:t>11/26/2023</a:t>
+              <a:t>12/8/2023</a:t>
             </a:fld>
             <a:endParaRPr lang="en-US"/>
           </a:p>
@@ -5125,7 +5130,7 @@
           <a:p>
             <a:fld id="{72CC6C99-819B-4E2C-B66B-9C4B0D9D41D3}" type="datetimeFigureOut">
               <a:rPr lang="en-US" smtClean="0"/>
-              <a:t>11/26/2023</a:t>
+              <a:t>12/8/2023</a:t>
             </a:fld>
             <a:endParaRPr lang="en-US"/>
           </a:p>
@@ -5266,7 +5271,7 @@
           <a:p>
             <a:fld id="{72CC6C99-819B-4E2C-B66B-9C4B0D9D41D3}" type="datetimeFigureOut">
               <a:rPr lang="en-US" smtClean="0"/>
-              <a:t>11/26/2023</a:t>
+              <a:t>12/8/2023</a:t>
             </a:fld>
             <a:endParaRPr lang="en-US"/>
           </a:p>
@@ -5377,7 +5382,7 @@
           <a:p>
             <a:fld id="{72CC6C99-819B-4E2C-B66B-9C4B0D9D41D3}" type="datetimeFigureOut">
               <a:rPr lang="en-US" smtClean="0"/>
-              <a:t>11/26/2023</a:t>
+              <a:t>12/8/2023</a:t>
             </a:fld>
             <a:endParaRPr lang="en-US"/>
           </a:p>
@@ -5677,7 +5682,7 @@
           <a:p>
             <a:fld id="{72CC6C99-819B-4E2C-B66B-9C4B0D9D41D3}" type="datetimeFigureOut">
               <a:rPr lang="en-US" smtClean="0"/>
-              <a:t>11/26/2023</a:t>
+              <a:t>12/8/2023</a:t>
             </a:fld>
             <a:endParaRPr lang="en-US"/>
           </a:p>
@@ -5954,7 +5959,7 @@
           <a:p>
             <a:fld id="{72CC6C99-819B-4E2C-B66B-9C4B0D9D41D3}" type="datetimeFigureOut">
               <a:rPr lang="en-US" smtClean="0"/>
-              <a:t>11/26/2023</a:t>
+              <a:t>12/8/2023</a:t>
             </a:fld>
             <a:endParaRPr lang="en-US"/>
           </a:p>
@@ -6773,7 +6778,7 @@
           <a:p>
             <a:fld id="{FE54115B-6CD9-43BC-8D55-E1FCD10AF002}" type="datetimeFigureOut">
               <a:rPr lang="en-US" smtClean="0"/>
-              <a:t>11/26/2023</a:t>
+              <a:t>12/8/2023</a:t>
             </a:fld>
             <a:endParaRPr lang="en-US"/>
           </a:p>
@@ -8017,7 +8022,7 @@
                 <a:effectLst/>
                 <a:latin typeface="Söhne"/>
               </a:rPr>
-              <a:t>In simple terms, SonarQube, it is a platform ,used for continuous inspection of code quality , means it will help developers to understand Quality of code </a:t>
+              <a:t>In simple terms, SonarQube, it is a platform ,used for continuous inspection of code quality , means it will help developers to understand Quality of code in simple words</a:t>
             </a:r>
             <a:endParaRPr lang="en-US" sz="1200" i="1" dirty="0"/>
           </a:p>
@@ -8055,37 +8060,371 @@
       </p:grpSpPr>
       <p:sp>
         <p:nvSpPr>
-          <p:cNvPr id="2" name="Title 1"/>
+          <p:cNvPr id="3" name="Content Placeholder 2">
+            <a:extLst>
+              <a:ext uri="{FF2B5EF4-FFF2-40B4-BE49-F238E27FC236}">
+                <a16:creationId xmlns:a16="http://schemas.microsoft.com/office/drawing/2014/main" id="{78133429-60B6-B149-895C-94509A65A08D}"/>
+              </a:ext>
+            </a:extLst>
+          </p:cNvPr>
           <p:cNvSpPr>
             <a:spLocks noGrp="1"/>
           </p:cNvSpPr>
           <p:nvPr>
-            <p:ph type="title"/>
+            <p:ph idx="1"/>
           </p:nvPr>
         </p:nvSpPr>
         <p:spPr>
           <a:xfrm>
-            <a:off x="685800" y="2448719"/>
-            <a:ext cx="8549640" cy="1124027"/>
+            <a:off x="0" y="162719"/>
+            <a:ext cx="9982200" cy="5105400"/>
           </a:xfrm>
         </p:spPr>
         <p:txBody>
           <a:bodyPr/>
           <a:lstStyle/>
           <a:p>
-            <a:pPr algn="ctr"/>
-            <a:r>
-              <a:rPr lang="en-US" dirty="0" err="1"/>
-              <a:t>DemoNstration</a:t>
-            </a:r>
-            <a:endParaRPr lang="en-US" dirty="0"/>
+            <a:r>
+              <a:rPr lang="en-US" sz="1300" dirty="0"/>
+              <a:t>Depending on rating fixes should be done for </a:t>
+            </a:r>
+            <a:r>
+              <a:rPr lang="en-US" sz="1300" dirty="0" err="1"/>
+              <a:t>eg</a:t>
+            </a:r>
+            <a:r>
+              <a:rPr lang="en-US" sz="1300" dirty="0"/>
+              <a:t> </a:t>
+            </a:r>
+          </a:p>
+          <a:p>
+            <a:pPr marL="0" indent="0">
+              <a:buNone/>
+            </a:pPr>
+            <a:r>
+              <a:rPr lang="en-US" sz="1300" dirty="0"/>
+              <a:t>                                                                      My security Review  is </a:t>
+            </a:r>
+            <a:r>
+              <a:rPr lang="en-US" sz="1300" dirty="0">
+                <a:sym typeface="Wingdings" panose="05000000000000000000" pitchFamily="2" charset="2"/>
+              </a:rPr>
+              <a:t> E  need to fix before A,B,C</a:t>
+            </a:r>
+          </a:p>
+          <a:p>
+            <a:pPr marL="0" indent="0">
+              <a:buNone/>
+            </a:pPr>
+            <a:r>
+              <a:rPr lang="en-US" sz="1300" dirty="0"/>
+              <a:t>                                                                     My BUGS                     is </a:t>
+            </a:r>
+            <a:r>
+              <a:rPr lang="en-US" sz="1300" dirty="0">
+                <a:sym typeface="Wingdings" panose="05000000000000000000" pitchFamily="2" charset="2"/>
+              </a:rPr>
+              <a:t> C  need to fix before A,B</a:t>
+            </a:r>
+          </a:p>
+          <a:p>
+            <a:pPr marL="0" indent="0">
+              <a:buNone/>
+            </a:pPr>
+            <a:r>
+              <a:rPr lang="en-US" sz="1300" dirty="0">
+                <a:sym typeface="Wingdings" panose="05000000000000000000" pitchFamily="2" charset="2"/>
+              </a:rPr>
+              <a:t>-----------------------------------------------------------------</a:t>
+            </a:r>
+            <a:r>
+              <a:rPr lang="en-US" sz="1300" dirty="0">
+                <a:highlight>
+                  <a:srgbClr val="FF0000"/>
+                </a:highlight>
+                <a:sym typeface="Wingdings" panose="05000000000000000000" pitchFamily="2" charset="2"/>
+              </a:rPr>
+              <a:t>NOW WE will SEE ISSUES-</a:t>
+            </a:r>
+            <a:r>
+              <a:rPr lang="en-US" sz="1300" dirty="0">
+                <a:sym typeface="Wingdings" panose="05000000000000000000" pitchFamily="2" charset="2"/>
+              </a:rPr>
+              <a:t>---------------------------------------------------------------------------------------------</a:t>
+            </a:r>
+            <a:r>
+              <a:rPr lang="en-US" sz="1300" dirty="0">
+                <a:highlight>
+                  <a:srgbClr val="FFFF00"/>
+                </a:highlight>
+              </a:rPr>
+              <a:t>TYPES : </a:t>
+            </a:r>
+            <a:r>
+              <a:rPr lang="en-US" sz="1300" dirty="0"/>
+              <a:t>now depending on the types sections(</a:t>
+            </a:r>
+            <a:r>
+              <a:rPr lang="en-US" sz="1400" dirty="0">
+                <a:sym typeface="Wingdings" panose="05000000000000000000" pitchFamily="2" charset="2"/>
+              </a:rPr>
+              <a:t>(</a:t>
+            </a:r>
+            <a:r>
+              <a:rPr lang="en-US" sz="1400" dirty="0">
+                <a:highlight>
+                  <a:srgbClr val="FFFF00"/>
+                </a:highlight>
+                <a:sym typeface="Wingdings" panose="05000000000000000000" pitchFamily="2" charset="2"/>
+              </a:rPr>
+              <a:t>Highlight it ))</a:t>
+            </a:r>
+            <a:r>
+              <a:rPr lang="en-US" sz="1300" dirty="0"/>
+              <a:t>, we can list down different problems of our project </a:t>
+            </a:r>
+          </a:p>
+          <a:p>
+            <a:pPr marL="0" indent="0">
+              <a:buNone/>
+            </a:pPr>
+            <a:r>
+              <a:rPr lang="en-US" sz="1300" dirty="0"/>
+              <a:t>              click BUG  : all bug listed</a:t>
+            </a:r>
+          </a:p>
+          <a:p>
+            <a:pPr marL="0" indent="0">
+              <a:buNone/>
+            </a:pPr>
+            <a:r>
+              <a:rPr lang="en-US" sz="1300" dirty="0"/>
+              <a:t>             click vulnerability : all vulnerability</a:t>
+            </a:r>
+          </a:p>
+          <a:p>
+            <a:pPr marL="0" indent="0">
+              <a:buNone/>
+            </a:pPr>
+            <a:r>
+              <a:rPr lang="en-US" sz="1300" dirty="0"/>
+              <a:t>             Click code smell : all code smell</a:t>
+            </a:r>
+          </a:p>
+          <a:p>
+            <a:pPr marL="0" indent="0">
+              <a:buNone/>
+            </a:pPr>
+            <a:r>
+              <a:rPr lang="en-US" sz="1300" dirty="0"/>
+              <a:t>More over  -  if I want to change any specific BUG to VUL or to CODE SMELL  I can do it </a:t>
+            </a:r>
+          </a:p>
+          <a:p>
+            <a:pPr marL="0" indent="0">
+              <a:buNone/>
+            </a:pPr>
+            <a:r>
+              <a:rPr lang="en-US" sz="1300" dirty="0"/>
+              <a:t>Also             -  </a:t>
+            </a:r>
+            <a:r>
+              <a:rPr lang="en-US" sz="1300" u="sng" dirty="0"/>
+              <a:t>If any BUG is fixed and it is still showing here</a:t>
+            </a:r>
+            <a:r>
+              <a:rPr lang="en-US" sz="1300" dirty="0"/>
+              <a:t>  we  can select(</a:t>
+            </a:r>
+            <a:r>
+              <a:rPr lang="en-US" sz="1300" b="1" dirty="0"/>
+              <a:t>Resolved as Fixed</a:t>
+            </a:r>
+            <a:r>
+              <a:rPr lang="en-US" sz="1300" dirty="0"/>
+              <a:t>) or Any BUG cant be fixed(</a:t>
+            </a:r>
+            <a:r>
+              <a:rPr lang="en-US" sz="1300" b="1" dirty="0"/>
+              <a:t>Resolved as wont fix</a:t>
+            </a:r>
+            <a:r>
+              <a:rPr lang="en-US" sz="1300" dirty="0"/>
+              <a:t>)</a:t>
+            </a:r>
+          </a:p>
+          <a:p>
+            <a:pPr marL="0" indent="0">
+              <a:buNone/>
+            </a:pPr>
+            <a:r>
+              <a:rPr lang="en-US" sz="1300" dirty="0"/>
+              <a:t>Assign any BUG : in Not assigned </a:t>
+            </a:r>
+          </a:p>
+          <a:p>
+            <a:pPr marL="0" indent="0">
+              <a:buNone/>
+            </a:pPr>
+            <a:r>
+              <a:rPr lang="en-US" sz="1300" dirty="0"/>
+              <a:t>Comment   : we can also add some comment</a:t>
+            </a:r>
+          </a:p>
+          <a:p>
+            <a:pPr marL="0" indent="0">
+              <a:buNone/>
+            </a:pPr>
+            <a:r>
+              <a:rPr lang="en-US" sz="1300" dirty="0">
+                <a:sym typeface="Wingdings" panose="05000000000000000000" pitchFamily="2" charset="2"/>
+              </a:rPr>
+              <a:t>-----------------------------------------------------------------</a:t>
+            </a:r>
+            <a:r>
+              <a:rPr lang="en-US" sz="1300" dirty="0">
+                <a:highlight>
+                  <a:srgbClr val="FFFF00"/>
+                </a:highlight>
+                <a:sym typeface="Wingdings" panose="05000000000000000000" pitchFamily="2" charset="2"/>
+              </a:rPr>
+              <a:t>Severity</a:t>
+            </a:r>
+            <a:r>
+              <a:rPr lang="en-US" sz="1300" dirty="0">
+                <a:sym typeface="Wingdings" panose="05000000000000000000" pitchFamily="2" charset="2"/>
+              </a:rPr>
+              <a:t>--------------------------------------------------------------------------------------------------</a:t>
+            </a:r>
+          </a:p>
+          <a:p>
+            <a:pPr marL="0" indent="0">
+              <a:buNone/>
+            </a:pPr>
+            <a:r>
+              <a:rPr lang="en-US" sz="1300" dirty="0">
+                <a:highlight>
+                  <a:srgbClr val="FFFF00"/>
+                </a:highlight>
+                <a:sym typeface="Wingdings" panose="05000000000000000000" pitchFamily="2" charset="2"/>
+              </a:rPr>
+              <a:t>Severity </a:t>
+            </a:r>
+            <a:r>
+              <a:rPr lang="en-US" sz="1300" dirty="0">
+                <a:sym typeface="Wingdings" panose="05000000000000000000" pitchFamily="2" charset="2"/>
+              </a:rPr>
+              <a:t>– different issues or problems , are been categorized in 5 sections</a:t>
+            </a:r>
+          </a:p>
+          <a:p>
+            <a:pPr marL="0" indent="0">
+              <a:buNone/>
+            </a:pPr>
+            <a:r>
+              <a:rPr lang="en-US" sz="1300" dirty="0">
+                <a:sym typeface="Wingdings" panose="05000000000000000000" pitchFamily="2" charset="2"/>
+              </a:rPr>
+              <a:t>                               1st extremely high sever  is blocker  it need to be solved primarily </a:t>
+            </a:r>
+          </a:p>
+          <a:p>
+            <a:pPr marL="0" indent="0">
+              <a:buNone/>
+            </a:pPr>
+            <a:r>
+              <a:rPr lang="en-US" sz="1300" dirty="0">
+                <a:sym typeface="Wingdings" panose="05000000000000000000" pitchFamily="2" charset="2"/>
+              </a:rPr>
+              <a:t>                               2nd extremely high sever Is Critical  it need to be solved primarily , but after blocker</a:t>
+            </a:r>
+          </a:p>
+          <a:p>
+            <a:pPr marL="0" indent="0">
+              <a:buNone/>
+            </a:pPr>
+            <a:r>
+              <a:rPr lang="en-US" sz="1300" dirty="0">
+                <a:sym typeface="Wingdings" panose="05000000000000000000" pitchFamily="2" charset="2"/>
+              </a:rPr>
+              <a:t>----------------------------------------------------------------------------</a:t>
+            </a:r>
+            <a:r>
+              <a:rPr lang="en-US" sz="1300" dirty="0">
+                <a:highlight>
+                  <a:srgbClr val="FF0000"/>
+                </a:highlight>
+                <a:sym typeface="Wingdings" panose="05000000000000000000" pitchFamily="2" charset="2"/>
+              </a:rPr>
+              <a:t>CODE section-</a:t>
+            </a:r>
+            <a:r>
+              <a:rPr lang="en-US" sz="1300" dirty="0">
+                <a:sym typeface="Wingdings" panose="05000000000000000000" pitchFamily="2" charset="2"/>
+              </a:rPr>
+              <a:t>-----------------------------------------------------------------------------------------------</a:t>
+            </a:r>
+          </a:p>
+          <a:p>
+            <a:r>
+              <a:rPr lang="en-US" sz="1300" dirty="0">
+                <a:sym typeface="Wingdings" panose="05000000000000000000" pitchFamily="2" charset="2"/>
+              </a:rPr>
+              <a:t>This section show our complete project ,along with project folder structure  </a:t>
+            </a:r>
+            <a:r>
+              <a:rPr lang="en-US" sz="1200" dirty="0">
+                <a:sym typeface="Wingdings" panose="05000000000000000000" pitchFamily="2" charset="2"/>
+              </a:rPr>
+              <a:t>Line of code ,Bugs, </a:t>
+            </a:r>
+            <a:r>
+              <a:rPr lang="en-US" sz="1200" dirty="0" err="1">
+                <a:sym typeface="Wingdings" panose="05000000000000000000" pitchFamily="2" charset="2"/>
+              </a:rPr>
+              <a:t>Vul</a:t>
+            </a:r>
+            <a:r>
+              <a:rPr lang="en-US" sz="1200" dirty="0">
+                <a:sym typeface="Wingdings" panose="05000000000000000000" pitchFamily="2" charset="2"/>
+              </a:rPr>
+              <a:t> code, smell Sec, hotspot cover ,Duplicate</a:t>
+            </a:r>
+          </a:p>
+          <a:p>
+            <a:r>
+              <a:rPr lang="en-US" sz="1200" dirty="0">
+                <a:sym typeface="Wingdings" panose="05000000000000000000" pitchFamily="2" charset="2"/>
+              </a:rPr>
+              <a:t>open any folder file can be opened</a:t>
+            </a:r>
+          </a:p>
+          <a:p>
+            <a:r>
+              <a:rPr lang="en-US" sz="1200" dirty="0">
+                <a:sym typeface="Wingdings" panose="05000000000000000000" pitchFamily="2" charset="2"/>
+              </a:rPr>
+              <a:t>DETALIED ANALYSIS</a:t>
+            </a:r>
+          </a:p>
+          <a:p>
+            <a:pPr marL="0" indent="0">
+              <a:buNone/>
+            </a:pPr>
+            <a:r>
+              <a:rPr lang="en-US" sz="1200" dirty="0">
+                <a:sym typeface="Wingdings" panose="05000000000000000000" pitchFamily="2" charset="2"/>
+              </a:rPr>
+              <a:t>=======================================================NEXT SLIDE===========================================</a:t>
+            </a:r>
+            <a:endParaRPr lang="en-US" sz="1200" dirty="0"/>
           </a:p>
         </p:txBody>
       </p:sp>
     </p:spTree>
     <p:extLst>
       <p:ext uri="{BB962C8B-B14F-4D97-AF65-F5344CB8AC3E}">
-        <p14:creationId xmlns:p14="http://schemas.microsoft.com/office/powerpoint/2010/main" val="755103224"/>
+        <p14:creationId xmlns:p14="http://schemas.microsoft.com/office/powerpoint/2010/main" val="3374294783"/>
       </p:ext>
     </p:extLst>
   </p:cSld>
@@ -8114,7 +8453,7 @@
       </p:grpSpPr>
       <p:sp>
         <p:nvSpPr>
-          <p:cNvPr id="2" name="Rectangle 1"/>
+          <p:cNvPr id="4" name="Rectangle 3"/>
           <p:cNvSpPr/>
           <p:nvPr/>
         </p:nvSpPr>
@@ -8160,7 +8499,7 @@
       </p:sp>
       <p:sp>
         <p:nvSpPr>
-          <p:cNvPr id="3" name="Content Placeholder 2"/>
+          <p:cNvPr id="5" name="Content Placeholder 2"/>
           <p:cNvSpPr txBox="1">
             <a:spLocks/>
           </p:cNvSpPr>
@@ -8168,8 +8507,8 @@
         </p:nvSpPr>
         <p:spPr>
           <a:xfrm>
-            <a:off x="675278" y="696119"/>
-            <a:ext cx="4049122" cy="457200"/>
+            <a:off x="675277" y="696119"/>
+            <a:ext cx="9230723" cy="439869"/>
           </a:xfrm>
           <a:prstGeom prst="rect">
             <a:avLst/>
@@ -8319,6 +8658,1578 @@
               <a:buNone/>
             </a:pPr>
             <a:r>
+              <a:rPr lang="en-US" sz="1800" b="1" dirty="0">
+                <a:solidFill>
+                  <a:srgbClr val="2B3B4B"/>
+                </a:solidFill>
+                <a:latin typeface="Tahoma" panose="020B0604030504040204" pitchFamily="34" charset="0"/>
+                <a:ea typeface="Tahoma" panose="020B0604030504040204" pitchFamily="34" charset="0"/>
+                <a:cs typeface="Tahoma" panose="020B0604030504040204" pitchFamily="34" charset="0"/>
+              </a:rPr>
+              <a:t>SonarQube Features  </a:t>
+            </a:r>
+            <a:r>
+              <a:rPr lang="en-US" sz="1300" u="sng" dirty="0">
+                <a:solidFill>
+                  <a:srgbClr val="2B3B4B"/>
+                </a:solidFill>
+                <a:latin typeface="Tahoma" panose="020B0604030504040204" pitchFamily="34" charset="0"/>
+                <a:ea typeface="Tahoma" panose="020B0604030504040204" pitchFamily="34" charset="0"/>
+                <a:cs typeface="Tahoma" panose="020B0604030504040204" pitchFamily="34" charset="0"/>
+              </a:rPr>
+              <a:t>we will see some features</a:t>
+            </a:r>
+            <a:endParaRPr lang="en-US" sz="1800" b="1" dirty="0">
+              <a:solidFill>
+                <a:srgbClr val="2B3B4B"/>
+              </a:solidFill>
+              <a:latin typeface="Tahoma" panose="020B0604030504040204" pitchFamily="34" charset="0"/>
+              <a:ea typeface="Tahoma" panose="020B0604030504040204" pitchFamily="34" charset="0"/>
+              <a:cs typeface="Tahoma" panose="020B0604030504040204" pitchFamily="34" charset="0"/>
+            </a:endParaRPr>
+          </a:p>
+        </p:txBody>
+      </p:sp>
+      <p:sp>
+        <p:nvSpPr>
+          <p:cNvPr id="2" name="TextBox 1"/>
+          <p:cNvSpPr txBox="1"/>
+          <p:nvPr/>
+        </p:nvSpPr>
+        <p:spPr>
+          <a:xfrm>
+            <a:off x="152400" y="1174882"/>
+            <a:ext cx="9840322" cy="4008790"/>
+          </a:xfrm>
+          <a:prstGeom prst="rect">
+            <a:avLst/>
+          </a:prstGeom>
+          <a:noFill/>
+        </p:spPr>
+        <p:txBody>
+          <a:bodyPr wrap="square" rtlCol="0">
+            <a:spAutoFit/>
+          </a:bodyPr>
+          <a:lstStyle/>
+          <a:p>
+            <a:endParaRPr lang="en-US" dirty="0"/>
+          </a:p>
+          <a:p>
+            <a:pPr marL="342900" lvl="0" indent="-342900">
+              <a:lnSpc>
+                <a:spcPct val="150000"/>
+              </a:lnSpc>
+              <a:buFont typeface="Arial" panose="020B0604020202020204" pitchFamily="34" charset="0"/>
+              <a:buChar char="•"/>
+            </a:pPr>
+            <a:r>
+              <a:rPr lang="en-US" dirty="0"/>
+              <a:t>Comments(comments and duplication)</a:t>
+            </a:r>
+            <a:r>
+              <a:rPr lang="en-US" sz="1200" u="sng" dirty="0"/>
+              <a:t>Just seen </a:t>
+            </a:r>
+            <a:r>
+              <a:rPr lang="en-US" sz="1200" u="sng" dirty="0">
+                <a:sym typeface="Wingdings" panose="05000000000000000000" pitchFamily="2" charset="2"/>
+              </a:rPr>
+              <a:t></a:t>
+            </a:r>
+            <a:r>
+              <a:rPr lang="en-US" sz="1100" i="1" u="sng" dirty="0"/>
+              <a:t>it means </a:t>
+            </a:r>
+            <a:r>
+              <a:rPr lang="en-US" sz="1100" i="1" u="sng" dirty="0">
+                <a:sym typeface="Wingdings" panose="05000000000000000000" pitchFamily="2" charset="2"/>
+              </a:rPr>
+              <a:t> </a:t>
+            </a:r>
+            <a:r>
+              <a:rPr lang="en-US" sz="1100" i="1" u="sng" dirty="0"/>
+              <a:t>developers add unnecessary comments </a:t>
+            </a:r>
+            <a:r>
+              <a:rPr lang="en-US" sz="1100" i="1" u="sng" dirty="0">
+                <a:sym typeface="Wingdings" panose="05000000000000000000" pitchFamily="2" charset="2"/>
+              </a:rPr>
+              <a:t> or duplicate logic is written   SQ detects it  </a:t>
+            </a:r>
+            <a:r>
+              <a:rPr lang="en-US" sz="1100" i="1" u="sng" dirty="0"/>
+              <a:t> </a:t>
+            </a:r>
+          </a:p>
+          <a:p>
+            <a:pPr marL="342900" lvl="0" indent="-342900">
+              <a:lnSpc>
+                <a:spcPct val="150000"/>
+              </a:lnSpc>
+              <a:buFont typeface="Arial" panose="020B0604020202020204" pitchFamily="34" charset="0"/>
+              <a:buChar char="•"/>
+            </a:pPr>
+            <a:r>
+              <a:rPr lang="en-US" dirty="0"/>
+              <a:t>Coding rules (standards)  </a:t>
+            </a:r>
+            <a:r>
+              <a:rPr lang="en-US" sz="1100" i="1" u="sng" dirty="0"/>
+              <a:t>it means  </a:t>
+            </a:r>
+            <a:r>
+              <a:rPr lang="en-US" sz="1100" i="1" u="sng" dirty="0">
+                <a:sym typeface="Wingdings" panose="05000000000000000000" pitchFamily="2" charset="2"/>
+              </a:rPr>
+              <a:t> SQ will force the developer to write the project as per some standard coding rules</a:t>
+            </a:r>
+            <a:endParaRPr lang="en-US" sz="1100" i="1" u="sng" dirty="0"/>
+          </a:p>
+          <a:p>
+            <a:pPr marL="342900" lvl="0" indent="-342900">
+              <a:lnSpc>
+                <a:spcPct val="150000"/>
+              </a:lnSpc>
+              <a:buFont typeface="Arial" panose="020B0604020202020204" pitchFamily="34" charset="0"/>
+              <a:buChar char="•"/>
+            </a:pPr>
+            <a:r>
+              <a:rPr lang="en-US" dirty="0"/>
+              <a:t>Potential Bugs and Vulnerabilities </a:t>
+            </a:r>
+            <a:r>
+              <a:rPr lang="en-US" sz="1200" i="1" u="sng" dirty="0"/>
+              <a:t>as we seen this</a:t>
+            </a:r>
+          </a:p>
+          <a:p>
+            <a:pPr marL="342900" lvl="0" indent="-342900">
+              <a:lnSpc>
+                <a:spcPct val="150000"/>
+              </a:lnSpc>
+              <a:buFont typeface="Arial" panose="020B0604020202020204" pitchFamily="34" charset="0"/>
+              <a:buChar char="•"/>
+            </a:pPr>
+            <a:r>
+              <a:rPr lang="en-US" dirty="0"/>
+              <a:t>Unit tests (Unit test coverage &amp; test case result) </a:t>
+            </a:r>
+            <a:r>
+              <a:rPr lang="en-US" sz="1100" i="1" u="sng" dirty="0"/>
+              <a:t>using the concept of code coverage </a:t>
+            </a:r>
+            <a:r>
+              <a:rPr lang="en-US" sz="1100" i="1" u="sng" dirty="0">
+                <a:sym typeface="Wingdings" panose="05000000000000000000" pitchFamily="2" charset="2"/>
+              </a:rPr>
+              <a:t> unit test results and its execution will be shown on SQ dashboard</a:t>
+            </a:r>
+            <a:endParaRPr lang="en-US" sz="1100" i="1" u="sng" dirty="0"/>
+          </a:p>
+          <a:p>
+            <a:pPr marL="342900" lvl="0" indent="-342900">
+              <a:lnSpc>
+                <a:spcPct val="150000"/>
+              </a:lnSpc>
+              <a:buFont typeface="Arial" panose="020B0604020202020204" pitchFamily="34" charset="0"/>
+              <a:buChar char="•"/>
+            </a:pPr>
+            <a:r>
+              <a:rPr lang="en-US" dirty="0"/>
+              <a:t>Complexity </a:t>
+            </a:r>
+            <a:r>
+              <a:rPr lang="en-US" sz="1200" i="1" u="sng" dirty="0"/>
+              <a:t>it means </a:t>
+            </a:r>
+            <a:r>
+              <a:rPr lang="en-US" sz="1200" i="1" u="sng" dirty="0">
+                <a:sym typeface="Wingdings" panose="05000000000000000000" pitchFamily="2" charset="2"/>
+              </a:rPr>
+              <a:t> </a:t>
+            </a:r>
+            <a:r>
+              <a:rPr lang="en-US" sz="1200" i="1" u="sng" dirty="0"/>
+              <a:t>code is having  high dependency  </a:t>
+            </a:r>
+            <a:r>
+              <a:rPr lang="en-US" sz="1200" i="1" u="sng" dirty="0">
+                <a:sym typeface="Wingdings" panose="05000000000000000000" pitchFamily="2" charset="2"/>
+              </a:rPr>
+              <a:t> higher will be the complexity </a:t>
+            </a:r>
+            <a:endParaRPr lang="en-US" sz="1200" i="1" u="sng" dirty="0"/>
+          </a:p>
+          <a:p>
+            <a:pPr marL="342900" lvl="0" indent="-342900">
+              <a:lnSpc>
+                <a:spcPct val="150000"/>
+              </a:lnSpc>
+              <a:buFont typeface="Arial" panose="020B0604020202020204" pitchFamily="34" charset="0"/>
+              <a:buChar char="•"/>
+            </a:pPr>
+            <a:r>
+              <a:rPr lang="en-US" dirty="0"/>
+              <a:t>Multi Language Support SQ </a:t>
+            </a:r>
+            <a:r>
+              <a:rPr lang="en-US" sz="1200" u="sng" dirty="0"/>
+              <a:t>supports multiple </a:t>
+            </a:r>
+            <a:r>
+              <a:rPr lang="en-US" sz="1200" u="sng" dirty="0" err="1"/>
+              <a:t>langu</a:t>
+            </a:r>
+            <a:r>
+              <a:rPr lang="en-US" sz="1200" u="sng" dirty="0"/>
+              <a:t>(java ,C++, python, </a:t>
+            </a:r>
+            <a:r>
+              <a:rPr lang="en-US" sz="1200" u="sng" dirty="0" err="1"/>
+              <a:t>.net</a:t>
+            </a:r>
+            <a:r>
+              <a:rPr lang="en-US" sz="1200" u="sng" dirty="0"/>
+              <a:t>)</a:t>
+            </a:r>
+          </a:p>
+          <a:p>
+            <a:endParaRPr lang="en-US" dirty="0"/>
+          </a:p>
+        </p:txBody>
+      </p:sp>
+    </p:spTree>
+    <p:extLst>
+      <p:ext uri="{BB962C8B-B14F-4D97-AF65-F5344CB8AC3E}">
+        <p14:creationId xmlns:p14="http://schemas.microsoft.com/office/powerpoint/2010/main" val="2110748941"/>
+      </p:ext>
+    </p:extLst>
+  </p:cSld>
+  <p:clrMapOvr>
+    <a:masterClrMapping/>
+  </p:clrMapOvr>
+</p:sld>
+</file>
+
+<file path=ppt/slides/slide12.xml><?xml version="1.0" encoding="utf-8"?>
+<p:sld xmlns:a="http://schemas.openxmlformats.org/drawingml/2006/main" xmlns:r="http://schemas.openxmlformats.org/officeDocument/2006/relationships" xmlns:p="http://schemas.openxmlformats.org/presentationml/2006/main">
+  <p:cSld>
+    <p:spTree>
+      <p:nvGrpSpPr>
+        <p:cNvPr id="1" name=""/>
+        <p:cNvGrpSpPr/>
+        <p:nvPr/>
+      </p:nvGrpSpPr>
+      <p:grpSpPr>
+        <a:xfrm>
+          <a:off x="0" y="0"/>
+          <a:ext cx="0" cy="0"/>
+          <a:chOff x="0" y="0"/>
+          <a:chExt cx="0" cy="0"/>
+        </a:xfrm>
+      </p:grpSpPr>
+      <p:sp>
+        <p:nvSpPr>
+          <p:cNvPr id="2" name="Rectangle 1"/>
+          <p:cNvSpPr/>
+          <p:nvPr/>
+        </p:nvSpPr>
+        <p:spPr>
+          <a:xfrm>
+            <a:off x="-18570" y="277813"/>
+            <a:ext cx="675278" cy="265906"/>
+          </a:xfrm>
+          <a:prstGeom prst="rect">
+            <a:avLst/>
+          </a:prstGeom>
+          <a:solidFill>
+            <a:srgbClr val="00B8F1"/>
+          </a:solidFill>
+          <a:ln>
+            <a:noFill/>
+          </a:ln>
+        </p:spPr>
+        <p:style>
+          <a:lnRef idx="2">
+            <a:schemeClr val="accent1">
+              <a:shade val="50000"/>
+            </a:schemeClr>
+          </a:lnRef>
+          <a:fillRef idx="1">
+            <a:schemeClr val="accent1"/>
+          </a:fillRef>
+          <a:effectRef idx="0">
+            <a:schemeClr val="accent1"/>
+          </a:effectRef>
+          <a:fontRef idx="minor">
+            <a:schemeClr val="lt1"/>
+          </a:fontRef>
+        </p:style>
+        <p:txBody>
+          <a:bodyPr rtlCol="0" anchor="ctr"/>
+          <a:lstStyle/>
+          <a:p>
+            <a:pPr algn="ctr"/>
+            <a:endParaRPr lang="en-US"/>
+          </a:p>
+        </p:txBody>
+      </p:sp>
+      <p:sp>
+        <p:nvSpPr>
+          <p:cNvPr id="3" name="Content Placeholder 2"/>
+          <p:cNvSpPr txBox="1">
+            <a:spLocks/>
+          </p:cNvSpPr>
+          <p:nvPr/>
+        </p:nvSpPr>
+        <p:spPr>
+          <a:xfrm>
+            <a:off x="665032" y="277813"/>
+            <a:ext cx="9002122" cy="457200"/>
+          </a:xfrm>
+          <a:prstGeom prst="rect">
+            <a:avLst/>
+          </a:prstGeom>
+        </p:spPr>
+        <p:txBody>
+          <a:bodyPr lIns="100557" tIns="50278" rIns="100557" bIns="50278"/>
+          <a:lstStyle>
+            <a:lvl1pPr marL="377087" indent="-377087" algn="l" defTabSz="1005566" rtl="0" eaLnBrk="1" latinLnBrk="0" hangingPunct="1">
+              <a:spcBef>
+                <a:spcPct val="20000"/>
+              </a:spcBef>
+              <a:buFont typeface="Arial" panose="020B0604020202020204" pitchFamily="34" charset="0"/>
+              <a:buChar char="•"/>
+              <a:defRPr sz="3500" kern="1200">
+                <a:solidFill>
+                  <a:schemeClr val="tx1"/>
+                </a:solidFill>
+                <a:latin typeface="+mn-lt"/>
+                <a:ea typeface="+mn-ea"/>
+                <a:cs typeface="+mn-cs"/>
+              </a:defRPr>
+            </a:lvl1pPr>
+            <a:lvl2pPr marL="817022" indent="-314239" algn="l" defTabSz="1005566" rtl="0" eaLnBrk="1" latinLnBrk="0" hangingPunct="1">
+              <a:spcBef>
+                <a:spcPct val="20000"/>
+              </a:spcBef>
+              <a:buFont typeface="Arial" panose="020B0604020202020204" pitchFamily="34" charset="0"/>
+              <a:buChar char="–"/>
+              <a:defRPr sz="3100" kern="1200">
+                <a:solidFill>
+                  <a:schemeClr val="tx1"/>
+                </a:solidFill>
+                <a:latin typeface="+mn-lt"/>
+                <a:ea typeface="+mn-ea"/>
+                <a:cs typeface="+mn-cs"/>
+              </a:defRPr>
+            </a:lvl2pPr>
+            <a:lvl3pPr marL="1256957" indent="-251391" algn="l" defTabSz="1005566" rtl="0" eaLnBrk="1" latinLnBrk="0" hangingPunct="1">
+              <a:spcBef>
+                <a:spcPct val="20000"/>
+              </a:spcBef>
+              <a:buFont typeface="Arial" panose="020B0604020202020204" pitchFamily="34" charset="0"/>
+              <a:buChar char="•"/>
+              <a:defRPr sz="2600" kern="1200">
+                <a:solidFill>
+                  <a:schemeClr val="tx1"/>
+                </a:solidFill>
+                <a:latin typeface="+mn-lt"/>
+                <a:ea typeface="+mn-ea"/>
+                <a:cs typeface="+mn-cs"/>
+              </a:defRPr>
+            </a:lvl3pPr>
+            <a:lvl4pPr marL="1759740" indent="-251391" algn="l" defTabSz="1005566" rtl="0" eaLnBrk="1" latinLnBrk="0" hangingPunct="1">
+              <a:spcBef>
+                <a:spcPct val="20000"/>
+              </a:spcBef>
+              <a:buFont typeface="Arial" panose="020B0604020202020204" pitchFamily="34" charset="0"/>
+              <a:buChar char="–"/>
+              <a:defRPr sz="2200" kern="1200">
+                <a:solidFill>
+                  <a:schemeClr val="tx1"/>
+                </a:solidFill>
+                <a:latin typeface="+mn-lt"/>
+                <a:ea typeface="+mn-ea"/>
+                <a:cs typeface="+mn-cs"/>
+              </a:defRPr>
+            </a:lvl4pPr>
+            <a:lvl5pPr marL="2262523" indent="-251391" algn="l" defTabSz="1005566" rtl="0" eaLnBrk="1" latinLnBrk="0" hangingPunct="1">
+              <a:spcBef>
+                <a:spcPct val="20000"/>
+              </a:spcBef>
+              <a:buFont typeface="Arial" panose="020B0604020202020204" pitchFamily="34" charset="0"/>
+              <a:buChar char="»"/>
+              <a:defRPr sz="2200" kern="1200">
+                <a:solidFill>
+                  <a:schemeClr val="tx1"/>
+                </a:solidFill>
+                <a:latin typeface="+mn-lt"/>
+                <a:ea typeface="+mn-ea"/>
+                <a:cs typeface="+mn-cs"/>
+              </a:defRPr>
+            </a:lvl5pPr>
+            <a:lvl6pPr marL="2765306" indent="-251391" algn="l" defTabSz="1005566" rtl="0" eaLnBrk="1" latinLnBrk="0" hangingPunct="1">
+              <a:spcBef>
+                <a:spcPct val="20000"/>
+              </a:spcBef>
+              <a:buFont typeface="Arial" panose="020B0604020202020204" pitchFamily="34" charset="0"/>
+              <a:buChar char="•"/>
+              <a:defRPr sz="2200" kern="1200">
+                <a:solidFill>
+                  <a:schemeClr val="tx1"/>
+                </a:solidFill>
+                <a:latin typeface="+mn-lt"/>
+                <a:ea typeface="+mn-ea"/>
+                <a:cs typeface="+mn-cs"/>
+              </a:defRPr>
+            </a:lvl6pPr>
+            <a:lvl7pPr marL="3268088" indent="-251391" algn="l" defTabSz="1005566" rtl="0" eaLnBrk="1" latinLnBrk="0" hangingPunct="1">
+              <a:spcBef>
+                <a:spcPct val="20000"/>
+              </a:spcBef>
+              <a:buFont typeface="Arial" panose="020B0604020202020204" pitchFamily="34" charset="0"/>
+              <a:buChar char="•"/>
+              <a:defRPr sz="2200" kern="1200">
+                <a:solidFill>
+                  <a:schemeClr val="tx1"/>
+                </a:solidFill>
+                <a:latin typeface="+mn-lt"/>
+                <a:ea typeface="+mn-ea"/>
+                <a:cs typeface="+mn-cs"/>
+              </a:defRPr>
+            </a:lvl7pPr>
+            <a:lvl8pPr marL="3770871" indent="-251391" algn="l" defTabSz="1005566" rtl="0" eaLnBrk="1" latinLnBrk="0" hangingPunct="1">
+              <a:spcBef>
+                <a:spcPct val="20000"/>
+              </a:spcBef>
+              <a:buFont typeface="Arial" panose="020B0604020202020204" pitchFamily="34" charset="0"/>
+              <a:buChar char="•"/>
+              <a:defRPr sz="2200" kern="1200">
+                <a:solidFill>
+                  <a:schemeClr val="tx1"/>
+                </a:solidFill>
+                <a:latin typeface="+mn-lt"/>
+                <a:ea typeface="+mn-ea"/>
+                <a:cs typeface="+mn-cs"/>
+              </a:defRPr>
+            </a:lvl8pPr>
+            <a:lvl9pPr marL="4273654" indent="-251391" algn="l" defTabSz="1005566" rtl="0" eaLnBrk="1" latinLnBrk="0" hangingPunct="1">
+              <a:spcBef>
+                <a:spcPct val="20000"/>
+              </a:spcBef>
+              <a:buFont typeface="Arial" panose="020B0604020202020204" pitchFamily="34" charset="0"/>
+              <a:buChar char="•"/>
+              <a:defRPr sz="2200" kern="1200">
+                <a:solidFill>
+                  <a:schemeClr val="tx1"/>
+                </a:solidFill>
+                <a:latin typeface="+mn-lt"/>
+                <a:ea typeface="+mn-ea"/>
+                <a:cs typeface="+mn-cs"/>
+              </a:defRPr>
+            </a:lvl9pPr>
+          </a:lstStyle>
+          <a:p>
+            <a:pPr marL="0" indent="0">
+              <a:buNone/>
+            </a:pPr>
+            <a:r>
+              <a:rPr lang="en-US" sz="1800" b="1" dirty="0">
+                <a:solidFill>
+                  <a:srgbClr val="2B3B4B"/>
+                </a:solidFill>
+                <a:latin typeface="Tahoma" panose="020B0604030504040204" pitchFamily="34" charset="0"/>
+                <a:ea typeface="Tahoma" panose="020B0604030504040204" pitchFamily="34" charset="0"/>
+                <a:cs typeface="Tahoma" panose="020B0604030504040204" pitchFamily="34" charset="0"/>
+              </a:rPr>
+              <a:t>Available Plugins </a:t>
+            </a:r>
+            <a:r>
+              <a:rPr lang="en-US" sz="1200" dirty="0" err="1">
+                <a:solidFill>
+                  <a:srgbClr val="2B3B4B"/>
+                </a:solidFill>
+                <a:latin typeface="Tahoma" panose="020B0604030504040204" pitchFamily="34" charset="0"/>
+                <a:ea typeface="Tahoma" panose="020B0604030504040204" pitchFamily="34" charset="0"/>
+                <a:cs typeface="Tahoma" panose="020B0604030504040204" pitchFamily="34" charset="0"/>
+              </a:rPr>
+              <a:t>Plugins</a:t>
+            </a:r>
+            <a:r>
+              <a:rPr lang="en-US" sz="1200" dirty="0">
+                <a:solidFill>
+                  <a:srgbClr val="2B3B4B"/>
+                </a:solidFill>
+                <a:latin typeface="Tahoma" panose="020B0604030504040204" pitchFamily="34" charset="0"/>
+                <a:ea typeface="Tahoma" panose="020B0604030504040204" pitchFamily="34" charset="0"/>
+                <a:cs typeface="Tahoma" panose="020B0604030504040204" pitchFamily="34" charset="0"/>
+              </a:rPr>
+              <a:t> means </a:t>
+            </a:r>
+            <a:r>
+              <a:rPr lang="en-US" sz="1200" dirty="0">
+                <a:solidFill>
+                  <a:srgbClr val="2B3B4B"/>
+                </a:solidFill>
+                <a:latin typeface="Tahoma" panose="020B0604030504040204" pitchFamily="34" charset="0"/>
+                <a:ea typeface="Tahoma" panose="020B0604030504040204" pitchFamily="34" charset="0"/>
+                <a:cs typeface="Tahoma" panose="020B0604030504040204" pitchFamily="34" charset="0"/>
+                <a:sym typeface="Wingdings" panose="05000000000000000000" pitchFamily="2" charset="2"/>
+              </a:rPr>
+              <a:t>it is mechanism through with different languages  support can be enable  with the </a:t>
+            </a:r>
+            <a:r>
+              <a:rPr lang="en-US" sz="1200" dirty="0" err="1">
+                <a:solidFill>
+                  <a:srgbClr val="2B3B4B"/>
+                </a:solidFill>
+                <a:latin typeface="Tahoma" panose="020B0604030504040204" pitchFamily="34" charset="0"/>
+                <a:ea typeface="Tahoma" panose="020B0604030504040204" pitchFamily="34" charset="0"/>
+                <a:cs typeface="Tahoma" panose="020B0604030504040204" pitchFamily="34" charset="0"/>
+                <a:sym typeface="Wingdings" panose="05000000000000000000" pitchFamily="2" charset="2"/>
+              </a:rPr>
+              <a:t>SQexplain</a:t>
+            </a:r>
+            <a:r>
+              <a:rPr lang="en-US" sz="1200" dirty="0">
+                <a:solidFill>
+                  <a:srgbClr val="2B3B4B"/>
+                </a:solidFill>
+                <a:latin typeface="Tahoma" panose="020B0604030504040204" pitchFamily="34" charset="0"/>
+                <a:ea typeface="Tahoma" panose="020B0604030504040204" pitchFamily="34" charset="0"/>
+                <a:cs typeface="Tahoma" panose="020B0604030504040204" pitchFamily="34" charset="0"/>
+                <a:sym typeface="Wingdings" panose="05000000000000000000" pitchFamily="2" charset="2"/>
+              </a:rPr>
+              <a:t> image</a:t>
+            </a:r>
+            <a:r>
+              <a:rPr lang="en-US" sz="1800" b="1" dirty="0">
+                <a:solidFill>
+                  <a:srgbClr val="2B3B4B"/>
+                </a:solidFill>
+                <a:latin typeface="Tahoma" panose="020B0604030504040204" pitchFamily="34" charset="0"/>
+                <a:ea typeface="Tahoma" panose="020B0604030504040204" pitchFamily="34" charset="0"/>
+                <a:cs typeface="Tahoma" panose="020B0604030504040204" pitchFamily="34" charset="0"/>
+              </a:rPr>
+              <a:t> </a:t>
+            </a:r>
+          </a:p>
+        </p:txBody>
+      </p:sp>
+      <p:pic>
+        <p:nvPicPr>
+          <p:cNvPr id="4" name="Picture 2"/>
+          <p:cNvPicPr>
+            <a:picLocks noChangeAspect="1" noChangeArrowheads="1"/>
+          </p:cNvPicPr>
+          <p:nvPr/>
+        </p:nvPicPr>
+        <p:blipFill>
+          <a:blip r:embed="rId2">
+            <a:extLst>
+              <a:ext uri="{28A0092B-C50C-407E-A947-70E740481C1C}">
+                <a14:useLocalDpi xmlns:a14="http://schemas.microsoft.com/office/drawing/2010/main" val="0"/>
+              </a:ext>
+            </a:extLst>
+          </a:blip>
+          <a:srcRect/>
+          <a:stretch>
+            <a:fillRect/>
+          </a:stretch>
+        </p:blipFill>
+        <p:spPr bwMode="auto">
+          <a:xfrm>
+            <a:off x="3429000" y="1305719"/>
+            <a:ext cx="3131019" cy="3352800"/>
+          </a:xfrm>
+          <a:prstGeom prst="rect">
+            <a:avLst/>
+          </a:prstGeom>
+          <a:noFill/>
+          <a:ln w="9525">
+            <a:solidFill>
+              <a:schemeClr val="tx1"/>
+            </a:solidFill>
+            <a:miter lim="800000"/>
+            <a:headEnd/>
+            <a:tailEnd/>
+          </a:ln>
+          <a:extLst>
+            <a:ext uri="{909E8E84-426E-40DD-AFC4-6F175D3DCCD1}">
+              <a14:hiddenFill xmlns:a14="http://schemas.microsoft.com/office/drawing/2010/main">
+                <a:solidFill>
+                  <a:schemeClr val="accent1"/>
+                </a:solidFill>
+              </a14:hiddenFill>
+            </a:ext>
+          </a:extLst>
+        </p:spPr>
+      </p:pic>
+    </p:spTree>
+    <p:extLst>
+      <p:ext uri="{BB962C8B-B14F-4D97-AF65-F5344CB8AC3E}">
+        <p14:creationId xmlns:p14="http://schemas.microsoft.com/office/powerpoint/2010/main" val="2738948166"/>
+      </p:ext>
+    </p:extLst>
+  </p:cSld>
+  <p:clrMapOvr>
+    <a:masterClrMapping/>
+  </p:clrMapOvr>
+</p:sld>
+</file>
+
+<file path=ppt/slides/slide13.xml><?xml version="1.0" encoding="utf-8"?>
+<p:sld xmlns:a="http://schemas.openxmlformats.org/drawingml/2006/main" xmlns:r="http://schemas.openxmlformats.org/officeDocument/2006/relationships" xmlns:p="http://schemas.openxmlformats.org/presentationml/2006/main">
+  <p:cSld>
+    <p:spTree>
+      <p:nvGrpSpPr>
+        <p:cNvPr id="1" name=""/>
+        <p:cNvGrpSpPr/>
+        <p:nvPr/>
+      </p:nvGrpSpPr>
+      <p:grpSpPr>
+        <a:xfrm>
+          <a:off x="0" y="0"/>
+          <a:ext cx="0" cy="0"/>
+          <a:chOff x="0" y="0"/>
+          <a:chExt cx="0" cy="0"/>
+        </a:xfrm>
+      </p:grpSpPr>
+      <p:sp>
+        <p:nvSpPr>
+          <p:cNvPr id="2" name="Title 1"/>
+          <p:cNvSpPr>
+            <a:spLocks noGrp="1"/>
+          </p:cNvSpPr>
+          <p:nvPr>
+            <p:ph type="title"/>
+          </p:nvPr>
+        </p:nvSpPr>
+        <p:spPr>
+          <a:xfrm>
+            <a:off x="685800" y="2448719"/>
+            <a:ext cx="8549640" cy="1124027"/>
+          </a:xfrm>
+        </p:spPr>
+        <p:txBody>
+          <a:bodyPr/>
+          <a:lstStyle/>
+          <a:p>
+            <a:pPr algn="ctr"/>
+            <a:r>
+              <a:rPr lang="en-US" dirty="0" err="1"/>
+              <a:t>DemoNstration</a:t>
+            </a:r>
+            <a:endParaRPr lang="en-US" dirty="0"/>
+          </a:p>
+        </p:txBody>
+      </p:sp>
+    </p:spTree>
+    <p:extLst>
+      <p:ext uri="{BB962C8B-B14F-4D97-AF65-F5344CB8AC3E}">
+        <p14:creationId xmlns:p14="http://schemas.microsoft.com/office/powerpoint/2010/main" val="755103224"/>
+      </p:ext>
+    </p:extLst>
+  </p:cSld>
+  <p:clrMapOvr>
+    <a:masterClrMapping/>
+  </p:clrMapOvr>
+</p:sld>
+</file>
+
+<file path=ppt/slides/slide14.xml><?xml version="1.0" encoding="utf-8"?>
+<p:sld xmlns:a="http://schemas.openxmlformats.org/drawingml/2006/main" xmlns:r="http://schemas.openxmlformats.org/officeDocument/2006/relationships" xmlns:p="http://schemas.openxmlformats.org/presentationml/2006/main">
+  <p:cSld>
+    <p:spTree>
+      <p:nvGrpSpPr>
+        <p:cNvPr id="1" name=""/>
+        <p:cNvGrpSpPr/>
+        <p:nvPr/>
+      </p:nvGrpSpPr>
+      <p:grpSpPr>
+        <a:xfrm>
+          <a:off x="0" y="0"/>
+          <a:ext cx="0" cy="0"/>
+          <a:chOff x="0" y="0"/>
+          <a:chExt cx="0" cy="0"/>
+        </a:xfrm>
+      </p:grpSpPr>
+      <p:sp>
+        <p:nvSpPr>
+          <p:cNvPr id="3" name="Content Placeholder 2">
+            <a:extLst>
+              <a:ext uri="{FF2B5EF4-FFF2-40B4-BE49-F238E27FC236}">
+                <a16:creationId xmlns:a16="http://schemas.microsoft.com/office/drawing/2014/main" id="{66FAB89B-F11C-2C81-DF94-400CC8BB570F}"/>
+              </a:ext>
+            </a:extLst>
+          </p:cNvPr>
+          <p:cNvSpPr>
+            <a:spLocks noGrp="1"/>
+          </p:cNvSpPr>
+          <p:nvPr>
+            <p:ph idx="1"/>
+          </p:nvPr>
+        </p:nvSpPr>
+        <p:spPr>
+          <a:xfrm>
+            <a:off x="152400" y="86519"/>
+            <a:ext cx="9753600" cy="5257799"/>
+          </a:xfrm>
+        </p:spPr>
+        <p:txBody>
+          <a:bodyPr/>
+          <a:lstStyle/>
+          <a:p>
+            <a:r>
+              <a:rPr lang="en-US" sz="1200" dirty="0">
+                <a:highlight>
+                  <a:srgbClr val="FF0000"/>
+                </a:highlight>
+              </a:rPr>
+              <a:t>RULES</a:t>
+            </a:r>
+            <a:r>
+              <a:rPr lang="en-US" sz="1200" dirty="0">
+                <a:highlight>
+                  <a:srgbClr val="FFFF00"/>
+                </a:highlight>
+              </a:rPr>
+              <a:t> :</a:t>
+            </a:r>
+            <a:r>
+              <a:rPr lang="en-US" sz="1200" dirty="0"/>
+              <a:t> Now we will see rules Section </a:t>
+            </a:r>
+            <a:r>
+              <a:rPr lang="en-US" sz="1200" dirty="0">
+                <a:sym typeface="Wingdings" panose="05000000000000000000" pitchFamily="2" charset="2"/>
+              </a:rPr>
+              <a:t> </a:t>
+            </a:r>
+            <a:r>
+              <a:rPr lang="en-US" sz="1200" dirty="0"/>
+              <a:t>1stly </a:t>
+            </a:r>
+            <a:r>
+              <a:rPr lang="en-US" sz="1200" dirty="0">
+                <a:sym typeface="Wingdings" panose="05000000000000000000" pitchFamily="2" charset="2"/>
+              </a:rPr>
+              <a:t> What is rule ?  in simple words “it is the set of a condition that a particular                                      language project must satisfy for the purpose of analysis   so </a:t>
+            </a:r>
+            <a:r>
+              <a:rPr lang="en-US" sz="1200" dirty="0">
+                <a:highlight>
+                  <a:srgbClr val="FFFF00"/>
+                </a:highlight>
+                <a:sym typeface="Wingdings" panose="05000000000000000000" pitchFamily="2" charset="2"/>
+              </a:rPr>
+              <a:t>in my case</a:t>
+            </a:r>
+          </a:p>
+          <a:p>
+            <a:r>
+              <a:rPr lang="en-US" sz="1200" dirty="0">
+                <a:highlight>
+                  <a:srgbClr val="FF0000"/>
+                </a:highlight>
+              </a:rPr>
+              <a:t>QP:</a:t>
+            </a:r>
+          </a:p>
+          <a:p>
+            <a:pPr marL="0" indent="0">
+              <a:buNone/>
+            </a:pPr>
+            <a:r>
+              <a:rPr lang="en-US" sz="1200" dirty="0"/>
+              <a:t>                        1. what is QP</a:t>
+            </a:r>
+          </a:p>
+          <a:p>
+            <a:pPr marL="0" indent="0">
+              <a:buNone/>
+            </a:pPr>
+            <a:r>
+              <a:rPr lang="en-US" sz="1200" dirty="0"/>
+              <a:t>                       Ans :  so it just a just a collection of rule  , and this collection of rules will be applied to our project depending on our language. (repeat) </a:t>
+            </a:r>
+          </a:p>
+          <a:p>
+            <a:pPr marL="0" indent="0">
+              <a:buNone/>
+            </a:pPr>
+            <a:r>
+              <a:rPr lang="en-US" sz="1200" dirty="0"/>
+              <a:t>                               -There are many languages to which default /Build in QP are applied (</a:t>
+            </a:r>
+            <a:r>
+              <a:rPr lang="en-US" sz="1200" dirty="0">
+                <a:highlight>
+                  <a:srgbClr val="FFFF00"/>
+                </a:highlight>
+              </a:rPr>
+              <a:t>show</a:t>
+            </a:r>
+            <a:r>
+              <a:rPr lang="en-US" sz="1200" dirty="0"/>
+              <a:t>) </a:t>
+            </a:r>
+          </a:p>
+          <a:p>
+            <a:pPr marL="0" indent="0">
+              <a:buNone/>
+            </a:pPr>
+            <a:r>
+              <a:rPr lang="en-US" sz="1200" dirty="0"/>
+              <a:t>                                - (</a:t>
+            </a:r>
+            <a:r>
+              <a:rPr lang="en-US" sz="1200" dirty="0">
+                <a:highlight>
+                  <a:srgbClr val="FFFF00"/>
+                </a:highlight>
+              </a:rPr>
+              <a:t>navigate inside</a:t>
+            </a:r>
+            <a:r>
+              <a:rPr lang="en-US" sz="1200" dirty="0"/>
+              <a:t>)</a:t>
+            </a:r>
+          </a:p>
+          <a:p>
+            <a:pPr marL="0" indent="0">
+              <a:buNone/>
+            </a:pPr>
+            <a:r>
+              <a:rPr lang="en-US" sz="1200" dirty="0"/>
+              <a:t>                                - According to our requirement (</a:t>
+            </a:r>
+            <a:r>
+              <a:rPr lang="en-US" sz="1200" dirty="0">
+                <a:highlight>
+                  <a:srgbClr val="FFFF00"/>
+                </a:highlight>
+              </a:rPr>
+              <a:t>Create new QP</a:t>
+            </a:r>
+            <a:r>
+              <a:rPr lang="en-US" sz="1200" dirty="0"/>
+              <a:t>)     provide Name , provide Language , provide Parent: None</a:t>
+            </a:r>
+          </a:p>
+          <a:p>
+            <a:pPr marL="0" indent="0">
+              <a:buNone/>
+            </a:pPr>
+            <a:r>
+              <a:rPr lang="en-US" sz="1200" dirty="0"/>
+              <a:t>		-</a:t>
+            </a:r>
+            <a:r>
+              <a:rPr lang="en-US" sz="1100" u="sng" dirty="0"/>
+              <a:t>Explain  1 </a:t>
+            </a:r>
+            <a:r>
+              <a:rPr lang="en-US" sz="1100" dirty="0"/>
+              <a:t>: 0 bugs ,O vulnerability ,0 code smell RULES are activated ,  show activate /</a:t>
+            </a:r>
+            <a:r>
+              <a:rPr lang="en-US" sz="1100" dirty="0" err="1"/>
+              <a:t>Deac</a:t>
+            </a:r>
+            <a:r>
+              <a:rPr lang="en-US" sz="1100" dirty="0"/>
+              <a:t>, activate  all rule </a:t>
+            </a:r>
+            <a:r>
+              <a:rPr lang="en-US" sz="1100" dirty="0">
+                <a:highlight>
+                  <a:srgbClr val="FF0000"/>
+                </a:highlight>
+              </a:rPr>
+              <a:t>Bulk Changes ,</a:t>
+            </a:r>
+            <a:r>
+              <a:rPr lang="en-US" sz="1100" dirty="0"/>
+              <a:t>show      		                    QP in list </a:t>
+            </a:r>
+          </a:p>
+          <a:p>
+            <a:pPr marL="0" indent="0">
+              <a:buNone/>
+            </a:pPr>
+            <a:r>
+              <a:rPr lang="en-US" sz="1100" dirty="0"/>
+              <a:t>                                                                -</a:t>
+            </a:r>
+            <a:r>
+              <a:rPr lang="en-US" sz="1100" u="sng" dirty="0"/>
+              <a:t> Explain  2</a:t>
+            </a:r>
+            <a:r>
+              <a:rPr lang="en-US" sz="1100" dirty="0"/>
+              <a:t>: Now how to apply newly created QP ? </a:t>
+            </a:r>
+            <a:r>
+              <a:rPr lang="en-US" sz="1100" dirty="0">
+                <a:sym typeface="Wingdings" panose="05000000000000000000" pitchFamily="2" charset="2"/>
+              </a:rPr>
+              <a:t>(move inside project project </a:t>
+            </a:r>
+            <a:r>
+              <a:rPr lang="en-US" sz="1100" dirty="0" err="1">
+                <a:sym typeface="Wingdings" panose="05000000000000000000" pitchFamily="2" charset="2"/>
+              </a:rPr>
+              <a:t>settingQPselect</a:t>
+            </a:r>
+            <a:r>
+              <a:rPr lang="en-US" sz="1100" dirty="0">
+                <a:sym typeface="Wingdings" panose="05000000000000000000" pitchFamily="2" charset="2"/>
+              </a:rPr>
+              <a:t> </a:t>
+            </a:r>
+            <a:r>
+              <a:rPr lang="en-US" sz="1100" dirty="0" err="1">
+                <a:sym typeface="Wingdings" panose="05000000000000000000" pitchFamily="2" charset="2"/>
+              </a:rPr>
+              <a:t>languagechange</a:t>
+            </a:r>
+            <a:r>
+              <a:rPr lang="en-US" sz="1100" dirty="0">
+                <a:sym typeface="Wingdings" panose="05000000000000000000" pitchFamily="2" charset="2"/>
+              </a:rPr>
+              <a:t> profile       		                  Always use a specific Quality profile select yours </a:t>
+            </a:r>
+            <a:r>
+              <a:rPr lang="en-US" sz="1100" dirty="0">
+                <a:highlight>
+                  <a:srgbClr val="00FF00"/>
+                </a:highlight>
+                <a:sym typeface="Wingdings" panose="05000000000000000000" pitchFamily="2" charset="2"/>
+              </a:rPr>
+              <a:t>Explain Green pop QP Successfully updated</a:t>
+            </a:r>
+          </a:p>
+          <a:p>
+            <a:pPr marL="0" indent="0">
+              <a:buNone/>
+            </a:pPr>
+            <a:r>
+              <a:rPr lang="en-US" sz="1100" dirty="0">
+                <a:highlight>
+                  <a:srgbClr val="00FF00"/>
+                </a:highlight>
+                <a:sym typeface="Wingdings" panose="05000000000000000000" pitchFamily="2" charset="2"/>
+              </a:rPr>
+              <a:t>                         </a:t>
+            </a:r>
+          </a:p>
+          <a:p>
+            <a:pPr marL="0" indent="0">
+              <a:buNone/>
+            </a:pPr>
+            <a:r>
+              <a:rPr lang="en-US" sz="1200" dirty="0"/>
+              <a:t>		 -</a:t>
+            </a:r>
+            <a:r>
+              <a:rPr lang="en-US" sz="1200" u="sng" dirty="0"/>
+              <a:t> </a:t>
+            </a:r>
+            <a:r>
+              <a:rPr lang="en-US" sz="1100" u="sng" dirty="0"/>
+              <a:t>Explain 3 </a:t>
+            </a:r>
+            <a:r>
+              <a:rPr lang="en-US" sz="1200" dirty="0"/>
+              <a:t>: </a:t>
+            </a:r>
+            <a:r>
+              <a:rPr lang="en-US" sz="1100" dirty="0"/>
+              <a:t>so now whenever you do the new analysis </a:t>
+            </a:r>
+            <a:r>
+              <a:rPr lang="en-US" sz="1100" dirty="0">
+                <a:sym typeface="Wingdings" panose="05000000000000000000" pitchFamily="2" charset="2"/>
+              </a:rPr>
+              <a:t>new QP will be applied </a:t>
+            </a:r>
+            <a:r>
+              <a:rPr lang="en-US" sz="1200" dirty="0"/>
+              <a:t>        </a:t>
+            </a:r>
+          </a:p>
+          <a:p>
+            <a:r>
+              <a:rPr lang="en-US" sz="1200" dirty="0">
+                <a:highlight>
+                  <a:srgbClr val="FF0000"/>
+                </a:highlight>
+              </a:rPr>
+              <a:t> QG:</a:t>
+            </a:r>
+          </a:p>
+          <a:p>
+            <a:pPr marL="0" indent="0">
+              <a:buNone/>
+            </a:pPr>
+            <a:r>
+              <a:rPr lang="en-US" sz="1200" dirty="0"/>
+              <a:t>	1. What is QG</a:t>
+            </a:r>
+          </a:p>
+          <a:p>
+            <a:pPr marL="0" indent="0">
+              <a:buNone/>
+            </a:pPr>
+            <a:r>
+              <a:rPr lang="en-US" sz="1200" dirty="0"/>
+              <a:t>                       Ans: So in simple words QG is a minimum condition that a project must satisfy  for analysis  purpose(repeat)    </a:t>
+            </a:r>
+          </a:p>
+          <a:p>
+            <a:pPr marL="0" indent="0">
+              <a:buNone/>
+            </a:pPr>
+            <a:r>
+              <a:rPr lang="en-US" sz="1200" dirty="0"/>
+              <a:t>                               </a:t>
+            </a:r>
+            <a:r>
+              <a:rPr lang="en-US" sz="1200" dirty="0" err="1"/>
+              <a:t>eg</a:t>
+            </a:r>
+            <a:r>
+              <a:rPr lang="en-US" sz="1200" dirty="0"/>
+              <a:t> . On screen </a:t>
+            </a:r>
+            <a:r>
+              <a:rPr lang="en-US" sz="1200" dirty="0">
+                <a:sym typeface="Wingdings" panose="05000000000000000000" pitchFamily="2" charset="2"/>
+              </a:rPr>
+              <a:t> if duplicate lines greater then  3%    fail the analysis</a:t>
+            </a:r>
+          </a:p>
+          <a:p>
+            <a:pPr marL="0" indent="0">
+              <a:buNone/>
+            </a:pPr>
+            <a:r>
+              <a:rPr lang="en-US" sz="1200" dirty="0">
+                <a:sym typeface="Wingdings" panose="05000000000000000000" pitchFamily="2" charset="2"/>
+              </a:rPr>
+              <a:t>		     If Maintainability  rating is worse then A 3%    fail the analysis</a:t>
+            </a:r>
+          </a:p>
+          <a:p>
+            <a:pPr marL="0" indent="0">
+              <a:buNone/>
+            </a:pPr>
+            <a:r>
+              <a:rPr lang="en-US" sz="1200" dirty="0">
+                <a:sym typeface="Wingdings" panose="05000000000000000000" pitchFamily="2" charset="2"/>
+              </a:rPr>
+              <a:t>                                 - Until and unless  project respect  conditions   analysis will always be true</a:t>
+            </a:r>
+          </a:p>
+          <a:p>
+            <a:pPr marL="0" indent="0">
+              <a:buNone/>
+            </a:pPr>
+            <a:r>
+              <a:rPr lang="en-US" sz="1200" dirty="0">
+                <a:sym typeface="Wingdings" panose="05000000000000000000" pitchFamily="2" charset="2"/>
+              </a:rPr>
+              <a:t>                                 - To create new QG (create Name create)</a:t>
+            </a:r>
+          </a:p>
+          <a:p>
+            <a:pPr marL="0" indent="0">
+              <a:buNone/>
+            </a:pPr>
+            <a:r>
+              <a:rPr lang="en-US" sz="1200" dirty="0">
+                <a:sym typeface="Wingdings" panose="05000000000000000000" pitchFamily="2" charset="2"/>
+              </a:rPr>
+              <a:t>                                 -  QG &gt;inherits &gt; Condition (Add condition </a:t>
+            </a:r>
+            <a:r>
+              <a:rPr lang="en-US" sz="1200" dirty="0" err="1">
+                <a:sym typeface="Wingdings" panose="05000000000000000000" pitchFamily="2" charset="2"/>
+              </a:rPr>
+              <a:t>expln</a:t>
+            </a:r>
+            <a:r>
+              <a:rPr lang="en-US" sz="1200" dirty="0">
+                <a:sym typeface="Wingdings" panose="05000000000000000000" pitchFamily="2" charset="2"/>
+              </a:rPr>
+              <a:t> on new code ,</a:t>
+            </a:r>
+            <a:r>
+              <a:rPr lang="en-US" sz="1200" dirty="0" err="1">
+                <a:sym typeface="Wingdings" panose="05000000000000000000" pitchFamily="2" charset="2"/>
+              </a:rPr>
+              <a:t>expln</a:t>
+            </a:r>
+            <a:r>
+              <a:rPr lang="en-US" sz="1200" dirty="0">
+                <a:sym typeface="Wingdings" panose="05000000000000000000" pitchFamily="2" charset="2"/>
+              </a:rPr>
+              <a:t>  on overall code , QG fails when BUGS is greater then 	       10Add condition)</a:t>
+            </a:r>
+          </a:p>
+          <a:p>
+            <a:pPr marL="0" indent="0">
+              <a:buNone/>
+            </a:pPr>
+            <a:r>
+              <a:rPr lang="en-US" sz="1200" dirty="0">
+                <a:sym typeface="Wingdings" panose="05000000000000000000" pitchFamily="2" charset="2"/>
+              </a:rPr>
+              <a:t>                                  - Now QG is created to apply it(project setting  QG  select “Always use specific QG” save )</a:t>
+            </a:r>
+            <a:r>
+              <a:rPr lang="en-US" sz="1200" dirty="0">
+                <a:highlight>
+                  <a:srgbClr val="00FF00"/>
+                </a:highlight>
+                <a:sym typeface="Wingdings" panose="05000000000000000000" pitchFamily="2" charset="2"/>
+              </a:rPr>
+              <a:t> Explain Green pop </a:t>
+            </a:r>
+          </a:p>
+          <a:p>
+            <a:pPr marL="0" indent="0">
+              <a:buNone/>
+            </a:pPr>
+            <a:r>
+              <a:rPr lang="en-US" sz="1200" dirty="0">
+                <a:highlight>
+                  <a:srgbClr val="00FF00"/>
+                </a:highlight>
+                <a:sym typeface="Wingdings" panose="05000000000000000000" pitchFamily="2" charset="2"/>
+              </a:rPr>
+              <a:t>     =========================================    DO THE ANALYSIS  =================================================</a:t>
+            </a:r>
+          </a:p>
+          <a:p>
+            <a:pPr marL="0" indent="0">
+              <a:buNone/>
+            </a:pPr>
+            <a:endParaRPr lang="en-US" sz="1200" dirty="0"/>
+          </a:p>
+        </p:txBody>
+      </p:sp>
+    </p:spTree>
+    <p:extLst>
+      <p:ext uri="{BB962C8B-B14F-4D97-AF65-F5344CB8AC3E}">
+        <p14:creationId xmlns:p14="http://schemas.microsoft.com/office/powerpoint/2010/main" val="369015027"/>
+      </p:ext>
+    </p:extLst>
+  </p:cSld>
+  <p:clrMapOvr>
+    <a:masterClrMapping/>
+  </p:clrMapOvr>
+</p:sld>
+</file>
+
+<file path=ppt/slides/slide15.xml><?xml version="1.0" encoding="utf-8"?>
+<p:sld xmlns:a="http://schemas.openxmlformats.org/drawingml/2006/main" xmlns:r="http://schemas.openxmlformats.org/officeDocument/2006/relationships" xmlns:p="http://schemas.openxmlformats.org/presentationml/2006/main">
+  <p:cSld>
+    <p:spTree>
+      <p:nvGrpSpPr>
+        <p:cNvPr id="1" name=""/>
+        <p:cNvGrpSpPr/>
+        <p:nvPr/>
+      </p:nvGrpSpPr>
+      <p:grpSpPr>
+        <a:xfrm>
+          <a:off x="0" y="0"/>
+          <a:ext cx="0" cy="0"/>
+          <a:chOff x="0" y="0"/>
+          <a:chExt cx="0" cy="0"/>
+        </a:xfrm>
+      </p:grpSpPr>
+      <p:sp>
+        <p:nvSpPr>
+          <p:cNvPr id="3" name="Content Placeholder 2">
+            <a:extLst>
+              <a:ext uri="{FF2B5EF4-FFF2-40B4-BE49-F238E27FC236}">
+                <a16:creationId xmlns:a16="http://schemas.microsoft.com/office/drawing/2014/main" id="{65D1E27C-6424-0282-020F-9ACDADF8796C}"/>
+              </a:ext>
+            </a:extLst>
+          </p:cNvPr>
+          <p:cNvSpPr>
+            <a:spLocks noGrp="1"/>
+          </p:cNvSpPr>
+          <p:nvPr>
+            <p:ph idx="1"/>
+          </p:nvPr>
+        </p:nvSpPr>
+        <p:spPr>
+          <a:xfrm>
+            <a:off x="304800" y="543720"/>
+            <a:ext cx="9250680" cy="4511786"/>
+          </a:xfrm>
+        </p:spPr>
+        <p:txBody>
+          <a:bodyPr/>
+          <a:lstStyle/>
+          <a:p>
+            <a:r>
+              <a:rPr lang="en-US" sz="1200" dirty="0"/>
+              <a:t>Exclusion files(Admin </a:t>
+            </a:r>
+            <a:r>
+              <a:rPr lang="en-US" sz="1200" dirty="0">
+                <a:sym typeface="Wingdings" panose="05000000000000000000" pitchFamily="2" charset="2"/>
+              </a:rPr>
+              <a:t>analysis scope)</a:t>
+            </a:r>
+            <a:r>
+              <a:rPr lang="en-US" sz="1200" dirty="0"/>
+              <a:t> </a:t>
+            </a:r>
+            <a:r>
+              <a:rPr lang="en-US" sz="1200" dirty="0">
+                <a:sym typeface="Wingdings" panose="05000000000000000000" pitchFamily="2" charset="2"/>
+              </a:rPr>
+              <a:t> 1</a:t>
+            </a:r>
+            <a:r>
+              <a:rPr lang="en-US" sz="1200" baseline="30000" dirty="0">
+                <a:sym typeface="Wingdings" panose="05000000000000000000" pitchFamily="2" charset="2"/>
+              </a:rPr>
+              <a:t>st</a:t>
+            </a:r>
+            <a:r>
+              <a:rPr lang="en-US" sz="1200" dirty="0">
+                <a:sym typeface="Wingdings" panose="05000000000000000000" pitchFamily="2" charset="2"/>
+              </a:rPr>
+              <a:t> imp features</a:t>
+            </a:r>
+          </a:p>
+          <a:p>
+            <a:r>
+              <a:rPr lang="en-US" sz="1200" dirty="0"/>
+              <a:t>Creating users /group (Admin </a:t>
+            </a:r>
+            <a:r>
+              <a:rPr lang="en-US" sz="1200" dirty="0">
+                <a:sym typeface="Wingdings" panose="05000000000000000000" pitchFamily="2" charset="2"/>
+              </a:rPr>
+              <a:t>security users/group) 2</a:t>
+            </a:r>
+            <a:r>
+              <a:rPr lang="en-US" sz="1200" baseline="30000" dirty="0">
+                <a:sym typeface="Wingdings" panose="05000000000000000000" pitchFamily="2" charset="2"/>
+              </a:rPr>
+              <a:t>nd</a:t>
+            </a:r>
+            <a:r>
+              <a:rPr lang="en-US" sz="1200" dirty="0">
+                <a:sym typeface="Wingdings" panose="05000000000000000000" pitchFamily="2" charset="2"/>
+              </a:rPr>
+              <a:t>  imp features</a:t>
+            </a:r>
+          </a:p>
+          <a:p>
+            <a:r>
+              <a:rPr lang="en-US" sz="1200" dirty="0">
+                <a:sym typeface="Wingdings" panose="05000000000000000000" pitchFamily="2" charset="2"/>
+              </a:rPr>
+              <a:t>Global Permissions Use for giving different permission to Groups collectively or users individually  3rd  imp features</a:t>
+            </a:r>
+          </a:p>
+          <a:p>
+            <a:endParaRPr lang="en-US" sz="1200" dirty="0">
+              <a:sym typeface="Wingdings" panose="05000000000000000000" pitchFamily="2" charset="2"/>
+            </a:endParaRPr>
+          </a:p>
+          <a:p>
+            <a:pPr marL="0" indent="0">
+              <a:buNone/>
+            </a:pPr>
+            <a:r>
+              <a:rPr lang="en-US" sz="1200" dirty="0">
+                <a:sym typeface="Wingdings" panose="05000000000000000000" pitchFamily="2" charset="2"/>
+              </a:rPr>
+              <a:t>=========================================Code Coverage===================================================</a:t>
+            </a:r>
+          </a:p>
+          <a:p>
+            <a:pPr marL="0" indent="0">
+              <a:buNone/>
+            </a:pPr>
+            <a:r>
+              <a:rPr lang="en-US" sz="1200" dirty="0">
+                <a:highlight>
+                  <a:srgbClr val="FF0000"/>
+                </a:highlight>
+                <a:sym typeface="Wingdings" panose="05000000000000000000" pitchFamily="2" charset="2"/>
+              </a:rPr>
+              <a:t>Code Coverage : </a:t>
+            </a:r>
+            <a:r>
+              <a:rPr lang="en-US" sz="1200" dirty="0">
+                <a:sym typeface="Wingdings" panose="05000000000000000000" pitchFamily="2" charset="2"/>
+              </a:rPr>
+              <a:t>      seen this parameters    project should have  Test cases  for CC  </a:t>
+            </a:r>
+            <a:r>
+              <a:rPr lang="en-US" sz="1200" u="sng" dirty="0">
+                <a:sym typeface="Wingdings" panose="05000000000000000000" pitchFamily="2" charset="2"/>
+              </a:rPr>
+              <a:t>Define </a:t>
+            </a:r>
+            <a:r>
+              <a:rPr lang="en-US" sz="1200" dirty="0">
+                <a:sym typeface="Wingdings" panose="05000000000000000000" pitchFamily="2" charset="2"/>
+              </a:rPr>
+              <a:t>: “it calculates up to what extent  a particular project test cases has covered the project in %”  </a:t>
+            </a:r>
+            <a:endParaRPr lang="en-US" sz="1200" dirty="0"/>
+          </a:p>
+        </p:txBody>
+      </p:sp>
+    </p:spTree>
+    <p:extLst>
+      <p:ext uri="{BB962C8B-B14F-4D97-AF65-F5344CB8AC3E}">
+        <p14:creationId xmlns:p14="http://schemas.microsoft.com/office/powerpoint/2010/main" val="2294787158"/>
+      </p:ext>
+    </p:extLst>
+  </p:cSld>
+  <p:clrMapOvr>
+    <a:masterClrMapping/>
+  </p:clrMapOvr>
+</p:sld>
+</file>
+
+<file path=ppt/slides/slide16.xml><?xml version="1.0" encoding="utf-8"?>
+<p:sld xmlns:a="http://schemas.openxmlformats.org/drawingml/2006/main" xmlns:r="http://schemas.openxmlformats.org/officeDocument/2006/relationships" xmlns:p="http://schemas.openxmlformats.org/presentationml/2006/main">
+  <p:cSld>
+    <p:spTree>
+      <p:nvGrpSpPr>
+        <p:cNvPr id="1" name=""/>
+        <p:cNvGrpSpPr/>
+        <p:nvPr/>
+      </p:nvGrpSpPr>
+      <p:grpSpPr>
+        <a:xfrm>
+          <a:off x="0" y="0"/>
+          <a:ext cx="0" cy="0"/>
+          <a:chOff x="0" y="0"/>
+          <a:chExt cx="0" cy="0"/>
+        </a:xfrm>
+      </p:grpSpPr>
+      <p:sp>
+        <p:nvSpPr>
+          <p:cNvPr id="2" name="Rectangle 1"/>
+          <p:cNvSpPr/>
+          <p:nvPr/>
+        </p:nvSpPr>
+        <p:spPr>
+          <a:xfrm>
+            <a:off x="0" y="735013"/>
+            <a:ext cx="675278" cy="265906"/>
+          </a:xfrm>
+          <a:prstGeom prst="rect">
+            <a:avLst/>
+          </a:prstGeom>
+          <a:solidFill>
+            <a:srgbClr val="00B8F1"/>
+          </a:solidFill>
+          <a:ln>
+            <a:noFill/>
+          </a:ln>
+        </p:spPr>
+        <p:style>
+          <a:lnRef idx="2">
+            <a:schemeClr val="accent1">
+              <a:shade val="50000"/>
+            </a:schemeClr>
+          </a:lnRef>
+          <a:fillRef idx="1">
+            <a:schemeClr val="accent1"/>
+          </a:fillRef>
+          <a:effectRef idx="0">
+            <a:schemeClr val="accent1"/>
+          </a:effectRef>
+          <a:fontRef idx="minor">
+            <a:schemeClr val="lt1"/>
+          </a:fontRef>
+        </p:style>
+        <p:txBody>
+          <a:bodyPr rtlCol="0" anchor="ctr"/>
+          <a:lstStyle/>
+          <a:p>
+            <a:pPr algn="ctr"/>
+            <a:endParaRPr lang="en-US"/>
+          </a:p>
+        </p:txBody>
+      </p:sp>
+      <p:sp>
+        <p:nvSpPr>
+          <p:cNvPr id="3" name="Content Placeholder 2"/>
+          <p:cNvSpPr txBox="1">
+            <a:spLocks/>
+          </p:cNvSpPr>
+          <p:nvPr/>
+        </p:nvSpPr>
+        <p:spPr>
+          <a:xfrm>
+            <a:off x="675278" y="696119"/>
+            <a:ext cx="4049122" cy="457200"/>
+          </a:xfrm>
+          <a:prstGeom prst="rect">
+            <a:avLst/>
+          </a:prstGeom>
+        </p:spPr>
+        <p:txBody>
+          <a:bodyPr lIns="100557" tIns="50278" rIns="100557" bIns="50278"/>
+          <a:lstStyle>
+            <a:lvl1pPr marL="377087" indent="-377087" algn="l" defTabSz="1005566" rtl="0" eaLnBrk="1" latinLnBrk="0" hangingPunct="1">
+              <a:spcBef>
+                <a:spcPct val="20000"/>
+              </a:spcBef>
+              <a:buFont typeface="Arial" panose="020B0604020202020204" pitchFamily="34" charset="0"/>
+              <a:buChar char="•"/>
+              <a:defRPr sz="3500" kern="1200">
+                <a:solidFill>
+                  <a:schemeClr val="tx1"/>
+                </a:solidFill>
+                <a:latin typeface="+mn-lt"/>
+                <a:ea typeface="+mn-ea"/>
+                <a:cs typeface="+mn-cs"/>
+              </a:defRPr>
+            </a:lvl1pPr>
+            <a:lvl2pPr marL="817022" indent="-314239" algn="l" defTabSz="1005566" rtl="0" eaLnBrk="1" latinLnBrk="0" hangingPunct="1">
+              <a:spcBef>
+                <a:spcPct val="20000"/>
+              </a:spcBef>
+              <a:buFont typeface="Arial" panose="020B0604020202020204" pitchFamily="34" charset="0"/>
+              <a:buChar char="–"/>
+              <a:defRPr sz="3100" kern="1200">
+                <a:solidFill>
+                  <a:schemeClr val="tx1"/>
+                </a:solidFill>
+                <a:latin typeface="+mn-lt"/>
+                <a:ea typeface="+mn-ea"/>
+                <a:cs typeface="+mn-cs"/>
+              </a:defRPr>
+            </a:lvl2pPr>
+            <a:lvl3pPr marL="1256957" indent="-251391" algn="l" defTabSz="1005566" rtl="0" eaLnBrk="1" latinLnBrk="0" hangingPunct="1">
+              <a:spcBef>
+                <a:spcPct val="20000"/>
+              </a:spcBef>
+              <a:buFont typeface="Arial" panose="020B0604020202020204" pitchFamily="34" charset="0"/>
+              <a:buChar char="•"/>
+              <a:defRPr sz="2600" kern="1200">
+                <a:solidFill>
+                  <a:schemeClr val="tx1"/>
+                </a:solidFill>
+                <a:latin typeface="+mn-lt"/>
+                <a:ea typeface="+mn-ea"/>
+                <a:cs typeface="+mn-cs"/>
+              </a:defRPr>
+            </a:lvl3pPr>
+            <a:lvl4pPr marL="1759740" indent="-251391" algn="l" defTabSz="1005566" rtl="0" eaLnBrk="1" latinLnBrk="0" hangingPunct="1">
+              <a:spcBef>
+                <a:spcPct val="20000"/>
+              </a:spcBef>
+              <a:buFont typeface="Arial" panose="020B0604020202020204" pitchFamily="34" charset="0"/>
+              <a:buChar char="–"/>
+              <a:defRPr sz="2200" kern="1200">
+                <a:solidFill>
+                  <a:schemeClr val="tx1"/>
+                </a:solidFill>
+                <a:latin typeface="+mn-lt"/>
+                <a:ea typeface="+mn-ea"/>
+                <a:cs typeface="+mn-cs"/>
+              </a:defRPr>
+            </a:lvl4pPr>
+            <a:lvl5pPr marL="2262523" indent="-251391" algn="l" defTabSz="1005566" rtl="0" eaLnBrk="1" latinLnBrk="0" hangingPunct="1">
+              <a:spcBef>
+                <a:spcPct val="20000"/>
+              </a:spcBef>
+              <a:buFont typeface="Arial" panose="020B0604020202020204" pitchFamily="34" charset="0"/>
+              <a:buChar char="»"/>
+              <a:defRPr sz="2200" kern="1200">
+                <a:solidFill>
+                  <a:schemeClr val="tx1"/>
+                </a:solidFill>
+                <a:latin typeface="+mn-lt"/>
+                <a:ea typeface="+mn-ea"/>
+                <a:cs typeface="+mn-cs"/>
+              </a:defRPr>
+            </a:lvl5pPr>
+            <a:lvl6pPr marL="2765306" indent="-251391" algn="l" defTabSz="1005566" rtl="0" eaLnBrk="1" latinLnBrk="0" hangingPunct="1">
+              <a:spcBef>
+                <a:spcPct val="20000"/>
+              </a:spcBef>
+              <a:buFont typeface="Arial" panose="020B0604020202020204" pitchFamily="34" charset="0"/>
+              <a:buChar char="•"/>
+              <a:defRPr sz="2200" kern="1200">
+                <a:solidFill>
+                  <a:schemeClr val="tx1"/>
+                </a:solidFill>
+                <a:latin typeface="+mn-lt"/>
+                <a:ea typeface="+mn-ea"/>
+                <a:cs typeface="+mn-cs"/>
+              </a:defRPr>
+            </a:lvl6pPr>
+            <a:lvl7pPr marL="3268088" indent="-251391" algn="l" defTabSz="1005566" rtl="0" eaLnBrk="1" latinLnBrk="0" hangingPunct="1">
+              <a:spcBef>
+                <a:spcPct val="20000"/>
+              </a:spcBef>
+              <a:buFont typeface="Arial" panose="020B0604020202020204" pitchFamily="34" charset="0"/>
+              <a:buChar char="•"/>
+              <a:defRPr sz="2200" kern="1200">
+                <a:solidFill>
+                  <a:schemeClr val="tx1"/>
+                </a:solidFill>
+                <a:latin typeface="+mn-lt"/>
+                <a:ea typeface="+mn-ea"/>
+                <a:cs typeface="+mn-cs"/>
+              </a:defRPr>
+            </a:lvl7pPr>
+            <a:lvl8pPr marL="3770871" indent="-251391" algn="l" defTabSz="1005566" rtl="0" eaLnBrk="1" latinLnBrk="0" hangingPunct="1">
+              <a:spcBef>
+                <a:spcPct val="20000"/>
+              </a:spcBef>
+              <a:buFont typeface="Arial" panose="020B0604020202020204" pitchFamily="34" charset="0"/>
+              <a:buChar char="•"/>
+              <a:defRPr sz="2200" kern="1200">
+                <a:solidFill>
+                  <a:schemeClr val="tx1"/>
+                </a:solidFill>
+                <a:latin typeface="+mn-lt"/>
+                <a:ea typeface="+mn-ea"/>
+                <a:cs typeface="+mn-cs"/>
+              </a:defRPr>
+            </a:lvl8pPr>
+            <a:lvl9pPr marL="4273654" indent="-251391" algn="l" defTabSz="1005566" rtl="0" eaLnBrk="1" latinLnBrk="0" hangingPunct="1">
+              <a:spcBef>
+                <a:spcPct val="20000"/>
+              </a:spcBef>
+              <a:buFont typeface="Arial" panose="020B0604020202020204" pitchFamily="34" charset="0"/>
+              <a:buChar char="•"/>
+              <a:defRPr sz="2200" kern="1200">
+                <a:solidFill>
+                  <a:schemeClr val="tx1"/>
+                </a:solidFill>
+                <a:latin typeface="+mn-lt"/>
+                <a:ea typeface="+mn-ea"/>
+                <a:cs typeface="+mn-cs"/>
+              </a:defRPr>
+            </a:lvl9pPr>
+          </a:lstStyle>
+          <a:p>
+            <a:pPr marL="0" indent="0">
+              <a:buNone/>
+            </a:pPr>
+            <a:r>
               <a:rPr lang="en-US" sz="1800" b="1" dirty="0" err="1">
                 <a:solidFill>
                   <a:srgbClr val="2B3B4B"/>
@@ -8352,44 +10263,44 @@
           <p:nvPr>
             <p:extLst>
               <p:ext uri="{D42A27DB-BD31-4B8C-83A1-F6EECF244321}">
-                <p14:modId xmlns:p14="http://schemas.microsoft.com/office/powerpoint/2010/main" val="3402181298"/>
+                <p14:modId xmlns:p14="http://schemas.microsoft.com/office/powerpoint/2010/main" val="1945390073"/>
               </p:ext>
             </p:extLst>
           </p:nvPr>
         </p:nvGraphicFramePr>
         <p:xfrm>
-          <a:off x="762000" y="1168559"/>
-          <a:ext cx="7620000" cy="3197238"/>
+          <a:off x="1066800" y="1156018"/>
+          <a:ext cx="8153400" cy="3197238"/>
         </p:xfrm>
         <a:graphic>
           <a:graphicData uri="http://schemas.openxmlformats.org/drawingml/2006/table">
             <a:tbl>
               <a:tblPr firstRow="1" firstCol="1" bandRow="1">
-                <a:tableStyleId>{69012ECD-51FC-41F1-AA8D-1B2483CD663E}</a:tableStyleId>
+                <a:tableStyleId>{7E9639D4-E3E2-4D34-9284-5A2195B3D0D7}</a:tableStyleId>
               </a:tblPr>
               <a:tblGrid>
-                <a:gridCol w="1905000">
+                <a:gridCol w="2038350">
                   <a:extLst>
                     <a:ext uri="{9D8B030D-6E8A-4147-A177-3AD203B41FA5}">
                       <a16:colId xmlns:a16="http://schemas.microsoft.com/office/drawing/2014/main" val="20000"/>
                     </a:ext>
                   </a:extLst>
                 </a:gridCol>
-                <a:gridCol w="1905000">
+                <a:gridCol w="2038350">
                   <a:extLst>
                     <a:ext uri="{9D8B030D-6E8A-4147-A177-3AD203B41FA5}">
                       <a16:colId xmlns:a16="http://schemas.microsoft.com/office/drawing/2014/main" val="20001"/>
                     </a:ext>
                   </a:extLst>
                 </a:gridCol>
-                <a:gridCol w="1905000">
+                <a:gridCol w="2038350">
                   <a:extLst>
                     <a:ext uri="{9D8B030D-6E8A-4147-A177-3AD203B41FA5}">
                       <a16:colId xmlns:a16="http://schemas.microsoft.com/office/drawing/2014/main" val="20002"/>
                     </a:ext>
                   </a:extLst>
                 </a:gridCol>
-                <a:gridCol w="1905000">
+                <a:gridCol w="2038350">
                   <a:extLst>
                     <a:ext uri="{9D8B030D-6E8A-4147-A177-3AD203B41FA5}">
                       <a16:colId xmlns:a16="http://schemas.microsoft.com/office/drawing/2014/main" val="20003"/>
@@ -9482,7 +11393,7 @@
 </p:sld>
 </file>
 
-<file path=ppt/slides/slide12.xml><?xml version="1.0" encoding="utf-8"?>
+<file path=ppt/slides/slide17.xml><?xml version="1.0" encoding="utf-8"?>
 <p:sld xmlns:a="http://schemas.openxmlformats.org/drawingml/2006/main" xmlns:r="http://schemas.openxmlformats.org/officeDocument/2006/relationships" xmlns:p="http://schemas.openxmlformats.org/presentationml/2006/main">
   <p:cSld>
     <p:spTree>
@@ -9794,7 +11705,7 @@
 </p:sld>
 </file>
 
-<file path=ppt/slides/slide13.xml><?xml version="1.0" encoding="utf-8"?>
+<file path=ppt/slides/slide18.xml><?xml version="1.0" encoding="utf-8"?>
 <p:sld xmlns:a="http://schemas.openxmlformats.org/drawingml/2006/main" xmlns:r="http://schemas.openxmlformats.org/officeDocument/2006/relationships" xmlns:p="http://schemas.openxmlformats.org/presentationml/2006/main">
   <p:cSld>
     <p:spTree>
@@ -9865,7 +11776,7 @@
 </p:sld>
 </file>
 
-<file path=ppt/slides/slide14.xml><?xml version="1.0" encoding="utf-8"?>
+<file path=ppt/slides/slide19.xml><?xml version="1.0" encoding="utf-8"?>
 <p:sld xmlns:a="http://schemas.openxmlformats.org/drawingml/2006/main" xmlns:r="http://schemas.openxmlformats.org/officeDocument/2006/relationships" xmlns:p="http://schemas.openxmlformats.org/presentationml/2006/main">
   <p:cSld>
     <p:spTree>
@@ -10969,7 +12880,7 @@
             </a:r>
             <a:r>
               <a:rPr lang="en-US" sz="1200" i="1" u="sng" dirty="0"/>
-              <a:t>we will also see its architecture in detail</a:t>
+              <a:t>we will also see its architecture in detail using image</a:t>
             </a:r>
           </a:p>
           <a:p>
@@ -11454,7 +13365,20 @@
               <a:rPr lang="en-US" sz="1000" i="1" u="sng" dirty="0">
                 <a:cs typeface="Segoe UI" panose="020B0502040204020203" pitchFamily="34" charset="0"/>
               </a:rPr>
-              <a:t>as we have discusses above problem , using some Microsoft  rules  coding standards are defined </a:t>
+              <a:t>as we have discusses above problem , using some SQ  rules</a:t>
+            </a:r>
+            <a:r>
+              <a:rPr lang="en-US" sz="1000" i="1" u="sng" dirty="0">
+                <a:cs typeface="Segoe UI" panose="020B0502040204020203" pitchFamily="34" charset="0"/>
+                <a:sym typeface="Wingdings" panose="05000000000000000000" pitchFamily="2" charset="2"/>
+              </a:rPr>
+              <a:t></a:t>
+            </a:r>
+            <a:r>
+              <a:rPr lang="en-US" sz="1000" i="1" u="sng" dirty="0">
+                <a:cs typeface="Segoe UI" panose="020B0502040204020203" pitchFamily="34" charset="0"/>
+              </a:rPr>
+              <a:t>  coding standards are defined </a:t>
             </a:r>
             <a:r>
               <a:rPr lang="en-US" sz="1000" i="1" u="sng" dirty="0">
@@ -12216,7 +14140,7 @@
         <p:spPr>
           <a:xfrm>
             <a:off x="76200" y="1610519"/>
-            <a:ext cx="9982200" cy="2962349"/>
+            <a:ext cx="9982200" cy="3147015"/>
           </a:xfrm>
           <a:prstGeom prst="rect">
             <a:avLst/>
@@ -12259,7 +14183,7 @@
             </a:r>
             <a:r>
               <a:rPr lang="en-US" sz="1200" i="1" u="sng" dirty="0"/>
-              <a:t>self  </a:t>
+              <a:t>upcoming time  </a:t>
             </a:r>
           </a:p>
           <a:p>
@@ -12276,7 +14200,7 @@
             </a:r>
             <a:r>
               <a:rPr lang="en-US" sz="1100" i="1" u="sng" dirty="0"/>
-              <a:t>First  modules will be scanned  </a:t>
+              <a:t>First top  modules will be scanned  </a:t>
             </a:r>
             <a:r>
               <a:rPr lang="en-US" sz="1100" i="1" u="sng" dirty="0">
@@ -12306,13 +14230,21 @@
             </a:pPr>
             <a:r>
               <a:rPr lang="en-US" dirty="0"/>
-              <a:t>Latest version is SonarQube 9.9</a:t>
+              <a:t>Latest version is SonarQube 10.3</a:t>
             </a:r>
           </a:p>
           <a:p>
             <a:r>
               <a:rPr lang="en-US" dirty="0"/>
-              <a:t>      But always recommended to use Long term support version(currently 8.9) </a:t>
+              <a:t>      But always recommended to use Long term support version(</a:t>
+            </a:r>
+            <a:r>
+              <a:rPr lang="en-US"/>
+              <a:t>currently 9.9/8.9</a:t>
+            </a:r>
+            <a:r>
+              <a:rPr lang="en-US" dirty="0"/>
+              <a:t>) </a:t>
             </a:r>
             <a:r>
               <a:rPr lang="en-US" sz="1200" i="1" u="sng" dirty="0"/>
@@ -12896,8 +14828,8 @@
         </p:nvSpPr>
         <p:spPr>
           <a:xfrm>
-            <a:off x="228600" y="467520"/>
-            <a:ext cx="9326880" cy="4587986"/>
+            <a:off x="228600" y="467519"/>
+            <a:ext cx="9448800" cy="5191919"/>
           </a:xfrm>
         </p:spPr>
         <p:txBody>
@@ -12924,7 +14856,13 @@
             </a:r>
             <a:r>
               <a:rPr lang="en-US" sz="1100" dirty="0"/>
-              <a:t>-  </a:t>
+              <a:t>–</a:t>
+            </a:r>
+          </a:p>
+          <a:p>
+            <a:r>
+              <a:rPr lang="en-US" sz="1100" dirty="0"/>
+              <a:t>  </a:t>
             </a:r>
             <a:r>
               <a:rPr lang="en-US" sz="1100" b="1" dirty="0"/>
@@ -12946,19 +14884,18 @@
               <a:rPr lang="en-US" sz="1100" dirty="0">
                 <a:sym typeface="Wingdings" panose="05000000000000000000" pitchFamily="2" charset="2"/>
               </a:rPr>
-              <a:t> </a:t>
-            </a:r>
-            <a:r>
-              <a:rPr lang="en-US" sz="1100" dirty="0" err="1">
-                <a:sym typeface="Wingdings" panose="05000000000000000000" pitchFamily="2" charset="2"/>
-              </a:rPr>
-              <a:t>UtiliesForAll</a:t>
-            </a:r>
+              <a:t> Utilities For All Java   Open JSK 11.0 )    </a:t>
+            </a:r>
+          </a:p>
+          <a:p>
+            <a:pPr marL="0" indent="0">
+              <a:buNone/>
+            </a:pPr>
             <a:r>
               <a:rPr lang="en-US" sz="1100" dirty="0">
                 <a:sym typeface="Wingdings" panose="05000000000000000000" pitchFamily="2" charset="2"/>
               </a:rPr>
-              <a:t> Java   Open JSK 11.0 )    </a:t>
+              <a:t>             Download it  extract it </a:t>
             </a:r>
           </a:p>
           <a:p>
@@ -12969,218 +14906,8 @@
               <a:rPr lang="en-US" sz="1100" dirty="0">
                 <a:sym typeface="Wingdings" panose="05000000000000000000" pitchFamily="2" charset="2"/>
               </a:rPr>
-              <a:t>             Download it  </a:t>
-            </a:r>
-          </a:p>
-          <a:p>
-            <a:pPr marL="0" indent="0">
-              <a:buNone/>
-            </a:pPr>
-            <a:r>
-              <a:rPr lang="en-US" sz="1100" dirty="0">
-                <a:sym typeface="Wingdings" panose="05000000000000000000" pitchFamily="2" charset="2"/>
-              </a:rPr>
-              <a:t>              extract it  </a:t>
-            </a:r>
-          </a:p>
-          <a:p>
-            <a:pPr marL="0" indent="0">
-              <a:buNone/>
-            </a:pPr>
-            <a:r>
-              <a:rPr lang="en-US" sz="1100" dirty="0">
-                <a:sym typeface="Wingdings" panose="05000000000000000000" pitchFamily="2" charset="2"/>
-              </a:rPr>
-              <a:t>             set env variable </a:t>
-            </a:r>
-            <a:endParaRPr lang="en-US" sz="1100" dirty="0"/>
-          </a:p>
-          <a:p>
-            <a:r>
-              <a:rPr lang="en-US" sz="1100" dirty="0"/>
-              <a:t>SonarQube download</a:t>
-            </a:r>
-          </a:p>
-          <a:p>
-            <a:r>
-              <a:rPr lang="en-US" sz="1100" dirty="0"/>
-              <a:t>SonarQube docx </a:t>
-            </a:r>
-          </a:p>
-          <a:p>
-            <a:r>
-              <a:rPr lang="en-US" sz="1100" dirty="0"/>
-              <a:t>Already Downloaded </a:t>
-            </a:r>
-            <a:r>
-              <a:rPr lang="en-US" sz="1100" dirty="0">
-                <a:sym typeface="Wingdings" panose="05000000000000000000" pitchFamily="2" charset="2"/>
-              </a:rPr>
-              <a:t> create a proper folder structure  extract it   we can start server Now</a:t>
-            </a:r>
-          </a:p>
-          <a:p>
-            <a:pPr marL="0" indent="0" algn="ctr">
-              <a:buNone/>
-            </a:pPr>
-            <a:r>
-              <a:rPr lang="en-US" sz="1100" dirty="0">
-                <a:sym typeface="Wingdings" panose="05000000000000000000" pitchFamily="2" charset="2"/>
-              </a:rPr>
-              <a:t>                              </a:t>
-            </a:r>
-            <a:r>
-              <a:rPr lang="en-US" sz="1100" b="1" u="sng" dirty="0">
-                <a:sym typeface="Wingdings" panose="05000000000000000000" pitchFamily="2" charset="2"/>
-              </a:rPr>
-              <a:t>NOW BEFORE STARTING THE SERVER  LETS SEE THE REQUIRTEMENT OF SERVER </a:t>
-            </a:r>
-          </a:p>
-          <a:p>
-            <a:r>
-              <a:rPr lang="en-US" sz="1100" dirty="0"/>
-              <a:t>Firstly we will have to create new SQL DB   (</a:t>
-            </a:r>
-            <a:r>
-              <a:rPr lang="en-US" sz="1100" i="1" u="sng" dirty="0">
-                <a:highlight>
-                  <a:srgbClr val="FFFF00"/>
-                </a:highlight>
-              </a:rPr>
-              <a:t>show in image</a:t>
-            </a:r>
-            <a:r>
-              <a:rPr lang="en-US" sz="1100" dirty="0"/>
-              <a:t>)</a:t>
-            </a:r>
-            <a:r>
-              <a:rPr lang="en-US" sz="1100" dirty="0">
-                <a:sym typeface="Wingdings" panose="05000000000000000000" pitchFamily="2" charset="2"/>
-              </a:rPr>
-              <a:t>  so open MS SQL Server  right click database New Database  DB name ,  options   collation  SQL_Latin1_General_CP1_CS_AS (Value required to start the SQ)</a:t>
-            </a:r>
-          </a:p>
-          <a:p>
-            <a:r>
-              <a:rPr lang="en-US" sz="1100" dirty="0">
-                <a:sym typeface="Wingdings" panose="05000000000000000000" pitchFamily="2" charset="2"/>
-              </a:rPr>
-              <a:t>Now we have created DB  ,  So the  question  is  that where  we  have  to  configure   this DB  Information  ?   open (conf </a:t>
-            </a:r>
-            <a:r>
-              <a:rPr lang="en-US" sz="1100" dirty="0" err="1">
-                <a:sym typeface="Wingdings" panose="05000000000000000000" pitchFamily="2" charset="2"/>
-              </a:rPr>
-              <a:t>Sonar.properties</a:t>
-            </a:r>
-            <a:r>
-              <a:rPr lang="en-US" sz="1100" dirty="0">
-                <a:sym typeface="Wingdings" panose="05000000000000000000" pitchFamily="2" charset="2"/>
-              </a:rPr>
-              <a:t> files)</a:t>
-            </a:r>
-          </a:p>
-          <a:p>
-            <a:pPr marL="0" indent="0">
-              <a:buNone/>
-            </a:pPr>
-            <a:r>
-              <a:rPr lang="en-US" sz="1100" b="1" dirty="0">
-                <a:sym typeface="Wingdings" panose="05000000000000000000" pitchFamily="2" charset="2"/>
-              </a:rPr>
-              <a:t>	 	26  user name </a:t>
-            </a:r>
-          </a:p>
-          <a:p>
-            <a:pPr marL="0" indent="0">
-              <a:buNone/>
-            </a:pPr>
-            <a:r>
-              <a:rPr lang="en-US" sz="1100" b="1" dirty="0">
-                <a:sym typeface="Wingdings" panose="05000000000000000000" pitchFamily="2" charset="2"/>
-              </a:rPr>
-              <a:t>		27  Password </a:t>
-            </a:r>
-          </a:p>
-          <a:p>
-            <a:pPr marL="0" indent="0">
-              <a:buNone/>
-            </a:pPr>
-            <a:r>
-              <a:rPr lang="en-US" sz="1100" b="1" dirty="0">
-                <a:sym typeface="Wingdings" panose="05000000000000000000" pitchFamily="2" charset="2"/>
-              </a:rPr>
-              <a:t>		58 Database name</a:t>
-            </a:r>
-          </a:p>
-          <a:p>
-            <a:pPr marL="0" indent="0">
-              <a:buNone/>
-            </a:pPr>
-            <a:r>
-              <a:rPr lang="en-US" sz="1100" b="1" dirty="0">
-                <a:sym typeface="Wingdings" panose="05000000000000000000" pitchFamily="2" charset="2"/>
-              </a:rPr>
-              <a:t>		111 Port :</a:t>
-            </a:r>
-            <a:r>
-              <a:rPr lang="en-US" sz="1100" u="sng" dirty="0">
-                <a:sym typeface="Wingdings" panose="05000000000000000000" pitchFamily="2" charset="2"/>
-              </a:rPr>
-              <a:t> Port means what , it the  location  where  our  Server  is  going  to  launch , or we can also define it as it is the location where  our  OS system will  listen  different  request   DEMO</a:t>
-            </a:r>
-          </a:p>
-          <a:p>
-            <a:pPr marL="0" indent="0">
-              <a:buNone/>
-            </a:pPr>
-            <a:endParaRPr lang="en-US" sz="1100" u="sng" dirty="0">
-              <a:sym typeface="Wingdings" panose="05000000000000000000" pitchFamily="2" charset="2"/>
-            </a:endParaRPr>
-          </a:p>
-          <a:p>
-            <a:r>
-              <a:rPr lang="en-US" sz="1100" dirty="0">
-                <a:sym typeface="Wingdings" panose="05000000000000000000" pitchFamily="2" charset="2"/>
-              </a:rPr>
-              <a:t>  Now to run the server          as a  go </a:t>
-            </a:r>
-          </a:p>
-          <a:p>
-            <a:pPr marL="0" indent="0">
-              <a:buNone/>
-            </a:pPr>
-            <a:r>
-              <a:rPr lang="en-US" sz="1100" dirty="0">
-                <a:sym typeface="Wingdings" panose="05000000000000000000" pitchFamily="2" charset="2"/>
-              </a:rPr>
-              <a:t>                                                                as a service – means until and </a:t>
-            </a:r>
-            <a:r>
-              <a:rPr lang="en-US" sz="1100">
-                <a:sym typeface="Wingdings" panose="05000000000000000000" pitchFamily="2" charset="2"/>
-              </a:rPr>
-              <a:t>unless SQ server  </a:t>
-            </a:r>
-            <a:r>
-              <a:rPr lang="en-US" sz="1100" dirty="0">
-                <a:sym typeface="Wingdings" panose="05000000000000000000" pitchFamily="2" charset="2"/>
-              </a:rPr>
-              <a:t>is not stop explicitly it will keep running on the specified port</a:t>
-            </a:r>
-          </a:p>
-          <a:p>
-            <a:pPr marL="0" indent="0">
-              <a:buNone/>
-            </a:pPr>
-            <a:endParaRPr lang="en-US" sz="1100" dirty="0">
-              <a:sym typeface="Wingdings" panose="05000000000000000000" pitchFamily="2" charset="2"/>
-            </a:endParaRPr>
-          </a:p>
-          <a:p>
-            <a:pPr marL="0" indent="0">
-              <a:buNone/>
-            </a:pPr>
+              <a:t>             </a:t>
+            </a:r>
             <a:r>
               <a:rPr lang="en-US" sz="1100" dirty="0">
                 <a:highlight>
@@ -13188,16 +14915,265 @@
                 </a:highlight>
                 <a:sym typeface="Wingdings" panose="05000000000000000000" pitchFamily="2" charset="2"/>
               </a:rPr>
-              <a:t>  on resource monitor  Network  port occupied will be visible       </a:t>
+              <a:t>in my case  </a:t>
+            </a:r>
+            <a:r>
+              <a:rPr lang="en-US" sz="1100" dirty="0">
+                <a:sym typeface="Wingdings" panose="05000000000000000000" pitchFamily="2" charset="2"/>
+              </a:rPr>
+              <a:t>show JAVA folder</a:t>
+            </a:r>
+          </a:p>
+          <a:p>
+            <a:pPr marL="0" indent="0">
+              <a:buNone/>
+            </a:pPr>
+            <a:r>
+              <a:rPr lang="en-US" sz="1100" dirty="0">
+                <a:sym typeface="Wingdings" panose="05000000000000000000" pitchFamily="2" charset="2"/>
+              </a:rPr>
+              <a:t>             set env variable </a:t>
+            </a:r>
+            <a:endParaRPr lang="en-US" sz="1100" dirty="0"/>
+          </a:p>
+          <a:p>
+            <a:r>
+              <a:rPr lang="en-US" sz="1100" dirty="0"/>
+              <a:t>SonarQube download</a:t>
+            </a:r>
+          </a:p>
+          <a:p>
+            <a:r>
+              <a:rPr lang="en-US" sz="1100" dirty="0"/>
+              <a:t>SonarQube docx </a:t>
+            </a:r>
+          </a:p>
+          <a:p>
+            <a:r>
+              <a:rPr lang="en-US" sz="1100" dirty="0"/>
+              <a:t>Already Downloaded </a:t>
+            </a:r>
+            <a:r>
+              <a:rPr lang="en-US" sz="1100" dirty="0">
+                <a:sym typeface="Wingdings" panose="05000000000000000000" pitchFamily="2" charset="2"/>
+              </a:rPr>
+              <a:t> create a proper folder structure  extract it   we can start server Now</a:t>
+            </a:r>
+          </a:p>
+          <a:p>
+            <a:pPr marL="0" indent="0" algn="ctr">
+              <a:buNone/>
+            </a:pPr>
+            <a:r>
+              <a:rPr lang="en-US" sz="1100" dirty="0">
+                <a:sym typeface="Wingdings" panose="05000000000000000000" pitchFamily="2" charset="2"/>
+              </a:rPr>
+              <a:t>                              </a:t>
+            </a:r>
+            <a:r>
+              <a:rPr lang="en-US" sz="1100" b="1" u="sng" dirty="0">
+                <a:sym typeface="Wingdings" panose="05000000000000000000" pitchFamily="2" charset="2"/>
+              </a:rPr>
+              <a:t>NOW BEFORE STARTING THE SERVER  LETS SEE THE REQUIRTEMENT OF SERVER </a:t>
+            </a:r>
+          </a:p>
+          <a:p>
+            <a:r>
+              <a:rPr lang="en-US" sz="1100" dirty="0"/>
+              <a:t>Firstly we will have to create new SQL DB   (</a:t>
+            </a:r>
+            <a:r>
+              <a:rPr lang="en-US" sz="1100" i="1" u="sng" dirty="0">
+                <a:highlight>
+                  <a:srgbClr val="FFFF00"/>
+                </a:highlight>
+              </a:rPr>
+              <a:t>show in image</a:t>
+            </a:r>
+            <a:r>
+              <a:rPr lang="en-US" sz="1100" dirty="0"/>
+              <a:t>)</a:t>
+            </a:r>
+            <a:r>
+              <a:rPr lang="en-US" sz="1100" dirty="0">
+                <a:sym typeface="Wingdings" panose="05000000000000000000" pitchFamily="2" charset="2"/>
+              </a:rPr>
+              <a:t>  so open MS SQL Server  SQL_Latin1_General_CP1_CS_AS (Value required to start the SQ)</a:t>
+            </a:r>
+          </a:p>
+          <a:p>
+            <a:r>
+              <a:rPr lang="en-US" sz="1100" dirty="0">
+                <a:sym typeface="Wingdings" panose="05000000000000000000" pitchFamily="2" charset="2"/>
+              </a:rPr>
+              <a:t>Now we have created DB  ,  So the  question  is  that  where  we  have  to  configure   this DB  Information  ?  </a:t>
+            </a:r>
+          </a:p>
+          <a:p>
+            <a:r>
+              <a:rPr lang="en-US" sz="1100" b="1" dirty="0">
+                <a:sym typeface="Wingdings" panose="05000000000000000000" pitchFamily="2" charset="2"/>
+              </a:rPr>
+              <a:t>	 	26  user name </a:t>
+            </a:r>
+          </a:p>
+          <a:p>
+            <a:pPr marL="0" indent="0">
+              <a:buNone/>
+            </a:pPr>
+            <a:r>
+              <a:rPr lang="en-US" sz="1100" b="1" dirty="0">
+                <a:sym typeface="Wingdings" panose="05000000000000000000" pitchFamily="2" charset="2"/>
+              </a:rPr>
+              <a:t>		27  Password </a:t>
+            </a:r>
+          </a:p>
+          <a:p>
+            <a:pPr marL="0" indent="0">
+              <a:buNone/>
+            </a:pPr>
+            <a:r>
+              <a:rPr lang="en-US" sz="1100" b="1" dirty="0">
+                <a:sym typeface="Wingdings" panose="05000000000000000000" pitchFamily="2" charset="2"/>
+              </a:rPr>
+              <a:t>		58  Database name</a:t>
+            </a:r>
+          </a:p>
+          <a:p>
+            <a:pPr marL="0" indent="0">
+              <a:buNone/>
+            </a:pPr>
+            <a:r>
+              <a:rPr lang="en-US" sz="1100" b="1" dirty="0">
+                <a:sym typeface="Wingdings" panose="05000000000000000000" pitchFamily="2" charset="2"/>
+              </a:rPr>
+              <a:t>		111 Port :</a:t>
             </a:r>
             <a:r>
               <a:rPr lang="en-US" sz="1100" u="sng" dirty="0">
+                <a:sym typeface="Wingdings" panose="05000000000000000000" pitchFamily="2" charset="2"/>
+              </a:rPr>
+              <a:t> Port means what , it the  location  where  our  Server  is  going  to  launch , or we can also define it as it is the location where  our  OS system will  listen SQ request   DEMO</a:t>
+            </a:r>
+          </a:p>
+          <a:p>
+            <a:pPr marL="0" indent="0">
+              <a:buNone/>
+            </a:pPr>
+            <a:endParaRPr lang="en-US" sz="1100" u="sng" dirty="0">
+              <a:sym typeface="Wingdings" panose="05000000000000000000" pitchFamily="2" charset="2"/>
+            </a:endParaRPr>
+          </a:p>
+          <a:p>
+            <a:r>
+              <a:rPr lang="en-US" sz="1100" dirty="0">
+                <a:sym typeface="Wingdings" panose="05000000000000000000" pitchFamily="2" charset="2"/>
+              </a:rPr>
+              <a:t>  Now to run the server          as a  go </a:t>
+            </a:r>
+          </a:p>
+          <a:p>
+            <a:pPr marL="0" indent="0">
+              <a:buNone/>
+            </a:pPr>
+            <a:r>
+              <a:rPr lang="en-US" sz="1100" dirty="0">
+                <a:sym typeface="Wingdings" panose="05000000000000000000" pitchFamily="2" charset="2"/>
+              </a:rPr>
+              <a:t>                                                                as a service – means until and unless SQ server  is not stop explicitly it will keep running on the specified port</a:t>
+            </a:r>
+          </a:p>
+          <a:p>
+            <a:pPr marL="0" indent="0">
+              <a:buNone/>
+            </a:pPr>
+            <a:r>
+              <a:rPr lang="en-US" sz="1100" dirty="0">
+                <a:sym typeface="Wingdings" panose="05000000000000000000" pitchFamily="2" charset="2"/>
+              </a:rPr>
+              <a:t> To Test a Port</a:t>
+            </a:r>
+          </a:p>
+          <a:p>
+            <a:pPr marL="0" indent="0">
+              <a:buNone/>
+            </a:pPr>
+            <a:r>
+              <a:rPr lang="en-US" sz="1100" dirty="0">
                 <a:highlight>
                   <a:srgbClr val="FFFF00"/>
                 </a:highlight>
                 <a:sym typeface="Wingdings" panose="05000000000000000000" pitchFamily="2" charset="2"/>
               </a:rPr>
-              <a:t>  </a:t>
+              <a:t>  on resource monitor  Network  port occupied will be visible     or Test-</a:t>
+            </a:r>
+            <a:r>
+              <a:rPr lang="en-US" sz="1100" dirty="0" err="1">
+                <a:highlight>
+                  <a:srgbClr val="FFFF00"/>
+                </a:highlight>
+                <a:sym typeface="Wingdings" panose="05000000000000000000" pitchFamily="2" charset="2"/>
+              </a:rPr>
+              <a:t>NetConnection</a:t>
+            </a:r>
+            <a:r>
+              <a:rPr lang="en-US" sz="1100" dirty="0">
+                <a:highlight>
+                  <a:srgbClr val="FFFF00"/>
+                </a:highlight>
+                <a:sym typeface="Wingdings" panose="05000000000000000000" pitchFamily="2" charset="2"/>
+              </a:rPr>
+              <a:t> -</a:t>
+            </a:r>
+            <a:r>
+              <a:rPr lang="en-US" sz="1100" dirty="0" err="1">
+                <a:highlight>
+                  <a:srgbClr val="FFFF00"/>
+                </a:highlight>
+                <a:sym typeface="Wingdings" panose="05000000000000000000" pitchFamily="2" charset="2"/>
+              </a:rPr>
+              <a:t>ComputerName</a:t>
+            </a:r>
+            <a:r>
+              <a:rPr lang="en-US" sz="1100" dirty="0">
+                <a:highlight>
+                  <a:srgbClr val="FFFF00"/>
+                </a:highlight>
+                <a:sym typeface="Wingdings" panose="05000000000000000000" pitchFamily="2" charset="2"/>
+              </a:rPr>
+              <a:t> &lt;computer-name&gt; -Port &lt;port-number&gt;</a:t>
+            </a:r>
+          </a:p>
+          <a:p>
+            <a:r>
+              <a:rPr lang="en-US" sz="1100" dirty="0">
+                <a:sym typeface="Wingdings" panose="05000000000000000000" pitchFamily="2" charset="2"/>
+              </a:rPr>
+              <a:t>Hit local host  login first t </a:t>
+            </a:r>
+            <a:r>
+              <a:rPr lang="en-US" sz="1100" dirty="0" err="1">
+                <a:sym typeface="Wingdings" panose="05000000000000000000" pitchFamily="2" charset="2"/>
+              </a:rPr>
+              <a:t>ime</a:t>
+            </a:r>
+            <a:r>
+              <a:rPr lang="en-US" sz="1100" dirty="0">
+                <a:sym typeface="Wingdings" panose="05000000000000000000" pitchFamily="2" charset="2"/>
+              </a:rPr>
+              <a:t> admin |admin  reset </a:t>
+            </a:r>
+            <a:r>
+              <a:rPr lang="en-US" sz="1100" dirty="0" err="1">
+                <a:sym typeface="Wingdings" panose="05000000000000000000" pitchFamily="2" charset="2"/>
+              </a:rPr>
+              <a:t>U_name</a:t>
+            </a:r>
+            <a:r>
+              <a:rPr lang="en-US" sz="1100" dirty="0">
+                <a:sym typeface="Wingdings" panose="05000000000000000000" pitchFamily="2" charset="2"/>
+              </a:rPr>
+              <a:t> | password</a:t>
             </a:r>
           </a:p>
           <a:p>
@@ -13247,346 +15223,458 @@
       </p:grpSpPr>
       <p:sp>
         <p:nvSpPr>
-          <p:cNvPr id="4" name="Rectangle 3"/>
-          <p:cNvSpPr/>
-          <p:nvPr/>
+          <p:cNvPr id="3" name="Content Placeholder 2">
+            <a:extLst>
+              <a:ext uri="{FF2B5EF4-FFF2-40B4-BE49-F238E27FC236}">
+                <a16:creationId xmlns:a16="http://schemas.microsoft.com/office/drawing/2014/main" id="{213EF190-E916-508F-8100-ABD098A768F5}"/>
+              </a:ext>
+            </a:extLst>
+          </p:cNvPr>
+          <p:cNvSpPr>
+            <a:spLocks noGrp="1"/>
+          </p:cNvSpPr>
+          <p:nvPr>
+            <p:ph idx="1"/>
+          </p:nvPr>
         </p:nvSpPr>
         <p:spPr>
           <a:xfrm>
-            <a:off x="0" y="735013"/>
-            <a:ext cx="675278" cy="265906"/>
+            <a:off x="152400" y="543719"/>
+            <a:ext cx="9753600" cy="4953000"/>
           </a:xfrm>
-          <a:prstGeom prst="rect">
-            <a:avLst/>
-          </a:prstGeom>
-          <a:solidFill>
-            <a:srgbClr val="00B8F1"/>
-          </a:solidFill>
-          <a:ln>
-            <a:noFill/>
-          </a:ln>
         </p:spPr>
-        <p:style>
-          <a:lnRef idx="2">
-            <a:schemeClr val="accent1">
-              <a:shade val="50000"/>
-            </a:schemeClr>
-          </a:lnRef>
-          <a:fillRef idx="1">
-            <a:schemeClr val="accent1"/>
-          </a:fillRef>
-          <a:effectRef idx="0">
-            <a:schemeClr val="accent1"/>
-          </a:effectRef>
-          <a:fontRef idx="minor">
-            <a:schemeClr val="lt1"/>
-          </a:fontRef>
-        </p:style>
-        <p:txBody>
-          <a:bodyPr rtlCol="0" anchor="ctr"/>
+        <p:txBody>
+          <a:bodyPr/>
           <a:lstStyle/>
           <a:p>
-            <a:pPr algn="ctr"/>
-            <a:endParaRPr lang="en-US"/>
-          </a:p>
-        </p:txBody>
-      </p:sp>
-      <p:sp>
-        <p:nvSpPr>
-          <p:cNvPr id="5" name="Content Placeholder 2"/>
-          <p:cNvSpPr txBox="1">
-            <a:spLocks/>
-          </p:cNvSpPr>
-          <p:nvPr/>
-        </p:nvSpPr>
-        <p:spPr>
-          <a:xfrm>
-            <a:off x="675277" y="696119"/>
-            <a:ext cx="3504201" cy="439869"/>
-          </a:xfrm>
-          <a:prstGeom prst="rect">
-            <a:avLst/>
-          </a:prstGeom>
-        </p:spPr>
-        <p:txBody>
-          <a:bodyPr lIns="100557" tIns="50278" rIns="100557" bIns="50278"/>
-          <a:lstStyle>
-            <a:lvl1pPr marL="377087" indent="-377087" algn="l" defTabSz="1005566" rtl="0" eaLnBrk="1" latinLnBrk="0" hangingPunct="1">
-              <a:spcBef>
-                <a:spcPct val="20000"/>
-              </a:spcBef>
-              <a:buFont typeface="Arial" panose="020B0604020202020204" pitchFamily="34" charset="0"/>
-              <a:buChar char="•"/>
-              <a:defRPr sz="3500" kern="1200">
-                <a:solidFill>
-                  <a:schemeClr val="tx1"/>
-                </a:solidFill>
-                <a:latin typeface="+mn-lt"/>
-                <a:ea typeface="+mn-ea"/>
-                <a:cs typeface="+mn-cs"/>
-              </a:defRPr>
-            </a:lvl1pPr>
-            <a:lvl2pPr marL="817022" indent="-314239" algn="l" defTabSz="1005566" rtl="0" eaLnBrk="1" latinLnBrk="0" hangingPunct="1">
-              <a:spcBef>
-                <a:spcPct val="20000"/>
-              </a:spcBef>
-              <a:buFont typeface="Arial" panose="020B0604020202020204" pitchFamily="34" charset="0"/>
-              <a:buChar char="–"/>
-              <a:defRPr sz="3100" kern="1200">
-                <a:solidFill>
-                  <a:schemeClr val="tx1"/>
-                </a:solidFill>
-                <a:latin typeface="+mn-lt"/>
-                <a:ea typeface="+mn-ea"/>
-                <a:cs typeface="+mn-cs"/>
-              </a:defRPr>
-            </a:lvl2pPr>
-            <a:lvl3pPr marL="1256957" indent="-251391" algn="l" defTabSz="1005566" rtl="0" eaLnBrk="1" latinLnBrk="0" hangingPunct="1">
-              <a:spcBef>
-                <a:spcPct val="20000"/>
-              </a:spcBef>
-              <a:buFont typeface="Arial" panose="020B0604020202020204" pitchFamily="34" charset="0"/>
-              <a:buChar char="•"/>
-              <a:defRPr sz="2600" kern="1200">
-                <a:solidFill>
-                  <a:schemeClr val="tx1"/>
-                </a:solidFill>
-                <a:latin typeface="+mn-lt"/>
-                <a:ea typeface="+mn-ea"/>
-                <a:cs typeface="+mn-cs"/>
-              </a:defRPr>
-            </a:lvl3pPr>
-            <a:lvl4pPr marL="1759740" indent="-251391" algn="l" defTabSz="1005566" rtl="0" eaLnBrk="1" latinLnBrk="0" hangingPunct="1">
-              <a:spcBef>
-                <a:spcPct val="20000"/>
-              </a:spcBef>
-              <a:buFont typeface="Arial" panose="020B0604020202020204" pitchFamily="34" charset="0"/>
-              <a:buChar char="–"/>
-              <a:defRPr sz="2200" kern="1200">
-                <a:solidFill>
-                  <a:schemeClr val="tx1"/>
-                </a:solidFill>
-                <a:latin typeface="+mn-lt"/>
-                <a:ea typeface="+mn-ea"/>
-                <a:cs typeface="+mn-cs"/>
-              </a:defRPr>
-            </a:lvl4pPr>
-            <a:lvl5pPr marL="2262523" indent="-251391" algn="l" defTabSz="1005566" rtl="0" eaLnBrk="1" latinLnBrk="0" hangingPunct="1">
-              <a:spcBef>
-                <a:spcPct val="20000"/>
-              </a:spcBef>
-              <a:buFont typeface="Arial" panose="020B0604020202020204" pitchFamily="34" charset="0"/>
-              <a:buChar char="»"/>
-              <a:defRPr sz="2200" kern="1200">
-                <a:solidFill>
-                  <a:schemeClr val="tx1"/>
-                </a:solidFill>
-                <a:latin typeface="+mn-lt"/>
-                <a:ea typeface="+mn-ea"/>
-                <a:cs typeface="+mn-cs"/>
-              </a:defRPr>
-            </a:lvl5pPr>
-            <a:lvl6pPr marL="2765306" indent="-251391" algn="l" defTabSz="1005566" rtl="0" eaLnBrk="1" latinLnBrk="0" hangingPunct="1">
-              <a:spcBef>
-                <a:spcPct val="20000"/>
-              </a:spcBef>
-              <a:buFont typeface="Arial" panose="020B0604020202020204" pitchFamily="34" charset="0"/>
-              <a:buChar char="•"/>
-              <a:defRPr sz="2200" kern="1200">
-                <a:solidFill>
-                  <a:schemeClr val="tx1"/>
-                </a:solidFill>
-                <a:latin typeface="+mn-lt"/>
-                <a:ea typeface="+mn-ea"/>
-                <a:cs typeface="+mn-cs"/>
-              </a:defRPr>
-            </a:lvl6pPr>
-            <a:lvl7pPr marL="3268088" indent="-251391" algn="l" defTabSz="1005566" rtl="0" eaLnBrk="1" latinLnBrk="0" hangingPunct="1">
-              <a:spcBef>
-                <a:spcPct val="20000"/>
-              </a:spcBef>
-              <a:buFont typeface="Arial" panose="020B0604020202020204" pitchFamily="34" charset="0"/>
-              <a:buChar char="•"/>
-              <a:defRPr sz="2200" kern="1200">
-                <a:solidFill>
-                  <a:schemeClr val="tx1"/>
-                </a:solidFill>
-                <a:latin typeface="+mn-lt"/>
-                <a:ea typeface="+mn-ea"/>
-                <a:cs typeface="+mn-cs"/>
-              </a:defRPr>
-            </a:lvl7pPr>
-            <a:lvl8pPr marL="3770871" indent="-251391" algn="l" defTabSz="1005566" rtl="0" eaLnBrk="1" latinLnBrk="0" hangingPunct="1">
-              <a:spcBef>
-                <a:spcPct val="20000"/>
-              </a:spcBef>
-              <a:buFont typeface="Arial" panose="020B0604020202020204" pitchFamily="34" charset="0"/>
-              <a:buChar char="•"/>
-              <a:defRPr sz="2200" kern="1200">
-                <a:solidFill>
-                  <a:schemeClr val="tx1"/>
-                </a:solidFill>
-                <a:latin typeface="+mn-lt"/>
-                <a:ea typeface="+mn-ea"/>
-                <a:cs typeface="+mn-cs"/>
-              </a:defRPr>
-            </a:lvl8pPr>
-            <a:lvl9pPr marL="4273654" indent="-251391" algn="l" defTabSz="1005566" rtl="0" eaLnBrk="1" latinLnBrk="0" hangingPunct="1">
-              <a:spcBef>
-                <a:spcPct val="20000"/>
-              </a:spcBef>
-              <a:buFont typeface="Arial" panose="020B0604020202020204" pitchFamily="34" charset="0"/>
-              <a:buChar char="•"/>
-              <a:defRPr sz="2200" kern="1200">
-                <a:solidFill>
-                  <a:schemeClr val="tx1"/>
-                </a:solidFill>
-                <a:latin typeface="+mn-lt"/>
-                <a:ea typeface="+mn-ea"/>
-                <a:cs typeface="+mn-cs"/>
-              </a:defRPr>
-            </a:lvl9pPr>
-          </a:lstStyle>
+            <a:r>
+              <a:rPr lang="en-US" sz="1500" dirty="0"/>
+              <a:t>Now for doing the analysis  we will need a tool call sonar scanner , Explain tab(</a:t>
+            </a:r>
+            <a:r>
+              <a:rPr lang="en-US" sz="1100" u="sng" dirty="0"/>
+              <a:t>download zip </a:t>
+            </a:r>
+            <a:r>
+              <a:rPr lang="en-US" sz="1100" u="sng" dirty="0">
+                <a:sym typeface="Wingdings" panose="05000000000000000000" pitchFamily="2" charset="2"/>
+              </a:rPr>
+              <a:t> create folder  extract it)</a:t>
+            </a:r>
+            <a:endParaRPr lang="en-US" sz="1100" u="sng" dirty="0"/>
+          </a:p>
+          <a:p>
+            <a:r>
+              <a:rPr lang="en-US" sz="1500" b="1" u="sng" dirty="0"/>
+              <a:t>Scanner   : explain all required</a:t>
+            </a:r>
+          </a:p>
           <a:p>
             <a:pPr marL="0" indent="0">
               <a:buNone/>
             </a:pPr>
-            <a:r>
-              <a:rPr lang="en-US" sz="1800" b="1" dirty="0" err="1">
-                <a:solidFill>
-                  <a:srgbClr val="2B3B4B"/>
-                </a:solidFill>
-                <a:latin typeface="Tahoma" panose="020B0604030504040204" pitchFamily="34" charset="0"/>
-                <a:ea typeface="Tahoma" panose="020B0604030504040204" pitchFamily="34" charset="0"/>
-                <a:cs typeface="Tahoma" panose="020B0604030504040204" pitchFamily="34" charset="0"/>
-              </a:rPr>
-              <a:t>SonarQube</a:t>
-            </a:r>
-            <a:r>
-              <a:rPr lang="en-US" sz="1800" b="1" dirty="0">
-                <a:solidFill>
-                  <a:srgbClr val="2B3B4B"/>
-                </a:solidFill>
-                <a:latin typeface="Tahoma" panose="020B0604030504040204" pitchFamily="34" charset="0"/>
-                <a:ea typeface="Tahoma" panose="020B0604030504040204" pitchFamily="34" charset="0"/>
-                <a:cs typeface="Tahoma" panose="020B0604030504040204" pitchFamily="34" charset="0"/>
-              </a:rPr>
-              <a:t> Features</a:t>
-            </a:r>
-          </a:p>
-        </p:txBody>
-      </p:sp>
-      <p:sp>
-        <p:nvSpPr>
-          <p:cNvPr id="2" name="TextBox 1"/>
-          <p:cNvSpPr txBox="1"/>
-          <p:nvPr/>
-        </p:nvSpPr>
-        <p:spPr>
-          <a:xfrm>
-            <a:off x="762000" y="1135988"/>
-            <a:ext cx="9067800" cy="3477875"/>
-          </a:xfrm>
-          <a:prstGeom prst="rect">
-            <a:avLst/>
-          </a:prstGeom>
-          <a:noFill/>
-        </p:spPr>
-        <p:txBody>
-          <a:bodyPr wrap="square" rtlCol="0">
-            <a:spAutoFit/>
-          </a:bodyPr>
-          <a:lstStyle/>
-          <a:p>
-            <a:endParaRPr lang="en-US" dirty="0"/>
-          </a:p>
-          <a:p>
-            <a:pPr marL="342900" lvl="0" indent="-342900">
-              <a:lnSpc>
-                <a:spcPct val="150000"/>
-              </a:lnSpc>
-              <a:buFont typeface="Arial" panose="020B0604020202020204" pitchFamily="34" charset="0"/>
-              <a:buChar char="•"/>
+            <a:endParaRPr lang="en-US" sz="1500" b="1" u="sng" dirty="0"/>
+          </a:p>
+          <a:p>
+            <a:r>
+              <a:rPr lang="en-US" sz="1500" dirty="0"/>
+              <a:t>Now  we are ready to analyze the project. Before that  , there are 3 command that need to be formulated </a:t>
+            </a:r>
+            <a:r>
+              <a:rPr lang="en-US" sz="1500" dirty="0">
+                <a:highlight>
+                  <a:srgbClr val="FFFF00"/>
+                </a:highlight>
+              </a:rPr>
+              <a:t>Show</a:t>
+            </a:r>
+          </a:p>
+          <a:p>
+            <a:pPr marL="0" indent="0">
+              <a:buNone/>
             </a:pPr>
             <a:r>
-              <a:rPr lang="en-US" dirty="0"/>
-              <a:t>Comments (comments and duplication )</a:t>
-            </a:r>
-          </a:p>
-          <a:p>
-            <a:pPr marL="342900" lvl="0" indent="-342900">
-              <a:lnSpc>
-                <a:spcPct val="150000"/>
-              </a:lnSpc>
-              <a:buFont typeface="Arial" panose="020B0604020202020204" pitchFamily="34" charset="0"/>
-              <a:buChar char="•"/>
+              <a:rPr lang="en-US" sz="1100" dirty="0"/>
+              <a:t>                                                        -------------- </a:t>
+            </a:r>
+            <a:r>
+              <a:rPr lang="en-US" sz="1100" b="1" dirty="0"/>
+              <a:t>First Significance-</a:t>
+            </a:r>
+            <a:r>
+              <a:rPr lang="en-US" sz="1100" dirty="0"/>
+              <a:t>-------------</a:t>
+            </a:r>
+          </a:p>
+          <a:p>
+            <a:r>
+              <a:rPr lang="en-US" sz="1500" dirty="0"/>
+              <a:t>3 commands    1. </a:t>
+            </a:r>
+            <a:r>
+              <a:rPr lang="en-US" sz="1100" dirty="0"/>
+              <a:t>so the first </a:t>
+            </a:r>
+            <a:r>
+              <a:rPr lang="en-US" sz="1100" dirty="0" err="1"/>
+              <a:t>cmd</a:t>
+            </a:r>
+            <a:r>
+              <a:rPr lang="en-US" sz="1100" dirty="0"/>
+              <a:t> contains  “</a:t>
+            </a:r>
+            <a:r>
+              <a:rPr lang="en-US" sz="1100" u="sng" dirty="0"/>
+              <a:t>begin</a:t>
+            </a:r>
+            <a:r>
+              <a:rPr lang="en-US" sz="1100" dirty="0"/>
+              <a:t>” keyword &gt; it is like it will create a ready env for  our  project analysis  on  SQ for  </a:t>
+            </a:r>
+            <a:endParaRPr lang="en-US" sz="1100" dirty="0">
+              <a:highlight>
+                <a:srgbClr val="FFFF00"/>
+              </a:highlight>
+            </a:endParaRPr>
+          </a:p>
+          <a:p>
+            <a:pPr marL="0" indent="0">
+              <a:buNone/>
             </a:pPr>
             <a:r>
-              <a:rPr lang="en-US" dirty="0"/>
-              <a:t>Coding rules (standards)</a:t>
-            </a:r>
-          </a:p>
-          <a:p>
-            <a:pPr marL="342900" lvl="0" indent="-342900">
-              <a:lnSpc>
-                <a:spcPct val="150000"/>
-              </a:lnSpc>
-              <a:buFont typeface="Arial" panose="020B0604020202020204" pitchFamily="34" charset="0"/>
-              <a:buChar char="•"/>
+              <a:rPr lang="en-US" sz="1100" dirty="0"/>
+              <a:t>                                                         -------------- </a:t>
+            </a:r>
+            <a:r>
+              <a:rPr lang="en-US" sz="1100" b="1" dirty="0"/>
+              <a:t>Second Formulation-</a:t>
+            </a:r>
+            <a:r>
+              <a:rPr lang="en-US" sz="1100" dirty="0"/>
+              <a:t>-------------</a:t>
+            </a:r>
+          </a:p>
+          <a:p>
+            <a:pPr marL="0" indent="0">
+              <a:buNone/>
             </a:pPr>
             <a:r>
-              <a:rPr lang="en-US" dirty="0"/>
-              <a:t>Potential Bugs and Vulnerabilities</a:t>
-            </a:r>
-          </a:p>
-          <a:p>
-            <a:pPr marL="342900" lvl="0" indent="-342900">
-              <a:lnSpc>
-                <a:spcPct val="150000"/>
-              </a:lnSpc>
-              <a:buFont typeface="Arial" panose="020B0604020202020204" pitchFamily="34" charset="0"/>
-              <a:buChar char="•"/>
+              <a:rPr lang="en-US" sz="1100" dirty="0"/>
+              <a:t>                                                so in first command , wherever your </a:t>
+            </a:r>
+            <a:r>
+              <a:rPr lang="en-US" sz="1100" dirty="0" err="1"/>
+              <a:t>SonarScnner</a:t>
+            </a:r>
+            <a:r>
+              <a:rPr lang="en-US" sz="1100" dirty="0"/>
+              <a:t> is installed , navigate to the MSBuild.exe file path and copy its location , </a:t>
+            </a:r>
+            <a:r>
+              <a:rPr lang="en-US" sz="1100" dirty="0">
+                <a:highlight>
+                  <a:srgbClr val="FFFF00"/>
+                </a:highlight>
+              </a:rPr>
+              <a:t>in my case </a:t>
+            </a:r>
+            <a:r>
+              <a:rPr lang="en-US" sz="1100" dirty="0"/>
+              <a:t>–</a:t>
+            </a:r>
+          </a:p>
+          <a:p>
+            <a:pPr marL="0" indent="0">
+              <a:buNone/>
             </a:pPr>
             <a:r>
-              <a:rPr lang="en-US" dirty="0"/>
-              <a:t>Unit tests (Unit test coverage &amp; test case result)</a:t>
-            </a:r>
-          </a:p>
-          <a:p>
-            <a:pPr marL="342900" lvl="0" indent="-342900">
-              <a:lnSpc>
-                <a:spcPct val="150000"/>
-              </a:lnSpc>
-              <a:buFont typeface="Arial" panose="020B0604020202020204" pitchFamily="34" charset="0"/>
-              <a:buChar char="•"/>
+              <a:rPr lang="en-US" sz="1100" dirty="0"/>
+              <a:t>	                 Now whenever analysis will be done and report will be sent on SQ ,  it will require unique key on SQ   &gt; denoted by “/k” </a:t>
+            </a:r>
+            <a:r>
+              <a:rPr lang="en-US" sz="1100" dirty="0">
+                <a:highlight>
+                  <a:srgbClr val="FFFF00"/>
+                </a:highlight>
+              </a:rPr>
+              <a:t>in my case </a:t>
+            </a:r>
+            <a:endParaRPr lang="en-US" sz="1100" dirty="0"/>
+          </a:p>
+          <a:p>
+            <a:pPr marL="0" indent="0">
+              <a:buNone/>
             </a:pPr>
             <a:r>
-              <a:rPr lang="en-US" dirty="0"/>
-              <a:t>Complexity</a:t>
-            </a:r>
-          </a:p>
-          <a:p>
-            <a:pPr marL="342900" lvl="0" indent="-342900">
-              <a:lnSpc>
-                <a:spcPct val="150000"/>
-              </a:lnSpc>
-              <a:buFont typeface="Arial" panose="020B0604020202020204" pitchFamily="34" charset="0"/>
-              <a:buChar char="•"/>
+              <a:rPr lang="en-US" sz="1100" dirty="0"/>
+              <a:t>                In the same way  , Now whenever analysis will be done and report will be sent on SQ ,  it will also require unique name  on SQ &gt; denoted by “/n” </a:t>
+            </a:r>
+            <a:r>
+              <a:rPr lang="en-US" sz="1100" dirty="0">
+                <a:highlight>
+                  <a:srgbClr val="FFFF00"/>
+                </a:highlight>
+              </a:rPr>
+              <a:t>in my case </a:t>
+            </a:r>
+            <a:endParaRPr lang="en-US" sz="1100" dirty="0"/>
+          </a:p>
+          <a:p>
+            <a:pPr marL="0" indent="0">
+              <a:buNone/>
             </a:pPr>
             <a:r>
-              <a:rPr lang="en-US" dirty="0"/>
-              <a:t>Multi Language Support</a:t>
-            </a:r>
-          </a:p>
-          <a:p>
-            <a:endParaRPr lang="en-US" dirty="0"/>
+              <a:rPr lang="en-US" sz="1100" dirty="0"/>
+              <a:t>                                                 Now initially we  are doing the analysis for the first time  </a:t>
+            </a:r>
+            <a:r>
+              <a:rPr lang="en-US" sz="1100" dirty="0">
+                <a:sym typeface="Wingdings" panose="05000000000000000000" pitchFamily="2" charset="2"/>
+              </a:rPr>
+              <a:t></a:t>
+            </a:r>
+            <a:r>
+              <a:rPr lang="en-US" sz="1100" dirty="0"/>
+              <a:t> so version =1.0  </a:t>
+            </a:r>
+            <a:r>
+              <a:rPr lang="en-US" sz="1100" dirty="0">
+                <a:sym typeface="Wingdings" panose="05000000000000000000" pitchFamily="2" charset="2"/>
+              </a:rPr>
+              <a:t>( second time 1.1/2.1)  </a:t>
+            </a:r>
+            <a:r>
+              <a:rPr lang="en-US" sz="1100" b="1" dirty="0">
+                <a:solidFill>
+                  <a:srgbClr val="FF0000"/>
+                </a:solidFill>
+                <a:sym typeface="Wingdings" panose="05000000000000000000" pitchFamily="2" charset="2"/>
+              </a:rPr>
+              <a:t>use</a:t>
+            </a:r>
+            <a:r>
+              <a:rPr lang="en-US" sz="1100" dirty="0">
+                <a:solidFill>
+                  <a:srgbClr val="FF0000"/>
+                </a:solidFill>
+                <a:sym typeface="Wingdings" panose="05000000000000000000" pitchFamily="2" charset="2"/>
+              </a:rPr>
+              <a:t> to compare code versions</a:t>
+            </a:r>
+            <a:endParaRPr lang="en-US" sz="1100" dirty="0">
+              <a:solidFill>
+                <a:srgbClr val="FF0000"/>
+              </a:solidFill>
+            </a:endParaRPr>
+          </a:p>
+          <a:p>
+            <a:pPr marL="0" indent="0">
+              <a:buNone/>
+            </a:pPr>
+            <a:r>
+              <a:rPr lang="en-US" sz="1100" dirty="0"/>
+              <a:t>                                       Finally , token  </a:t>
+            </a:r>
+            <a:r>
+              <a:rPr lang="en-US" sz="1100" dirty="0">
+                <a:sym typeface="Wingdings" panose="05000000000000000000" pitchFamily="2" charset="2"/>
+              </a:rPr>
+              <a:t> first  I will generate (</a:t>
+            </a:r>
+            <a:r>
+              <a:rPr lang="en-US" sz="1100" dirty="0">
+                <a:highlight>
+                  <a:srgbClr val="FFFF00"/>
+                </a:highlight>
+                <a:sym typeface="Wingdings" panose="05000000000000000000" pitchFamily="2" charset="2"/>
+              </a:rPr>
+              <a:t>show</a:t>
+            </a:r>
+            <a:r>
+              <a:rPr lang="en-US" sz="1100" dirty="0">
+                <a:sym typeface="Wingdings" panose="05000000000000000000" pitchFamily="2" charset="2"/>
+              </a:rPr>
+              <a:t>) </a:t>
+            </a:r>
+            <a:r>
+              <a:rPr lang="en-US" sz="1100" b="1" dirty="0">
+                <a:solidFill>
+                  <a:srgbClr val="FF0000"/>
+                </a:solidFill>
+                <a:sym typeface="Wingdings" panose="05000000000000000000" pitchFamily="2" charset="2"/>
+              </a:rPr>
+              <a:t>use</a:t>
+            </a:r>
+            <a:r>
+              <a:rPr lang="en-US" sz="1100" dirty="0">
+                <a:sym typeface="Wingdings" panose="05000000000000000000" pitchFamily="2" charset="2"/>
+              </a:rPr>
+              <a:t> :</a:t>
+            </a:r>
+            <a:r>
+              <a:rPr lang="en-US" sz="1100" dirty="0">
+                <a:solidFill>
+                  <a:srgbClr val="FF0000"/>
+                </a:solidFill>
+                <a:sym typeface="Wingdings" panose="05000000000000000000" pitchFamily="2" charset="2"/>
+              </a:rPr>
+              <a:t>Token acts like login credential to  SQ</a:t>
+            </a:r>
+          </a:p>
+          <a:p>
+            <a:pPr marL="0" indent="0">
+              <a:buNone/>
+            </a:pPr>
+            <a:r>
+              <a:rPr lang="en-US" sz="1100" dirty="0"/>
+              <a:t>                                                       -------------- </a:t>
+            </a:r>
+            <a:r>
+              <a:rPr lang="en-US" sz="1100" b="1" dirty="0"/>
+              <a:t>First Significance-</a:t>
+            </a:r>
+            <a:r>
+              <a:rPr lang="en-US" sz="1100" dirty="0"/>
+              <a:t>-------------</a:t>
+            </a:r>
+          </a:p>
+          <a:p>
+            <a:pPr marL="0" indent="0">
+              <a:buNone/>
+            </a:pPr>
+            <a:r>
+              <a:rPr lang="en-US" sz="1500" dirty="0"/>
+              <a:t>                                    2  </a:t>
+            </a:r>
+            <a:r>
+              <a:rPr lang="en-US" sz="1100" dirty="0"/>
+              <a:t>So the second </a:t>
+            </a:r>
+            <a:r>
+              <a:rPr lang="en-US" sz="1100" dirty="0" err="1"/>
+              <a:t>cmd</a:t>
+            </a:r>
+            <a:r>
+              <a:rPr lang="en-US" sz="1100" dirty="0"/>
+              <a:t> is rebuild , it will rebuild our project , so to rebuild I will need the path MSBuild.exe once again but this time  the path should be of VS in which project is created.  As I have created the project in 2017  I will use its path  ,</a:t>
+            </a:r>
+            <a:r>
+              <a:rPr lang="en-US" sz="1100" dirty="0">
+                <a:highlight>
+                  <a:srgbClr val="FFFF00"/>
+                </a:highlight>
+              </a:rPr>
+              <a:t>in my case </a:t>
+            </a:r>
+            <a:endParaRPr lang="en-US" sz="1500" dirty="0"/>
+          </a:p>
+          <a:p>
+            <a:pPr marL="0" indent="0">
+              <a:buNone/>
+            </a:pPr>
+            <a:r>
+              <a:rPr lang="en-US" sz="1500" dirty="0"/>
+              <a:t>                                    3 </a:t>
+            </a:r>
+            <a:r>
+              <a:rPr lang="en-US" sz="1100" dirty="0"/>
+              <a:t>first </a:t>
+            </a:r>
+            <a:r>
+              <a:rPr lang="en-US" sz="1100" dirty="0" err="1"/>
+              <a:t>cmd</a:t>
+            </a:r>
+            <a:r>
+              <a:rPr lang="en-US" sz="1100" dirty="0"/>
+              <a:t> is  begin &gt; in  same way 3</a:t>
+            </a:r>
+            <a:r>
+              <a:rPr lang="en-US" sz="1100" baseline="30000" dirty="0"/>
+              <a:t>rd</a:t>
+            </a:r>
+            <a:r>
+              <a:rPr lang="en-US" sz="1100" dirty="0"/>
+              <a:t> end  &gt; 3</a:t>
+            </a:r>
+            <a:r>
+              <a:rPr lang="en-US" sz="1100" baseline="30000" dirty="0"/>
+              <a:t>rd</a:t>
+            </a:r>
+            <a:r>
+              <a:rPr lang="en-US" sz="1100" dirty="0"/>
+              <a:t> command will ensure that after analysis resources  such as SQ should hold data analysis report .</a:t>
+            </a:r>
+          </a:p>
+          <a:p>
+            <a:r>
+              <a:rPr lang="en-US" sz="1500" dirty="0"/>
+              <a:t>Root of project(where </a:t>
+            </a:r>
+            <a:r>
+              <a:rPr lang="en-US" sz="1500" dirty="0" err="1"/>
+              <a:t>sln</a:t>
+            </a:r>
+            <a:r>
+              <a:rPr lang="en-US" sz="1500" dirty="0"/>
+              <a:t> is present) </a:t>
+            </a:r>
+            <a:r>
+              <a:rPr lang="en-US" sz="1500" dirty="0">
+                <a:sym typeface="Wingdings" panose="05000000000000000000" pitchFamily="2" charset="2"/>
+              </a:rPr>
+              <a:t></a:t>
+            </a:r>
+            <a:r>
+              <a:rPr lang="en-US" sz="1500" dirty="0"/>
+              <a:t> open </a:t>
+            </a:r>
+            <a:r>
+              <a:rPr lang="en-US" sz="1500" dirty="0" err="1"/>
+              <a:t>cmd</a:t>
+            </a:r>
+            <a:r>
+              <a:rPr lang="en-US" sz="1500" dirty="0"/>
+              <a:t> &gt; execute one by one</a:t>
+            </a:r>
+          </a:p>
+          <a:p>
+            <a:r>
+              <a:rPr lang="en-US" sz="1500" dirty="0"/>
+              <a:t>1.0</a:t>
+            </a:r>
+          </a:p>
+          <a:p>
+            <a:r>
+              <a:rPr lang="en-US" sz="1500" dirty="0"/>
+              <a:t>New feature -</a:t>
+            </a:r>
+            <a:r>
+              <a:rPr lang="en-US" sz="1500" dirty="0">
+                <a:sym typeface="Wingdings" panose="05000000000000000000" pitchFamily="2" charset="2"/>
+              </a:rPr>
+              <a:t>  </a:t>
+            </a:r>
+            <a:r>
+              <a:rPr lang="en-US" sz="1500" dirty="0"/>
+              <a:t>1.1</a:t>
+            </a:r>
+          </a:p>
+          <a:p>
+            <a:pPr marL="0" indent="0">
+              <a:buNone/>
+            </a:pPr>
+            <a:r>
+              <a:rPr lang="en-US" sz="1500" dirty="0"/>
+              <a:t>	</a:t>
+            </a:r>
+            <a:endParaRPr lang="en-US" sz="1500" u="sng" dirty="0"/>
           </a:p>
         </p:txBody>
       </p:sp>
     </p:spTree>
     <p:extLst>
       <p:ext uri="{BB962C8B-B14F-4D97-AF65-F5344CB8AC3E}">
-        <p14:creationId xmlns:p14="http://schemas.microsoft.com/office/powerpoint/2010/main" val="2110748941"/>
+        <p14:creationId xmlns:p14="http://schemas.microsoft.com/office/powerpoint/2010/main" val="2448333910"/>
       </p:ext>
     </p:extLst>
   </p:cSld>
@@ -13615,277 +15703,646 @@
       </p:grpSpPr>
       <p:sp>
         <p:nvSpPr>
-          <p:cNvPr id="2" name="Rectangle 1"/>
-          <p:cNvSpPr/>
-          <p:nvPr/>
+          <p:cNvPr id="2" name="Title 1">
+            <a:extLst>
+              <a:ext uri="{FF2B5EF4-FFF2-40B4-BE49-F238E27FC236}">
+                <a16:creationId xmlns:a16="http://schemas.microsoft.com/office/drawing/2014/main" id="{5BF0AEAB-6181-759A-F622-DA9642738706}"/>
+              </a:ext>
+            </a:extLst>
+          </p:cNvPr>
+          <p:cNvSpPr>
+            <a:spLocks noGrp="1"/>
+          </p:cNvSpPr>
+          <p:nvPr>
+            <p:ph type="title"/>
+          </p:nvPr>
         </p:nvSpPr>
         <p:spPr>
           <a:xfrm>
-            <a:off x="0" y="735013"/>
-            <a:ext cx="675278" cy="265906"/>
+            <a:off x="502920" y="226641"/>
+            <a:ext cx="1554480" cy="240878"/>
           </a:xfrm>
-          <a:prstGeom prst="rect">
-            <a:avLst/>
-          </a:prstGeom>
-          <a:solidFill>
-            <a:srgbClr val="00B8F1"/>
-          </a:solidFill>
-          <a:ln>
-            <a:noFill/>
-          </a:ln>
         </p:spPr>
-        <p:style>
-          <a:lnRef idx="2">
-            <a:schemeClr val="accent1">
-              <a:shade val="50000"/>
-            </a:schemeClr>
-          </a:lnRef>
-          <a:fillRef idx="1">
-            <a:schemeClr val="accent1"/>
-          </a:fillRef>
-          <a:effectRef idx="0">
-            <a:schemeClr val="accent1"/>
-          </a:effectRef>
-          <a:fontRef idx="minor">
-            <a:schemeClr val="lt1"/>
-          </a:fontRef>
-        </p:style>
-        <p:txBody>
-          <a:bodyPr rtlCol="0" anchor="ctr"/>
+        <p:txBody>
+          <a:bodyPr/>
           <a:lstStyle/>
           <a:p>
-            <a:pPr algn="ctr"/>
-            <a:endParaRPr lang="en-US"/>
-          </a:p>
-        </p:txBody>
-      </p:sp>
-      <p:sp>
-        <p:nvSpPr>
-          <p:cNvPr id="3" name="Content Placeholder 2"/>
-          <p:cNvSpPr txBox="1">
-            <a:spLocks/>
+            <a:r>
+              <a:rPr lang="en-US" sz="3000" dirty="0"/>
+              <a:t>SQ</a:t>
+            </a:r>
+          </a:p>
+        </p:txBody>
+      </p:sp>
+      <p:sp>
+        <p:nvSpPr>
+          <p:cNvPr id="3" name="Content Placeholder 2">
+            <a:extLst>
+              <a:ext uri="{FF2B5EF4-FFF2-40B4-BE49-F238E27FC236}">
+                <a16:creationId xmlns:a16="http://schemas.microsoft.com/office/drawing/2014/main" id="{E69034E2-D3DC-65E9-FBEA-08F3162E479C}"/>
+              </a:ext>
+            </a:extLst>
+          </p:cNvPr>
+          <p:cNvSpPr>
+            <a:spLocks noGrp="1"/>
           </p:cNvSpPr>
-          <p:nvPr/>
+          <p:nvPr>
+            <p:ph idx="1"/>
+          </p:nvPr>
         </p:nvSpPr>
         <p:spPr>
           <a:xfrm>
-            <a:off x="675278" y="696119"/>
-            <a:ext cx="4049122" cy="457200"/>
+            <a:off x="152400" y="696119"/>
+            <a:ext cx="9906000" cy="4736677"/>
           </a:xfrm>
-          <a:prstGeom prst="rect">
-            <a:avLst/>
-          </a:prstGeom>
         </p:spPr>
         <p:txBody>
-          <a:bodyPr lIns="100557" tIns="50278" rIns="100557" bIns="50278"/>
-          <a:lstStyle>
-            <a:lvl1pPr marL="377087" indent="-377087" algn="l" defTabSz="1005566" rtl="0" eaLnBrk="1" latinLnBrk="0" hangingPunct="1">
-              <a:spcBef>
-                <a:spcPct val="20000"/>
-              </a:spcBef>
-              <a:buFont typeface="Arial" panose="020B0604020202020204" pitchFamily="34" charset="0"/>
-              <a:buChar char="•"/>
-              <a:defRPr sz="3500" kern="1200">
-                <a:solidFill>
-                  <a:schemeClr val="tx1"/>
-                </a:solidFill>
-                <a:latin typeface="+mn-lt"/>
-                <a:ea typeface="+mn-ea"/>
-                <a:cs typeface="+mn-cs"/>
-              </a:defRPr>
-            </a:lvl1pPr>
-            <a:lvl2pPr marL="817022" indent="-314239" algn="l" defTabSz="1005566" rtl="0" eaLnBrk="1" latinLnBrk="0" hangingPunct="1">
-              <a:spcBef>
-                <a:spcPct val="20000"/>
-              </a:spcBef>
-              <a:buFont typeface="Arial" panose="020B0604020202020204" pitchFamily="34" charset="0"/>
-              <a:buChar char="–"/>
-              <a:defRPr sz="3100" kern="1200">
-                <a:solidFill>
-                  <a:schemeClr val="tx1"/>
-                </a:solidFill>
-                <a:latin typeface="+mn-lt"/>
-                <a:ea typeface="+mn-ea"/>
-                <a:cs typeface="+mn-cs"/>
-              </a:defRPr>
-            </a:lvl2pPr>
-            <a:lvl3pPr marL="1256957" indent="-251391" algn="l" defTabSz="1005566" rtl="0" eaLnBrk="1" latinLnBrk="0" hangingPunct="1">
-              <a:spcBef>
-                <a:spcPct val="20000"/>
-              </a:spcBef>
-              <a:buFont typeface="Arial" panose="020B0604020202020204" pitchFamily="34" charset="0"/>
-              <a:buChar char="•"/>
-              <a:defRPr sz="2600" kern="1200">
-                <a:solidFill>
-                  <a:schemeClr val="tx1"/>
-                </a:solidFill>
-                <a:latin typeface="+mn-lt"/>
-                <a:ea typeface="+mn-ea"/>
-                <a:cs typeface="+mn-cs"/>
-              </a:defRPr>
-            </a:lvl3pPr>
-            <a:lvl4pPr marL="1759740" indent="-251391" algn="l" defTabSz="1005566" rtl="0" eaLnBrk="1" latinLnBrk="0" hangingPunct="1">
-              <a:spcBef>
-                <a:spcPct val="20000"/>
-              </a:spcBef>
-              <a:buFont typeface="Arial" panose="020B0604020202020204" pitchFamily="34" charset="0"/>
-              <a:buChar char="–"/>
-              <a:defRPr sz="2200" kern="1200">
-                <a:solidFill>
-                  <a:schemeClr val="tx1"/>
-                </a:solidFill>
-                <a:latin typeface="+mn-lt"/>
-                <a:ea typeface="+mn-ea"/>
-                <a:cs typeface="+mn-cs"/>
-              </a:defRPr>
-            </a:lvl4pPr>
-            <a:lvl5pPr marL="2262523" indent="-251391" algn="l" defTabSz="1005566" rtl="0" eaLnBrk="1" latinLnBrk="0" hangingPunct="1">
-              <a:spcBef>
-                <a:spcPct val="20000"/>
-              </a:spcBef>
-              <a:buFont typeface="Arial" panose="020B0604020202020204" pitchFamily="34" charset="0"/>
-              <a:buChar char="»"/>
-              <a:defRPr sz="2200" kern="1200">
-                <a:solidFill>
-                  <a:schemeClr val="tx1"/>
-                </a:solidFill>
-                <a:latin typeface="+mn-lt"/>
-                <a:ea typeface="+mn-ea"/>
-                <a:cs typeface="+mn-cs"/>
-              </a:defRPr>
-            </a:lvl5pPr>
-            <a:lvl6pPr marL="2765306" indent="-251391" algn="l" defTabSz="1005566" rtl="0" eaLnBrk="1" latinLnBrk="0" hangingPunct="1">
-              <a:spcBef>
-                <a:spcPct val="20000"/>
-              </a:spcBef>
-              <a:buFont typeface="Arial" panose="020B0604020202020204" pitchFamily="34" charset="0"/>
-              <a:buChar char="•"/>
-              <a:defRPr sz="2200" kern="1200">
-                <a:solidFill>
-                  <a:schemeClr val="tx1"/>
-                </a:solidFill>
-                <a:latin typeface="+mn-lt"/>
-                <a:ea typeface="+mn-ea"/>
-                <a:cs typeface="+mn-cs"/>
-              </a:defRPr>
-            </a:lvl6pPr>
-            <a:lvl7pPr marL="3268088" indent="-251391" algn="l" defTabSz="1005566" rtl="0" eaLnBrk="1" latinLnBrk="0" hangingPunct="1">
-              <a:spcBef>
-                <a:spcPct val="20000"/>
-              </a:spcBef>
-              <a:buFont typeface="Arial" panose="020B0604020202020204" pitchFamily="34" charset="0"/>
-              <a:buChar char="•"/>
-              <a:defRPr sz="2200" kern="1200">
-                <a:solidFill>
-                  <a:schemeClr val="tx1"/>
-                </a:solidFill>
-                <a:latin typeface="+mn-lt"/>
-                <a:ea typeface="+mn-ea"/>
-                <a:cs typeface="+mn-cs"/>
-              </a:defRPr>
-            </a:lvl7pPr>
-            <a:lvl8pPr marL="3770871" indent="-251391" algn="l" defTabSz="1005566" rtl="0" eaLnBrk="1" latinLnBrk="0" hangingPunct="1">
-              <a:spcBef>
-                <a:spcPct val="20000"/>
-              </a:spcBef>
-              <a:buFont typeface="Arial" panose="020B0604020202020204" pitchFamily="34" charset="0"/>
-              <a:buChar char="•"/>
-              <a:defRPr sz="2200" kern="1200">
-                <a:solidFill>
-                  <a:schemeClr val="tx1"/>
-                </a:solidFill>
-                <a:latin typeface="+mn-lt"/>
-                <a:ea typeface="+mn-ea"/>
-                <a:cs typeface="+mn-cs"/>
-              </a:defRPr>
-            </a:lvl8pPr>
-            <a:lvl9pPr marL="4273654" indent="-251391" algn="l" defTabSz="1005566" rtl="0" eaLnBrk="1" latinLnBrk="0" hangingPunct="1">
-              <a:spcBef>
-                <a:spcPct val="20000"/>
-              </a:spcBef>
-              <a:buFont typeface="Arial" panose="020B0604020202020204" pitchFamily="34" charset="0"/>
-              <a:buChar char="•"/>
-              <a:defRPr sz="2200" kern="1200">
-                <a:solidFill>
-                  <a:schemeClr val="tx1"/>
-                </a:solidFill>
-                <a:latin typeface="+mn-lt"/>
-                <a:ea typeface="+mn-ea"/>
-                <a:cs typeface="+mn-cs"/>
-              </a:defRPr>
-            </a:lvl9pPr>
-          </a:lstStyle>
+          <a:bodyPr/>
+          <a:lstStyle/>
+          <a:p>
+            <a:r>
+              <a:rPr lang="en-US" sz="1200" dirty="0"/>
+              <a:t>Now we will see different parameters of SQ (</a:t>
+            </a:r>
+            <a:r>
+              <a:rPr lang="en-US" sz="1200" dirty="0">
+                <a:highlight>
+                  <a:srgbClr val="FFFF00"/>
+                </a:highlight>
+              </a:rPr>
+              <a:t>on SQ</a:t>
+            </a:r>
+            <a:r>
+              <a:rPr lang="en-US" sz="1200" dirty="0"/>
+              <a:t>)</a:t>
+            </a:r>
+          </a:p>
+          <a:p>
+            <a:r>
+              <a:rPr lang="en-US" sz="1200" dirty="0"/>
+              <a:t>rectangle box holds the analysis report </a:t>
+            </a:r>
+            <a:r>
+              <a:rPr lang="en-US" sz="1200" dirty="0">
+                <a:sym typeface="Wingdings" panose="05000000000000000000" pitchFamily="2" charset="2"/>
+              </a:rPr>
+              <a:t></a:t>
+            </a:r>
+            <a:r>
+              <a:rPr lang="en-US" sz="1200" dirty="0"/>
+              <a:t> Green box says that all the quality gates are passed means conditions are passed  </a:t>
+            </a:r>
+            <a:r>
+              <a:rPr lang="en-US" sz="1200" dirty="0">
+                <a:sym typeface="Wingdings" panose="05000000000000000000" pitchFamily="2" charset="2"/>
+              </a:rPr>
+              <a:t></a:t>
+            </a:r>
+            <a:r>
+              <a:rPr lang="en-US" sz="1200" u="sng" dirty="0"/>
+              <a:t>Overall code section:</a:t>
+            </a:r>
+            <a:r>
+              <a:rPr lang="en-US" sz="1200" dirty="0"/>
+              <a:t>  as we have done analysis for version 1.0 &gt; suppose f1 feature added &gt; Do version 1.1  &gt;  </a:t>
+            </a:r>
+            <a:r>
+              <a:rPr lang="en-US" sz="1200" u="sng" dirty="0"/>
+              <a:t>report will  be  under New Code (</a:t>
+            </a:r>
+            <a:r>
+              <a:rPr lang="en-US" sz="1200" u="sng" dirty="0" err="1">
+                <a:highlight>
+                  <a:srgbClr val="FFFF00"/>
+                </a:highlight>
+              </a:rPr>
+              <a:t>repet</a:t>
+            </a:r>
+            <a:r>
+              <a:rPr lang="en-US" sz="1200" u="sng" dirty="0">
+                <a:highlight>
+                  <a:srgbClr val="FFFF00"/>
+                </a:highlight>
+              </a:rPr>
+              <a:t>)  &gt;</a:t>
+            </a:r>
+            <a:r>
+              <a:rPr lang="en-US" sz="1200" dirty="0"/>
+              <a:t>Overall code will be combination 1.0 , 1.1 , 1.2</a:t>
+            </a:r>
+          </a:p>
+          <a:p>
+            <a:endParaRPr lang="en-US" sz="1200" dirty="0">
+              <a:highlight>
+                <a:srgbClr val="FFFF00"/>
+              </a:highlight>
+            </a:endParaRPr>
+          </a:p>
+          <a:p>
+            <a:r>
+              <a:rPr lang="en-US" sz="1200" dirty="0"/>
+              <a:t>Explain</a:t>
+            </a:r>
+            <a:r>
+              <a:rPr lang="en-US" sz="1200" dirty="0">
+                <a:highlight>
+                  <a:srgbClr val="FFFF00"/>
+                </a:highlight>
+              </a:rPr>
+              <a:t> </a:t>
+            </a:r>
+            <a:r>
+              <a:rPr lang="en-US" sz="1200" dirty="0">
+                <a:solidFill>
+                  <a:srgbClr val="FF0000"/>
+                </a:solidFill>
+              </a:rPr>
+              <a:t>Project Information tab </a:t>
+            </a:r>
+            <a:r>
+              <a:rPr lang="en-US" sz="1200" dirty="0">
+                <a:highlight>
+                  <a:srgbClr val="FFFF00"/>
+                </a:highlight>
+              </a:rPr>
+              <a:t>: </a:t>
+            </a:r>
+            <a:r>
+              <a:rPr lang="en-US" sz="1200" u="sng" dirty="0"/>
+              <a:t>Lines of code </a:t>
+            </a:r>
+            <a:r>
+              <a:rPr lang="en-US" sz="1200" dirty="0"/>
+              <a:t>present for that project,  </a:t>
+            </a:r>
+            <a:r>
+              <a:rPr lang="en-US" sz="1200" u="sng" dirty="0"/>
+              <a:t>QG</a:t>
+            </a:r>
+            <a:r>
+              <a:rPr lang="en-US" sz="1200" dirty="0"/>
+              <a:t>  applied for that project ,</a:t>
+            </a:r>
+            <a:r>
+              <a:rPr lang="en-US" sz="1200" u="sng" dirty="0"/>
+              <a:t>QP</a:t>
+            </a:r>
+            <a:r>
+              <a:rPr lang="en-US" sz="1200" dirty="0"/>
+              <a:t> for that project</a:t>
+            </a:r>
+          </a:p>
+          <a:p>
+            <a:r>
+              <a:rPr lang="en-US" sz="1200" dirty="0">
+                <a:solidFill>
+                  <a:srgbClr val="FF0000"/>
+                </a:solidFill>
+              </a:rPr>
+              <a:t>Overview </a:t>
+            </a:r>
+            <a:r>
+              <a:rPr lang="en-US" sz="1200" dirty="0">
+                <a:solidFill>
+                  <a:srgbClr val="FF0000"/>
+                </a:solidFill>
+                <a:sym typeface="Wingdings" panose="05000000000000000000" pitchFamily="2" charset="2"/>
+              </a:rPr>
+              <a:t> Activity  right tab </a:t>
+            </a:r>
+            <a:r>
+              <a:rPr lang="en-US" sz="1200" dirty="0">
+                <a:sym typeface="Wingdings" panose="05000000000000000000" pitchFamily="2" charset="2"/>
+              </a:rPr>
+              <a:t> number of analysis</a:t>
+            </a:r>
+          </a:p>
           <a:p>
             <a:pPr marL="0" indent="0">
               <a:buNone/>
             </a:pPr>
             <a:r>
-              <a:rPr lang="en-US" sz="1800" b="1" dirty="0">
-                <a:solidFill>
-                  <a:srgbClr val="2B3B4B"/>
-                </a:solidFill>
-                <a:latin typeface="Tahoma" panose="020B0604030504040204" pitchFamily="34" charset="0"/>
-                <a:ea typeface="Tahoma" panose="020B0604030504040204" pitchFamily="34" charset="0"/>
-                <a:cs typeface="Tahoma" panose="020B0604030504040204" pitchFamily="34" charset="0"/>
-              </a:rPr>
-              <a:t>Available Plugins</a:t>
-            </a:r>
-          </a:p>
-        </p:txBody>
-      </p:sp>
-      <p:pic>
-        <p:nvPicPr>
-          <p:cNvPr id="4" name="Picture 2"/>
-          <p:cNvPicPr>
-            <a:picLocks noChangeAspect="1" noChangeArrowheads="1"/>
-          </p:cNvPicPr>
-          <p:nvPr/>
-        </p:nvPicPr>
-        <p:blipFill>
-          <a:blip r:embed="rId2">
-            <a:extLst>
-              <a:ext uri="{28A0092B-C50C-407E-A947-70E740481C1C}">
-                <a14:useLocalDpi xmlns:a14="http://schemas.microsoft.com/office/drawing/2010/main" val="0"/>
-              </a:ext>
-            </a:extLst>
-          </a:blip>
-          <a:srcRect/>
-          <a:stretch>
-            <a:fillRect/>
-          </a:stretch>
-        </p:blipFill>
-        <p:spPr bwMode="auto">
-          <a:xfrm>
-            <a:off x="3429000" y="1305719"/>
-            <a:ext cx="3131019" cy="3352800"/>
-          </a:xfrm>
-          <a:prstGeom prst="rect">
-            <a:avLst/>
-          </a:prstGeom>
-          <a:noFill/>
-          <a:ln w="9525">
-            <a:solidFill>
-              <a:schemeClr val="tx1"/>
-            </a:solidFill>
-            <a:miter lim="800000"/>
-            <a:headEnd/>
-            <a:tailEnd/>
-          </a:ln>
-          <a:extLst>
-            <a:ext uri="{909E8E84-426E-40DD-AFC4-6F175D3DCCD1}">
-              <a14:hiddenFill xmlns:a14="http://schemas.microsoft.com/office/drawing/2010/main">
-                <a:solidFill>
-                  <a:schemeClr val="accent1"/>
-                </a:solidFill>
-              </a14:hiddenFill>
-            </a:ext>
-          </a:extLst>
-        </p:spPr>
-      </p:pic>
+              <a:rPr lang="en-US" sz="1200" dirty="0">
+                <a:sym typeface="Wingdings" panose="05000000000000000000" pitchFamily="2" charset="2"/>
+              </a:rPr>
+              <a:t>           bottom </a:t>
+            </a:r>
+            <a:r>
+              <a:rPr lang="en-US" sz="1200" dirty="0">
+                <a:solidFill>
+                  <a:srgbClr val="FF0000"/>
+                </a:solidFill>
+                <a:sym typeface="Wingdings" panose="05000000000000000000" pitchFamily="2" charset="2"/>
+              </a:rPr>
+              <a:t>activity  click on 1.0  or 1.2 -&gt;</a:t>
+            </a:r>
+            <a:r>
+              <a:rPr lang="en-US" sz="1200" dirty="0">
+                <a:sym typeface="Wingdings" panose="05000000000000000000" pitchFamily="2" charset="2"/>
+              </a:rPr>
+              <a:t>explain bugs ,code smell ,vulnebraties ,lines of code</a:t>
+            </a:r>
+          </a:p>
+          <a:p>
+            <a:pPr marL="0" indent="0">
+              <a:buNone/>
+            </a:pPr>
+            <a:r>
+              <a:rPr lang="en-US" sz="1200" dirty="0">
+                <a:sym typeface="Wingdings" panose="05000000000000000000" pitchFamily="2" charset="2"/>
+              </a:rPr>
+              <a:t>---------------Now :</a:t>
+            </a:r>
+            <a:r>
+              <a:rPr lang="en-US" sz="1200" b="1" dirty="0">
+                <a:sym typeface="Wingdings" panose="05000000000000000000" pitchFamily="2" charset="2"/>
+              </a:rPr>
+              <a:t>Imp parameters-</a:t>
+            </a:r>
+            <a:r>
+              <a:rPr lang="en-US" sz="1200" dirty="0">
+                <a:sym typeface="Wingdings" panose="05000000000000000000" pitchFamily="2" charset="2"/>
+              </a:rPr>
+              <a:t>------------</a:t>
+            </a:r>
+          </a:p>
+          <a:p>
+            <a:pPr marL="0" indent="0">
+              <a:buNone/>
+            </a:pPr>
+            <a:r>
+              <a:rPr lang="en-US" sz="1200" u="sng" dirty="0">
+                <a:sym typeface="Wingdings" panose="05000000000000000000" pitchFamily="2" charset="2"/>
+              </a:rPr>
+              <a:t> BUGS </a:t>
+            </a:r>
+            <a:r>
+              <a:rPr lang="en-US" sz="1200" dirty="0">
+                <a:sym typeface="Wingdings" panose="05000000000000000000" pitchFamily="2" charset="2"/>
+              </a:rPr>
+              <a:t>: (</a:t>
+            </a:r>
+            <a:r>
+              <a:rPr lang="en-US" sz="1200" dirty="0">
+                <a:highlight>
+                  <a:srgbClr val="FFFF00"/>
+                </a:highlight>
+                <a:sym typeface="Wingdings" panose="05000000000000000000" pitchFamily="2" charset="2"/>
+              </a:rPr>
+              <a:t>Highlight it ) </a:t>
+            </a:r>
+            <a:r>
+              <a:rPr lang="en-US" sz="1200" dirty="0">
+                <a:sym typeface="Wingdings" panose="05000000000000000000" pitchFamily="2" charset="2"/>
+              </a:rPr>
+              <a:t>it is a lines of code that need to be fixed in that particular project. For example variable hard coded , variable declared but not used </a:t>
+            </a:r>
+            <a:r>
+              <a:rPr lang="en-US" sz="900" dirty="0">
+                <a:sym typeface="Wingdings" panose="05000000000000000000" pitchFamily="2" charset="2"/>
+              </a:rPr>
+              <a:t>that will be shown on TOP   </a:t>
+            </a:r>
+            <a:r>
+              <a:rPr lang="en-US" sz="1200" dirty="0">
+                <a:sym typeface="Wingdings" panose="05000000000000000000" pitchFamily="2" charset="2"/>
+              </a:rPr>
+              <a:t>moreover as count of bug increase  reliability will also worsen to D .</a:t>
+            </a:r>
+          </a:p>
+          <a:p>
+            <a:pPr marL="0" indent="0">
+              <a:buNone/>
+            </a:pPr>
+            <a:endParaRPr lang="en-US" sz="1200" dirty="0">
+              <a:sym typeface="Wingdings" panose="05000000000000000000" pitchFamily="2" charset="2"/>
+            </a:endParaRPr>
+          </a:p>
+          <a:p>
+            <a:pPr marL="0" indent="0">
+              <a:buNone/>
+            </a:pPr>
+            <a:r>
+              <a:rPr lang="en-US" sz="1200" u="sng" dirty="0">
+                <a:sym typeface="Wingdings" panose="05000000000000000000" pitchFamily="2" charset="2"/>
+              </a:rPr>
+              <a:t>VULNEREABILITY</a:t>
+            </a:r>
+            <a:r>
+              <a:rPr lang="en-US" sz="1200" dirty="0">
+                <a:sym typeface="Wingdings" panose="05000000000000000000" pitchFamily="2" charset="2"/>
+              </a:rPr>
+              <a:t> : (</a:t>
+            </a:r>
+            <a:r>
+              <a:rPr lang="en-US" sz="1200" dirty="0">
+                <a:highlight>
+                  <a:srgbClr val="FFFF00"/>
+                </a:highlight>
+                <a:sym typeface="Wingdings" panose="05000000000000000000" pitchFamily="2" charset="2"/>
+              </a:rPr>
+              <a:t>Highlight it ) </a:t>
+            </a:r>
+            <a:r>
+              <a:rPr lang="en-US" sz="1200" dirty="0">
+                <a:sym typeface="Wingdings" panose="05000000000000000000" pitchFamily="2" charset="2"/>
+              </a:rPr>
+              <a:t> If a security code implemented   but not correctly implemented   then vulnerability will occur   </a:t>
+            </a:r>
+            <a:r>
+              <a:rPr lang="en-US" sz="900" dirty="0">
+                <a:sym typeface="Wingdings" panose="05000000000000000000" pitchFamily="2" charset="2"/>
+              </a:rPr>
+              <a:t>that will be shown  on sec TOP </a:t>
+            </a:r>
+            <a:r>
+              <a:rPr lang="en-US" sz="800" dirty="0">
+                <a:sym typeface="Wingdings" panose="05000000000000000000" pitchFamily="2" charset="2"/>
+              </a:rPr>
+              <a:t> </a:t>
+            </a:r>
+            <a:r>
+              <a:rPr lang="en-US" sz="1200" dirty="0">
+                <a:sym typeface="Wingdings" panose="05000000000000000000" pitchFamily="2" charset="2"/>
+              </a:rPr>
+              <a:t>moreover as count of </a:t>
+            </a:r>
+            <a:r>
+              <a:rPr lang="en-US" sz="1200" dirty="0" err="1">
+                <a:sym typeface="Wingdings" panose="05000000000000000000" pitchFamily="2" charset="2"/>
+              </a:rPr>
+              <a:t>vul</a:t>
+            </a:r>
+            <a:r>
+              <a:rPr lang="en-US" sz="1200" dirty="0">
+                <a:sym typeface="Wingdings" panose="05000000000000000000" pitchFamily="2" charset="2"/>
+              </a:rPr>
+              <a:t>  increase  Security  will worsen to  B or C  D .</a:t>
+            </a:r>
+          </a:p>
+          <a:p>
+            <a:pPr marL="0" indent="0">
+              <a:buNone/>
+            </a:pPr>
+            <a:endParaRPr lang="en-US" sz="1200" dirty="0">
+              <a:sym typeface="Wingdings" panose="05000000000000000000" pitchFamily="2" charset="2"/>
+            </a:endParaRPr>
+          </a:p>
+          <a:p>
+            <a:pPr marL="0" indent="0">
+              <a:buNone/>
+            </a:pPr>
+            <a:r>
+              <a:rPr lang="en-US" sz="1200" u="sng" dirty="0">
+                <a:sym typeface="Wingdings" panose="05000000000000000000" pitchFamily="2" charset="2"/>
+              </a:rPr>
+              <a:t>SECURITY HOTSPOT </a:t>
+            </a:r>
+            <a:r>
+              <a:rPr lang="en-US" sz="1200" dirty="0">
+                <a:sym typeface="Wingdings" panose="05000000000000000000" pitchFamily="2" charset="2"/>
+              </a:rPr>
+              <a:t>: I (</a:t>
+            </a:r>
+            <a:r>
+              <a:rPr lang="en-US" sz="1200" dirty="0">
+                <a:highlight>
+                  <a:srgbClr val="FFFF00"/>
+                </a:highlight>
+                <a:sym typeface="Wingdings" panose="05000000000000000000" pitchFamily="2" charset="2"/>
+              </a:rPr>
+              <a:t>Highlight it )  </a:t>
+            </a:r>
+            <a:r>
+              <a:rPr lang="en-US" sz="1200" dirty="0">
+                <a:sym typeface="Wingdings" panose="05000000000000000000" pitchFamily="2" charset="2"/>
+              </a:rPr>
+              <a:t>t shows security sensitive pieces of code that  is present in your </a:t>
+            </a:r>
+            <a:r>
+              <a:rPr lang="en-US" sz="1200" dirty="0" err="1">
+                <a:sym typeface="Wingdings" panose="05000000000000000000" pitchFamily="2" charset="2"/>
+              </a:rPr>
+              <a:t>project</a:t>
+            </a:r>
+            <a:r>
+              <a:rPr lang="en-US" sz="1200" dirty="0" err="1">
+                <a:highlight>
+                  <a:srgbClr val="FFFF00"/>
+                </a:highlight>
+                <a:sym typeface="Wingdings" panose="05000000000000000000" pitchFamily="2" charset="2"/>
+              </a:rPr>
+              <a:t>in</a:t>
+            </a:r>
+            <a:r>
+              <a:rPr lang="en-US" sz="1200" dirty="0">
+                <a:highlight>
+                  <a:srgbClr val="FFFF00"/>
+                </a:highlight>
+                <a:sym typeface="Wingdings" panose="05000000000000000000" pitchFamily="2" charset="2"/>
+              </a:rPr>
+              <a:t> my case</a:t>
+            </a:r>
+            <a:r>
+              <a:rPr lang="en-US" sz="1200" dirty="0">
+                <a:sym typeface="Wingdings" panose="05000000000000000000" pitchFamily="2" charset="2"/>
+              </a:rPr>
+              <a:t>      </a:t>
+            </a:r>
+            <a:r>
+              <a:rPr lang="en-US" sz="1200" u="sng" dirty="0">
+                <a:sym typeface="Wingdings" panose="05000000000000000000" pitchFamily="2" charset="2"/>
+              </a:rPr>
+              <a:t> </a:t>
+            </a:r>
+          </a:p>
+          <a:p>
+            <a:pPr marL="0" indent="0">
+              <a:buNone/>
+            </a:pPr>
+            <a:r>
+              <a:rPr lang="en-US" sz="1200" u="sng" dirty="0">
+                <a:sym typeface="Wingdings" panose="05000000000000000000" pitchFamily="2" charset="2"/>
+              </a:rPr>
+              <a:t>REVIEWED</a:t>
+            </a:r>
+            <a:r>
+              <a:rPr lang="en-US" sz="1200" dirty="0">
+                <a:sym typeface="Wingdings" panose="05000000000000000000" pitchFamily="2" charset="2"/>
+              </a:rPr>
+              <a:t>: (</a:t>
+            </a:r>
+            <a:r>
+              <a:rPr lang="en-US" sz="1200" dirty="0">
+                <a:highlight>
+                  <a:srgbClr val="FFFF00"/>
+                </a:highlight>
+                <a:sym typeface="Wingdings" panose="05000000000000000000" pitchFamily="2" charset="2"/>
+              </a:rPr>
+              <a:t>Highlight it )  </a:t>
+            </a:r>
+            <a:r>
+              <a:rPr lang="en-US" sz="1200" dirty="0" err="1">
+                <a:sym typeface="Wingdings" panose="05000000000000000000" pitchFamily="2" charset="2"/>
+              </a:rPr>
+              <a:t>Upto</a:t>
+            </a:r>
+            <a:r>
+              <a:rPr lang="en-US" sz="1200" dirty="0">
+                <a:sym typeface="Wingdings" panose="05000000000000000000" pitchFamily="2" charset="2"/>
+              </a:rPr>
+              <a:t> what % code is  security code is been reviewed   </a:t>
+            </a:r>
+          </a:p>
+          <a:p>
+            <a:pPr marL="0" indent="0">
+              <a:buNone/>
+            </a:pPr>
+            <a:r>
+              <a:rPr lang="en-US" sz="1200" dirty="0">
+                <a:sym typeface="Wingdings" panose="05000000000000000000" pitchFamily="2" charset="2"/>
+              </a:rPr>
+              <a:t>  </a:t>
+            </a:r>
+            <a:r>
+              <a:rPr lang="en-US" sz="1200" u="sng" dirty="0">
+                <a:sym typeface="Wingdings" panose="05000000000000000000" pitchFamily="2" charset="2"/>
+              </a:rPr>
+              <a:t>Security review </a:t>
+            </a:r>
+            <a:r>
+              <a:rPr lang="en-US" sz="1200" dirty="0">
+                <a:sym typeface="Wingdings" panose="05000000000000000000" pitchFamily="2" charset="2"/>
+              </a:rPr>
+              <a:t>:  now there is 0.0% reviewer so  sec review is worse which is E</a:t>
+            </a:r>
+            <a:endParaRPr lang="en-US" sz="900" dirty="0">
+              <a:sym typeface="Wingdings" panose="05000000000000000000" pitchFamily="2" charset="2"/>
+            </a:endParaRPr>
+          </a:p>
+          <a:p>
+            <a:pPr marL="0" indent="0">
+              <a:buNone/>
+            </a:pPr>
+            <a:r>
+              <a:rPr lang="en-US" sz="1200" u="sng" dirty="0"/>
+              <a:t>DEBT</a:t>
+            </a:r>
+            <a:r>
+              <a:rPr lang="en-US" sz="1200" dirty="0"/>
+              <a:t>  : </a:t>
+            </a:r>
+            <a:r>
+              <a:rPr lang="en-US" sz="1200" dirty="0">
+                <a:sym typeface="Wingdings" panose="05000000000000000000" pitchFamily="2" charset="2"/>
+              </a:rPr>
+              <a:t>(</a:t>
+            </a:r>
+            <a:r>
+              <a:rPr lang="en-US" sz="1200" dirty="0">
+                <a:highlight>
+                  <a:srgbClr val="FFFF00"/>
+                </a:highlight>
+                <a:sym typeface="Wingdings" panose="05000000000000000000" pitchFamily="2" charset="2"/>
+              </a:rPr>
+              <a:t>Highlight it )  </a:t>
+            </a:r>
+            <a:r>
+              <a:rPr lang="en-US" sz="1200" dirty="0"/>
+              <a:t>it means how long it will take  to solve the all problems shown on dashboard </a:t>
+            </a:r>
+            <a:r>
+              <a:rPr lang="en-US" sz="1200" dirty="0">
+                <a:sym typeface="Wingdings" panose="05000000000000000000" pitchFamily="2" charset="2"/>
+              </a:rPr>
+              <a:t> d means days  </a:t>
+            </a:r>
+            <a:r>
+              <a:rPr lang="en-US" sz="1200" dirty="0">
+                <a:highlight>
+                  <a:srgbClr val="FFFF00"/>
+                </a:highlight>
+                <a:sym typeface="Wingdings" panose="05000000000000000000" pitchFamily="2" charset="2"/>
+              </a:rPr>
+              <a:t>in my case </a:t>
+            </a:r>
+          </a:p>
+          <a:p>
+            <a:pPr marL="0" indent="0">
+              <a:buNone/>
+            </a:pPr>
+            <a:r>
+              <a:rPr lang="en-US" sz="1200" u="sng" dirty="0">
+                <a:sym typeface="Wingdings" panose="05000000000000000000" pitchFamily="2" charset="2"/>
+              </a:rPr>
+              <a:t>CODE SMELL</a:t>
+            </a:r>
+            <a:r>
+              <a:rPr lang="en-US" sz="1200" dirty="0">
+                <a:sym typeface="Wingdings" panose="05000000000000000000" pitchFamily="2" charset="2"/>
+              </a:rPr>
+              <a:t> (</a:t>
+            </a:r>
+            <a:r>
+              <a:rPr lang="en-US" sz="1200" dirty="0">
+                <a:highlight>
+                  <a:srgbClr val="FFFF00"/>
+                </a:highlight>
+                <a:sym typeface="Wingdings" panose="05000000000000000000" pitchFamily="2" charset="2"/>
+              </a:rPr>
+              <a:t>Highlight it ) </a:t>
+            </a:r>
+            <a:r>
+              <a:rPr lang="en-US" sz="1200" u="sng" dirty="0">
+                <a:sym typeface="Wingdings" panose="05000000000000000000" pitchFamily="2" charset="2"/>
+              </a:rPr>
+              <a:t> </a:t>
+            </a:r>
+            <a:r>
+              <a:rPr lang="en-US" sz="1200" dirty="0">
+                <a:sym typeface="Wingdings" panose="05000000000000000000" pitchFamily="2" charset="2"/>
+              </a:rPr>
+              <a:t>: it means ,it refers to  a  potential problem that may arise in future due to  a specific block of code  </a:t>
+            </a:r>
+            <a:r>
+              <a:rPr lang="en-US" sz="1200" dirty="0">
+                <a:highlight>
+                  <a:srgbClr val="FFFF00"/>
+                </a:highlight>
+                <a:sym typeface="Wingdings" panose="05000000000000000000" pitchFamily="2" charset="2"/>
+              </a:rPr>
+              <a:t>in my case</a:t>
+            </a:r>
+            <a:r>
+              <a:rPr lang="en-US" sz="1200" dirty="0">
+                <a:sym typeface="Wingdings" panose="05000000000000000000" pitchFamily="2" charset="2"/>
+              </a:rPr>
+              <a:t> click it </a:t>
+            </a:r>
+          </a:p>
+          <a:p>
+            <a:pPr marL="0" indent="0">
+              <a:buNone/>
+            </a:pPr>
+            <a:r>
+              <a:rPr lang="en-US" sz="1200" dirty="0">
+                <a:sym typeface="Wingdings" panose="05000000000000000000" pitchFamily="2" charset="2"/>
+              </a:rPr>
+              <a:t>DUPLICATE  , CODE COVERAGE  -  means up to what % different  test cases present in you code is executed or covered ,that will be shown</a:t>
+            </a:r>
+          </a:p>
+          <a:p>
+            <a:pPr marL="0" indent="0">
+              <a:buNone/>
+            </a:pPr>
+            <a:endParaRPr lang="en-US" sz="1200" dirty="0"/>
+          </a:p>
+        </p:txBody>
+      </p:sp>
     </p:spTree>
     <p:extLst>
       <p:ext uri="{BB962C8B-B14F-4D97-AF65-F5344CB8AC3E}">
-        <p14:creationId xmlns:p14="http://schemas.microsoft.com/office/powerpoint/2010/main" val="2738948166"/>
+        <p14:creationId xmlns:p14="http://schemas.microsoft.com/office/powerpoint/2010/main" val="27755940"/>
       </p:ext>
     </p:extLst>
   </p:cSld>
@@ -14727,6 +17184,21 @@
 </file>
 
 <file path=customXml/item1.xml><?xml version="1.0" encoding="utf-8"?>
+<p:properties xmlns:p="http://schemas.microsoft.com/office/2006/metadata/properties" xmlns:xsi="http://www.w3.org/2001/XMLSchema-instance" xmlns:pc="http://schemas.microsoft.com/office/infopath/2007/PartnerControls">
+  <documentManagement/>
+</p:properties>
+</file>
+
+<file path=customXml/item2.xml><?xml version="1.0" encoding="utf-8"?>
+<?mso-contentType ?>
+<FormTemplates xmlns="http://schemas.microsoft.com/sharepoint/v3/contenttype/forms">
+  <Display>DocumentLibraryForm</Display>
+  <Edit>DocumentLibraryForm</Edit>
+  <New>DocumentLibraryForm</New>
+</FormTemplates>
+</file>
+
+<file path=customXml/item3.xml><?xml version="1.0" encoding="utf-8"?>
 <ct:contentTypeSchema xmlns:ct="http://schemas.microsoft.com/office/2006/metadata/contentType" xmlns:ma="http://schemas.microsoft.com/office/2006/metadata/properties/metaAttributes" ct:_="" ma:_="" ma:contentTypeName="Document" ma:contentTypeID="0x010100D6CFEBD4412E454DA1CFCF1077D1E3BA" ma:contentTypeVersion="0" ma:contentTypeDescription="Create a new document." ma:contentTypeScope="" ma:versionID="8298e5e809efd921dec1ac395905091a">
   <xsd:schema xmlns:xsd="http://www.w3.org/2001/XMLSchema" xmlns:xs="http://www.w3.org/2001/XMLSchema" xmlns:p="http://schemas.microsoft.com/office/2006/metadata/properties" targetNamespace="http://schemas.microsoft.com/office/2006/metadata/properties" ma:root="true" ma:fieldsID="1b05d82d297216baf5b26c55225140df">
     <xsd:element name="properties">
@@ -14840,22 +17312,30 @@
 </ct:contentTypeSchema>
 </file>
 
-<file path=customXml/item2.xml><?xml version="1.0" encoding="utf-8"?>
-<?mso-contentType ?>
-<FormTemplates xmlns="http://schemas.microsoft.com/sharepoint/v3/contenttype/forms">
-  <Display>DocumentLibraryForm</Display>
-  <Edit>DocumentLibraryForm</Edit>
-  <New>DocumentLibraryForm</New>
-</FormTemplates>
+<file path=customXml/itemProps1.xml><?xml version="1.0" encoding="utf-8"?>
+<ds:datastoreItem xmlns:ds="http://schemas.openxmlformats.org/officeDocument/2006/customXml" ds:itemID="{DF1BE659-B717-48DC-B7CD-5B8EBF1EFA81}">
+  <ds:schemaRefs>
+    <ds:schemaRef ds:uri="http://schemas.microsoft.com/office/infopath/2007/PartnerControls"/>
+    <ds:schemaRef ds:uri="http://www.w3.org/XML/1998/namespace"/>
+    <ds:schemaRef ds:uri="http://purl.org/dc/dcmitype/"/>
+    <ds:schemaRef ds:uri="http://schemas.microsoft.com/office/2006/documentManagement/types"/>
+    <ds:schemaRef ds:uri="http://purl.org/dc/elements/1.1/"/>
+    <ds:schemaRef ds:uri="http://schemas.microsoft.com/office/2006/metadata/properties"/>
+    <ds:schemaRef ds:uri="http://schemas.openxmlformats.org/package/2006/metadata/core-properties"/>
+    <ds:schemaRef ds:uri="http://purl.org/dc/terms/"/>
+  </ds:schemaRefs>
+</ds:datastoreItem>
 </file>
 
-<file path=customXml/item3.xml><?xml version="1.0" encoding="utf-8"?>
-<p:properties xmlns:p="http://schemas.microsoft.com/office/2006/metadata/properties" xmlns:xsi="http://www.w3.org/2001/XMLSchema-instance" xmlns:pc="http://schemas.microsoft.com/office/infopath/2007/PartnerControls">
-  <documentManagement/>
-</p:properties>
+<file path=customXml/itemProps2.xml><?xml version="1.0" encoding="utf-8"?>
+<ds:datastoreItem xmlns:ds="http://schemas.openxmlformats.org/officeDocument/2006/customXml" ds:itemID="{29ED8CA7-E82D-4841-909F-DFD457B85A26}">
+  <ds:schemaRefs>
+    <ds:schemaRef ds:uri="http://schemas.microsoft.com/sharepoint/v3/contenttype/forms"/>
+  </ds:schemaRefs>
+</ds:datastoreItem>
 </file>
 
-<file path=customXml/itemProps1.xml><?xml version="1.0" encoding="utf-8"?>
+<file path=customXml/itemProps3.xml><?xml version="1.0" encoding="utf-8"?>
 <ds:datastoreItem xmlns:ds="http://schemas.openxmlformats.org/officeDocument/2006/customXml" ds:itemID="{A8A2345F-2886-4094-855C-84BF9AB379F6}">
   <ds:schemaRefs>
     <ds:schemaRef ds:uri="http://schemas.microsoft.com/office/2006/metadata/contentType"/>
@@ -14869,27 +17349,4 @@
     <ds:schemaRef ds:uri="http://schemas.microsoft.com/office/infopath/2007/PartnerControls"/>
   </ds:schemaRefs>
 </ds:datastoreItem>
-</file>
-
-<file path=customXml/itemProps2.xml><?xml version="1.0" encoding="utf-8"?>
-<ds:datastoreItem xmlns:ds="http://schemas.openxmlformats.org/officeDocument/2006/customXml" ds:itemID="{29ED8CA7-E82D-4841-909F-DFD457B85A26}">
-  <ds:schemaRefs>
-    <ds:schemaRef ds:uri="http://schemas.microsoft.com/sharepoint/v3/contenttype/forms"/>
-  </ds:schemaRefs>
-</ds:datastoreItem>
-</file>
-
-<file path=customXml/itemProps3.xml><?xml version="1.0" encoding="utf-8"?>
-<ds:datastoreItem xmlns:ds="http://schemas.openxmlformats.org/officeDocument/2006/customXml" ds:itemID="{DF1BE659-B717-48DC-B7CD-5B8EBF1EFA81}">
-  <ds:schemaRefs>
-    <ds:schemaRef ds:uri="http://schemas.microsoft.com/office/infopath/2007/PartnerControls"/>
-    <ds:schemaRef ds:uri="http://www.w3.org/XML/1998/namespace"/>
-    <ds:schemaRef ds:uri="http://purl.org/dc/dcmitype/"/>
-    <ds:schemaRef ds:uri="http://schemas.microsoft.com/office/2006/documentManagement/types"/>
-    <ds:schemaRef ds:uri="http://purl.org/dc/elements/1.1/"/>
-    <ds:schemaRef ds:uri="http://schemas.microsoft.com/office/2006/metadata/properties"/>
-    <ds:schemaRef ds:uri="http://schemas.openxmlformats.org/package/2006/metadata/core-properties"/>
-    <ds:schemaRef ds:uri="http://purl.org/dc/terms/"/>
-  </ds:schemaRefs>
-</ds:datastoreItem>
 </file>
</xml_diff>